<commit_message>
update with links to jent's repo
</commit_message>
<xml_diff>
--- a/gallery/outputs/slides/powerpoint_presentation.pptx
+++ b/gallery/outputs/slides/powerpoint_presentation.pptx
@@ -3246,436 +3246,6 @@
           <a:chExt cx="0" cy="0"/>
         </a:xfrm>
       </p:grpSpPr>
-      <p:sp>
-        <p:nvSpPr>
-          <p:cNvPr id="2" name="Title 1"/>
-          <p:cNvSpPr>
-            <a:spLocks noGrp="1"/>
-          </p:cNvSpPr>
-          <p:nvPr>
-            <p:ph type="title"/>
-          </p:nvPr>
-        </p:nvSpPr>
-        <p:spPr/>
-        <p:txBody>
-          <a:bodyPr/>
-          <a:lstStyle/>
-          <a:p>
-            <a:pPr lvl="0" marL="0" indent="0">
-              <a:buNone/>
-            </a:pPr>
-            <a:r>
-              <a:rPr/>
-              <a:t>Fort</a:t>
-            </a:r>
-            <a:r>
-              <a:rPr/>
-              <a:t> </a:t>
-            </a:r>
-            <a:r>
-              <a:rPr/>
-              <a:t>Worth</a:t>
-            </a:r>
-            <a:r>
-              <a:rPr/>
-              <a:t> </a:t>
-            </a:r>
-            <a:r>
-              <a:rPr/>
-              <a:t>has</a:t>
-            </a:r>
-            <a:r>
-              <a:rPr/>
-              <a:t> </a:t>
-            </a:r>
-            <a:r>
-              <a:rPr/>
-              <a:t>more</a:t>
-            </a:r>
-            <a:r>
-              <a:rPr/>
-              <a:t> </a:t>
-            </a:r>
-            <a:r>
-              <a:rPr/>
-              <a:t>affordable</a:t>
-            </a:r>
-            <a:r>
-              <a:rPr/>
-              <a:t> </a:t>
-            </a:r>
-            <a:r>
-              <a:rPr/>
-              <a:t>housing</a:t>
-            </a:r>
-          </a:p>
-        </p:txBody>
-      </p:sp>
-      <p:sp>
-        <p:nvSpPr>
-          <p:cNvPr id="3" name="Content Placeholder 2"/>
-          <p:cNvSpPr>
-            <a:spLocks noGrp="1"/>
-          </p:cNvSpPr>
-          <p:nvPr>
-            <p:ph idx="1"/>
-          </p:nvPr>
-        </p:nvSpPr>
-        <p:spPr/>
-        <p:txBody>
-          <a:bodyPr/>
-          <a:lstStyle/>
-          <a:p>
-            <a:pPr lvl="0" marL="1270000" indent="0">
-              <a:buNone/>
-            </a:pPr>
-            <a:r>
-              <a:rPr sz="1800" b="1">
-                <a:solidFill>
-                  <a:srgbClr val="007020"/>
-                </a:solidFill>
-                <a:latin typeface="Courier"/>
-              </a:rPr>
-              <a:t>library</a:t>
-            </a:r>
-            <a:r>
-              <a:rPr sz="1800">
-                <a:latin typeface="Courier"/>
-              </a:rPr>
-              <a:t>(scales) </a:t>
-            </a:r>
-            <a:r>
-              <a:rPr sz="1800" i="1">
-                <a:solidFill>
-                  <a:srgbClr val="60A0B0"/>
-                </a:solidFill>
-                <a:latin typeface="Courier"/>
-              </a:rPr>
-              <a:t># to make y-axis in non-scientific notation</a:t>
-            </a:r>
-            <a:br/>
-            <a:r>
-              <a:rPr sz="1800" b="1">
-                <a:solidFill>
-                  <a:srgbClr val="007020"/>
-                </a:solidFill>
-                <a:latin typeface="Courier"/>
-              </a:rPr>
-              <a:t>ggplot</a:t>
-            </a:r>
-            <a:r>
-              <a:rPr sz="1800">
-                <a:latin typeface="Courier"/>
-              </a:rPr>
-              <a:t>(txsamp, </a:t>
-            </a:r>
-            <a:r>
-              <a:rPr sz="1800" b="1">
-                <a:solidFill>
-                  <a:srgbClr val="007020"/>
-                </a:solidFill>
-                <a:latin typeface="Courier"/>
-              </a:rPr>
-              <a:t>aes</a:t>
-            </a:r>
-            <a:r>
-              <a:rPr sz="1800">
-                <a:latin typeface="Courier"/>
-              </a:rPr>
-              <a:t>(</a:t>
-            </a:r>
-            <a:r>
-              <a:rPr sz="1800">
-                <a:solidFill>
-                  <a:srgbClr val="902000"/>
-                </a:solidFill>
-                <a:latin typeface="Courier"/>
-              </a:rPr>
-              <a:t>x =</a:t>
-            </a:r>
-            <a:r>
-              <a:rPr sz="1800">
-                <a:latin typeface="Courier"/>
-              </a:rPr>
-              <a:t> median, </a:t>
-            </a:r>
-            <a:r>
-              <a:rPr sz="1800">
-                <a:solidFill>
-                  <a:srgbClr val="902000"/>
-                </a:solidFill>
-                <a:latin typeface="Courier"/>
-              </a:rPr>
-              <a:t>fill =</a:t>
-            </a:r>
-            <a:r>
-              <a:rPr sz="1800">
-                <a:latin typeface="Courier"/>
-              </a:rPr>
-              <a:t> city)) </a:t>
-            </a:r>
-            <a:r>
-              <a:rPr sz="1800">
-                <a:solidFill>
-                  <a:srgbClr val="666666"/>
-                </a:solidFill>
-                <a:latin typeface="Courier"/>
-              </a:rPr>
-              <a:t>+</a:t>
-            </a:r>
-            <a:br/>
-            <a:r>
-              <a:rPr sz="1800">
-                <a:solidFill>
-                  <a:srgbClr val="4070A0"/>
-                </a:solidFill>
-                <a:latin typeface="Courier"/>
-              </a:rPr>
-              <a:t>  </a:t>
-            </a:r>
-            <a:r>
-              <a:rPr sz="1800" b="1">
-                <a:solidFill>
-                  <a:srgbClr val="007020"/>
-                </a:solidFill>
-                <a:latin typeface="Courier"/>
-              </a:rPr>
-              <a:t>geom_histogram</a:t>
-            </a:r>
-            <a:r>
-              <a:rPr sz="1800">
-                <a:latin typeface="Courier"/>
-              </a:rPr>
-              <a:t>(</a:t>
-            </a:r>
-            <a:r>
-              <a:rPr sz="1800" b="1">
-                <a:solidFill>
-                  <a:srgbClr val="007020"/>
-                </a:solidFill>
-                <a:latin typeface="Courier"/>
-              </a:rPr>
-              <a:t>aes</a:t>
-            </a:r>
-            <a:r>
-              <a:rPr sz="1800">
-                <a:latin typeface="Courier"/>
-              </a:rPr>
-              <a:t>(</a:t>
-            </a:r>
-            <a:r>
-              <a:rPr sz="1800">
-                <a:solidFill>
-                  <a:srgbClr val="902000"/>
-                </a:solidFill>
-                <a:latin typeface="Courier"/>
-              </a:rPr>
-              <a:t>weight =</a:t>
-            </a:r>
-            <a:r>
-              <a:rPr sz="1800">
-                <a:latin typeface="Courier"/>
-              </a:rPr>
-              <a:t> sales), </a:t>
-            </a:r>
-            <a:r>
-              <a:rPr sz="1800">
-                <a:solidFill>
-                  <a:srgbClr val="902000"/>
-                </a:solidFill>
-                <a:latin typeface="Courier"/>
-              </a:rPr>
-              <a:t>position =</a:t>
-            </a:r>
-            <a:r>
-              <a:rPr sz="1800">
-                <a:latin typeface="Courier"/>
-              </a:rPr>
-              <a:t> </a:t>
-            </a:r>
-            <a:r>
-              <a:rPr sz="1800">
-                <a:solidFill>
-                  <a:srgbClr val="4070A0"/>
-                </a:solidFill>
-                <a:latin typeface="Courier"/>
-              </a:rPr>
-              <a:t>"dodge"</a:t>
-            </a:r>
-            <a:r>
-              <a:rPr sz="1800">
-                <a:latin typeface="Courier"/>
-              </a:rPr>
-              <a:t>, </a:t>
-            </a:r>
-            <a:r>
-              <a:rPr sz="1800">
-                <a:solidFill>
-                  <a:srgbClr val="902000"/>
-                </a:solidFill>
-                <a:latin typeface="Courier"/>
-              </a:rPr>
-              <a:t>binwidth =</a:t>
-            </a:r>
-            <a:r>
-              <a:rPr sz="1800">
-                <a:latin typeface="Courier"/>
-              </a:rPr>
-              <a:t> </a:t>
-            </a:r>
-            <a:r>
-              <a:rPr sz="1800">
-                <a:solidFill>
-                  <a:srgbClr val="40A070"/>
-                </a:solidFill>
-                <a:latin typeface="Courier"/>
-              </a:rPr>
-              <a:t>15000</a:t>
-            </a:r>
-            <a:r>
-              <a:rPr sz="1800">
-                <a:latin typeface="Courier"/>
-              </a:rPr>
-              <a:t>) </a:t>
-            </a:r>
-            <a:r>
-              <a:rPr sz="1800">
-                <a:solidFill>
-                  <a:srgbClr val="666666"/>
-                </a:solidFill>
-                <a:latin typeface="Courier"/>
-              </a:rPr>
-              <a:t>+</a:t>
-            </a:r>
-            <a:br/>
-            <a:r>
-              <a:rPr sz="1800">
-                <a:solidFill>
-                  <a:srgbClr val="4070A0"/>
-                </a:solidFill>
-                <a:latin typeface="Courier"/>
-              </a:rPr>
-              <a:t>  </a:t>
-            </a:r>
-            <a:r>
-              <a:rPr sz="1800" b="1">
-                <a:solidFill>
-                  <a:srgbClr val="007020"/>
-                </a:solidFill>
-                <a:latin typeface="Courier"/>
-              </a:rPr>
-              <a:t>scale_fill_viridis_d</a:t>
-            </a:r>
-            <a:r>
-              <a:rPr sz="1800">
-                <a:latin typeface="Courier"/>
-              </a:rPr>
-              <a:t>(</a:t>
-            </a:r>
-            <a:r>
-              <a:rPr sz="1800">
-                <a:solidFill>
-                  <a:srgbClr val="902000"/>
-                </a:solidFill>
-                <a:latin typeface="Courier"/>
-              </a:rPr>
-              <a:t>option =</a:t>
-            </a:r>
-            <a:r>
-              <a:rPr sz="1800">
-                <a:latin typeface="Courier"/>
-              </a:rPr>
-              <a:t> params</a:t>
-            </a:r>
-            <a:r>
-              <a:rPr sz="1800">
-                <a:solidFill>
-                  <a:srgbClr val="666666"/>
-                </a:solidFill>
-                <a:latin typeface="Courier"/>
-              </a:rPr>
-              <a:t>$</a:t>
-            </a:r>
-            <a:r>
-              <a:rPr sz="1800">
-                <a:latin typeface="Courier"/>
-              </a:rPr>
-              <a:t>viridis_palette)</a:t>
-            </a:r>
-            <a:r>
-              <a:rPr sz="1800">
-                <a:solidFill>
-                  <a:srgbClr val="666666"/>
-                </a:solidFill>
-                <a:latin typeface="Courier"/>
-              </a:rPr>
-              <a:t>+</a:t>
-            </a:r>
-            <a:br/>
-            <a:r>
-              <a:rPr sz="1800">
-                <a:solidFill>
-                  <a:srgbClr val="4070A0"/>
-                </a:solidFill>
-                <a:latin typeface="Courier"/>
-              </a:rPr>
-              <a:t>  </a:t>
-            </a:r>
-            <a:r>
-              <a:rPr sz="1800" b="1">
-                <a:solidFill>
-                  <a:srgbClr val="007020"/>
-                </a:solidFill>
-                <a:latin typeface="Courier"/>
-              </a:rPr>
-              <a:t>scale_y_continuous</a:t>
-            </a:r>
-            <a:r>
-              <a:rPr sz="1800">
-                <a:latin typeface="Courier"/>
-              </a:rPr>
-              <a:t>(</a:t>
-            </a:r>
-            <a:r>
-              <a:rPr sz="1800">
-                <a:solidFill>
-                  <a:srgbClr val="902000"/>
-                </a:solidFill>
-                <a:latin typeface="Courier"/>
-              </a:rPr>
-              <a:t>labels =</a:t>
-            </a:r>
-            <a:r>
-              <a:rPr sz="1800">
-                <a:latin typeface="Courier"/>
-              </a:rPr>
-              <a:t> comma)</a:t>
-            </a:r>
-          </a:p>
-        </p:txBody>
-      </p:sp>
-    </p:spTree>
-  </p:cSld>
-</p:sld>
-</file>
-
-<file path=ppt/slides/slide11.xml><?xml version="1.0" encoding="utf-8"?>
-<p:sld xmlns:a="http://schemas.openxmlformats.org/drawingml/2006/main" xmlns:r="http://schemas.openxmlformats.org/officeDocument/2006/relationships" xmlns:p="http://schemas.openxmlformats.org/presentationml/2006/main">
-  <p:cSld>
-    <p:spTree>
-      <p:nvGrpSpPr>
-        <p:cNvPr id="1" name=""/>
-        <p:cNvGrpSpPr/>
-        <p:nvPr/>
-      </p:nvGrpSpPr>
-      <p:grpSpPr>
-        <a:xfrm>
-          <a:off x="0" y="0"/>
-          <a:ext cx="0" cy="0"/>
-          <a:chOff x="0" y="0"/>
-          <a:chExt cx="0" cy="0"/>
-        </a:xfrm>
-      </p:grpSpPr>
       <p:pic>
         <p:nvPicPr>
           <p:cNvPr descr="/Users/alison/rprojs/rmd-render-factory/gallery/outputs/slides/powerpoint_presentation_files/figure-pptx/unnamed-chunk-6-1.png" id="0" name="Picture 1"/>
@@ -3711,7 +3281,7 @@
 </p:sld>
 </file>
 
-<file path=ppt/slides/slide12.xml><?xml version="1.0" encoding="utf-8"?>
+<file path=ppt/slides/slide11.xml><?xml version="1.0" encoding="utf-8"?>
 <p:sld xmlns:a="http://schemas.openxmlformats.org/drawingml/2006/main" xmlns:r="http://schemas.openxmlformats.org/officeDocument/2006/relationships" xmlns:p="http://schemas.openxmlformats.org/presentationml/2006/main">
   <p:cSld>
     <p:spTree>
@@ -4112,7 +3682,7 @@
 </p:sld>
 </file>
 
-<file path=ppt/slides/slide13.xml><?xml version="1.0" encoding="utf-8"?>
+<file path=ppt/slides/slide12.xml><?xml version="1.0" encoding="utf-8"?>
 <p:sld xmlns:a="http://schemas.openxmlformats.org/drawingml/2006/main" xmlns:r="http://schemas.openxmlformats.org/officeDocument/2006/relationships" xmlns:p="http://schemas.openxmlformats.org/presentationml/2006/main">
   <p:cSld>
     <p:spTree>
@@ -4164,6 +3734,103 @@
 </p:sld>
 </file>
 
+<file path=ppt/slides/slide13.xml><?xml version="1.0" encoding="utf-8"?>
+<p:sld xmlns:a="http://schemas.openxmlformats.org/drawingml/2006/main" xmlns:r="http://schemas.openxmlformats.org/officeDocument/2006/relationships" xmlns:p="http://schemas.openxmlformats.org/presentationml/2006/main">
+  <p:cSld>
+    <p:spTree>
+      <p:nvGrpSpPr>
+        <p:cNvPr id="1" name=""/>
+        <p:cNvGrpSpPr/>
+        <p:nvPr/>
+      </p:nvGrpSpPr>
+      <p:grpSpPr>
+        <a:xfrm>
+          <a:off x="0" y="0"/>
+          <a:ext cx="0" cy="0"/>
+          <a:chOff x="0" y="0"/>
+          <a:chExt cx="0" cy="0"/>
+        </a:xfrm>
+      </p:grpSpPr>
+      <p:sp>
+        <p:nvSpPr>
+          <p:cNvPr id="2" name="Title 1"/>
+          <p:cNvSpPr>
+            <a:spLocks noGrp="1"/>
+          </p:cNvSpPr>
+          <p:nvPr>
+            <p:ph type="title"/>
+          </p:nvPr>
+        </p:nvSpPr>
+        <p:spPr/>
+        <p:txBody>
+          <a:bodyPr/>
+          <a:lstStyle/>
+          <a:p>
+            <a:pPr lvl="0" marL="0" indent="0">
+              <a:buNone/>
+            </a:pPr>
+            <a:r>
+              <a:rPr/>
+              <a:t>Thanks</a:t>
+            </a:r>
+            <a:r>
+              <a:rPr/>
+              <a:t> </a:t>
+            </a:r>
+            <a:r>
+              <a:rPr/>
+              <a:t>to…</a:t>
+            </a:r>
+          </a:p>
+        </p:txBody>
+      </p:sp>
+      <p:sp>
+        <p:nvSpPr>
+          <p:cNvPr id="3" name="Content Placeholder 2"/>
+          <p:cNvSpPr>
+            <a:spLocks noGrp="1"/>
+          </p:cNvSpPr>
+          <p:nvPr>
+            <p:ph idx="1"/>
+          </p:nvPr>
+        </p:nvSpPr>
+        <p:spPr/>
+        <p:txBody>
+          <a:bodyPr/>
+          <a:lstStyle/>
+          <a:p>
+            <a:pPr lvl="1"/>
+            <a:r>
+              <a:rPr/>
+              <a:t>Jennifer Thompson: </a:t>
+            </a:r>
+            <a:r>
+              <a:rPr>
+                <a:hlinkClick r:id="rId2"/>
+              </a:rPr>
+              <a:t>https://github.com/jenniferthompson/ParamRmdExample</a:t>
+            </a:r>
+          </a:p>
+          <a:p>
+            <a:pPr lvl="1"/>
+            <a:r>
+              <a:rPr/>
+              <a:t>Garrett Grolemund: </a:t>
+            </a:r>
+            <a:r>
+              <a:rPr>
+                <a:hlinkClick r:id="rId3"/>
+              </a:rPr>
+              <a:t>https://rmarkdown.rstudio.com/lesson-6.html</a:t>
+            </a:r>
+          </a:p>
+        </p:txBody>
+      </p:sp>
+    </p:spTree>
+  </p:cSld>
+</p:sld>
+</file>
+
 <file path=ppt/slides/slide2.xml><?xml version="1.0" encoding="utf-8"?>
 <p:sld xmlns:a="http://schemas.openxmlformats.org/drawingml/2006/main" xmlns:r="http://schemas.openxmlformats.org/officeDocument/2006/relationships" xmlns:p="http://schemas.openxmlformats.org/presentationml/2006/main">
   <p:cSld>
@@ -4183,6 +3850,31 @@
       </p:grpSpPr>
       <p:sp>
         <p:nvSpPr>
+          <p:cNvPr id="2" name="Title 1"/>
+          <p:cNvSpPr>
+            <a:spLocks noGrp="1"/>
+          </p:cNvSpPr>
+          <p:nvPr>
+            <p:ph type="title"/>
+          </p:nvPr>
+        </p:nvSpPr>
+        <p:spPr/>
+        <p:txBody>
+          <a:bodyPr/>
+          <a:lstStyle/>
+          <a:p>
+            <a:pPr lvl="0" marL="0" indent="0">
+              <a:buNone/>
+            </a:pPr>
+            <a:r>
+              <a:rPr/>
+              <a:t>Packages</a:t>
+            </a:r>
+          </a:p>
+        </p:txBody>
+      </p:sp>
+      <p:sp>
+        <p:nvSpPr>
           <p:cNvPr id="3" name="Content Placeholder 2"/>
           <p:cNvSpPr>
             <a:spLocks noGrp="1"/>
@@ -4201,13 +3893,81 @@
             </a:pPr>
             <a:r>
               <a:rPr/>
-              <a:t>Inspired by: </a:t>
-            </a:r>
-            <a:r>
-              <a:rPr>
-                <a:hlinkClick r:id="rId2"/>
-              </a:rPr>
-              <a:t>https://rmarkdown.rstudio.com/lesson-6.html</a:t>
+              <a:t>We’ll use </a:t>
+            </a:r>
+            <a:r>
+              <a:rPr sz="1800">
+                <a:latin typeface="Courier"/>
+              </a:rPr>
+              <a:t>ggplot2</a:t>
+            </a:r>
+            <a:r>
+              <a:rPr/>
+              <a:t> for visualization, and some light </a:t>
+            </a:r>
+            <a:r>
+              <a:rPr sz="1800">
+                <a:latin typeface="Courier"/>
+              </a:rPr>
+              <a:t>dplyr</a:t>
+            </a:r>
+            <a:r>
+              <a:rPr/>
+              <a:t> for data wrangling.</a:t>
+            </a:r>
+          </a:p>
+          <a:p>
+            <a:pPr lvl="0" marL="1270000" indent="0">
+              <a:buNone/>
+            </a:pPr>
+            <a:r>
+              <a:rPr sz="1800" b="1">
+                <a:solidFill>
+                  <a:srgbClr val="007020"/>
+                </a:solidFill>
+                <a:latin typeface="Courier"/>
+              </a:rPr>
+              <a:t>library</a:t>
+            </a:r>
+            <a:r>
+              <a:rPr sz="1800">
+                <a:latin typeface="Courier"/>
+              </a:rPr>
+              <a:t>(ggplot2) </a:t>
+            </a:r>
+            <a:r>
+              <a:rPr sz="1800" i="1">
+                <a:solidFill>
+                  <a:srgbClr val="60A0B0"/>
+                </a:solidFill>
+                <a:latin typeface="Courier"/>
+              </a:rPr>
+              <a:t># plotting</a:t>
+            </a:r>
+            <a:br/>
+            <a:r>
+              <a:rPr sz="1800" b="1">
+                <a:solidFill>
+                  <a:srgbClr val="007020"/>
+                </a:solidFill>
+                <a:latin typeface="Courier"/>
+              </a:rPr>
+              <a:t>library</a:t>
+            </a:r>
+            <a:r>
+              <a:rPr sz="1800">
+                <a:latin typeface="Courier"/>
+              </a:rPr>
+              <a:t>(dplyr) </a:t>
+            </a:r>
+            <a:r>
+              <a:rPr sz="1800" i="1">
+                <a:solidFill>
+                  <a:srgbClr val="60A0B0"/>
+                </a:solidFill>
+                <a:latin typeface="Courier"/>
+              </a:rPr>
+              <a:t># wrangling</a:t>
             </a:r>
           </a:p>
         </p:txBody>
@@ -4254,7 +4014,23 @@
             </a:pPr>
             <a:r>
               <a:rPr/>
-              <a:t>Packages</a:t>
+              <a:t>Texas</a:t>
+            </a:r>
+            <a:r>
+              <a:rPr/>
+              <a:t> </a:t>
+            </a:r>
+            <a:r>
+              <a:rPr/>
+              <a:t>housing</a:t>
+            </a:r>
+            <a:r>
+              <a:rPr/>
+              <a:t> </a:t>
+            </a:r>
+            <a:r>
+              <a:rPr/>
+              <a:t>data</a:t>
             </a:r>
           </a:p>
         </p:txBody>
@@ -4279,7 +4055,7 @@
             </a:pPr>
             <a:r>
               <a:rPr/>
-              <a:t>We’ll use </a:t>
+              <a:t>This data is loaded for you when you install and load the </a:t>
             </a:r>
             <a:r>
               <a:rPr sz="1800">
@@ -4289,17 +4065,7 @@
             </a:r>
             <a:r>
               <a:rPr/>
-              <a:t> for visualization, and some light </a:t>
-            </a:r>
-            <a:r>
-              <a:rPr sz="1800">
-                <a:latin typeface="Courier"/>
-              </a:rPr>
-              <a:t>dplyr</a:t>
-            </a:r>
-            <a:r>
-              <a:rPr/>
-              <a:t> for data wrangling.</a:t>
+              <a:t> package.</a:t>
             </a:r>
           </a:p>
           <a:p>
@@ -4307,28 +4073,176 @@
               <a:buNone/>
             </a:pPr>
             <a:r>
+              <a:rPr sz="1800">
+                <a:latin typeface="Courier"/>
+              </a:rPr>
+              <a:t>txsamp &lt;-</a:t>
+            </a:r>
+            <a:r>
+              <a:rPr sz="1800">
+                <a:solidFill>
+                  <a:srgbClr val="4070A0"/>
+                </a:solidFill>
+                <a:latin typeface="Courier"/>
+              </a:rPr>
+              <a:t> </a:t>
+            </a:r>
+            <a:r>
+              <a:rPr sz="1800">
+                <a:latin typeface="Courier"/>
+              </a:rPr>
+              <a:t>txhousing </a:t>
+            </a:r>
+            <a:r>
+              <a:rPr sz="1800">
+                <a:solidFill>
+                  <a:srgbClr val="666666"/>
+                </a:solidFill>
+                <a:latin typeface="Courier"/>
+              </a:rPr>
+              <a:t>%&gt;%</a:t>
+            </a:r>
+            <a:r>
+              <a:rPr sz="1800">
+                <a:solidFill>
+                  <a:srgbClr val="4070A0"/>
+                </a:solidFill>
+                <a:latin typeface="Courier"/>
+              </a:rPr>
+              <a:t> </a:t>
+            </a:r>
+            <a:br/>
+            <a:r>
+              <a:rPr sz="1800">
+                <a:solidFill>
+                  <a:srgbClr val="4070A0"/>
+                </a:solidFill>
+                <a:latin typeface="Courier"/>
+              </a:rPr>
+              <a:t>  </a:t>
+            </a:r>
+            <a:r>
               <a:rPr sz="1800" b="1">
                 <a:solidFill>
                   <a:srgbClr val="007020"/>
                 </a:solidFill>
                 <a:latin typeface="Courier"/>
               </a:rPr>
-              <a:t>library</a:t>
-            </a:r>
-            <a:r>
-              <a:rPr sz="1800">
-                <a:latin typeface="Courier"/>
-              </a:rPr>
-              <a:t>(ggplot2) </a:t>
-            </a:r>
-            <a:r>
-              <a:rPr sz="1800" i="1">
-                <a:solidFill>
-                  <a:srgbClr val="60A0B0"/>
-                </a:solidFill>
-                <a:latin typeface="Courier"/>
-              </a:rPr>
-              <a:t># plotting</a:t>
+              <a:t>filter</a:t>
+            </a:r>
+            <a:r>
+              <a:rPr sz="1800">
+                <a:latin typeface="Courier"/>
+              </a:rPr>
+              <a:t>(city </a:t>
+            </a:r>
+            <a:r>
+              <a:rPr sz="1800">
+                <a:solidFill>
+                  <a:srgbClr val="666666"/>
+                </a:solidFill>
+                <a:latin typeface="Courier"/>
+              </a:rPr>
+              <a:t>%in%</a:t>
+            </a:r>
+            <a:r>
+              <a:rPr sz="1800">
+                <a:solidFill>
+                  <a:srgbClr val="4070A0"/>
+                </a:solidFill>
+                <a:latin typeface="Courier"/>
+              </a:rPr>
+              <a:t> </a:t>
+            </a:r>
+            <a:r>
+              <a:rPr sz="1800" b="1">
+                <a:solidFill>
+                  <a:srgbClr val="007020"/>
+                </a:solidFill>
+                <a:latin typeface="Courier"/>
+              </a:rPr>
+              <a:t>c</a:t>
+            </a:r>
+            <a:r>
+              <a:rPr sz="1800">
+                <a:latin typeface="Courier"/>
+              </a:rPr>
+              <a:t>(</a:t>
+            </a:r>
+            <a:r>
+              <a:rPr sz="1800">
+                <a:solidFill>
+                  <a:srgbClr val="4070A0"/>
+                </a:solidFill>
+                <a:latin typeface="Courier"/>
+              </a:rPr>
+              <a:t>"Houston"</a:t>
+            </a:r>
+            <a:r>
+              <a:rPr sz="1800">
+                <a:latin typeface="Courier"/>
+              </a:rPr>
+              <a:t>, </a:t>
+            </a:r>
+            <a:r>
+              <a:rPr sz="1800">
+                <a:solidFill>
+                  <a:srgbClr val="4070A0"/>
+                </a:solidFill>
+                <a:latin typeface="Courier"/>
+              </a:rPr>
+              <a:t>"Fort Worth"</a:t>
+            </a:r>
+            <a:r>
+              <a:rPr sz="1800">
+                <a:latin typeface="Courier"/>
+              </a:rPr>
+              <a:t>, </a:t>
+            </a:r>
+            <a:r>
+              <a:rPr sz="1800">
+                <a:solidFill>
+                  <a:srgbClr val="4070A0"/>
+                </a:solidFill>
+                <a:latin typeface="Courier"/>
+              </a:rPr>
+              <a:t>"San Antonio"</a:t>
+            </a:r>
+            <a:r>
+              <a:rPr sz="1800">
+                <a:latin typeface="Courier"/>
+              </a:rPr>
+              <a:t>, </a:t>
+            </a:r>
+            <a:r>
+              <a:rPr sz="1800">
+                <a:solidFill>
+                  <a:srgbClr val="4070A0"/>
+                </a:solidFill>
+                <a:latin typeface="Courier"/>
+              </a:rPr>
+              <a:t>"Dallas"</a:t>
+            </a:r>
+            <a:r>
+              <a:rPr sz="1800">
+                <a:latin typeface="Courier"/>
+              </a:rPr>
+              <a:t>, </a:t>
+            </a:r>
+            <a:r>
+              <a:rPr sz="1800">
+                <a:solidFill>
+                  <a:srgbClr val="4070A0"/>
+                </a:solidFill>
+                <a:latin typeface="Courier"/>
+              </a:rPr>
+              <a:t>"Austin"</a:t>
+            </a:r>
+            <a:r>
+              <a:rPr sz="1800">
+                <a:latin typeface="Courier"/>
+              </a:rPr>
+              <a:t>))</a:t>
             </a:r>
             <a:br/>
             <a:r>
@@ -4338,22 +4252,34 @@
                 </a:solidFill>
                 <a:latin typeface="Courier"/>
               </a:rPr>
-              <a:t>library</a:t>
-            </a:r>
-            <a:r>
-              <a:rPr sz="1800">
-                <a:latin typeface="Courier"/>
-              </a:rPr>
-              <a:t>(dplyr) </a:t>
-            </a:r>
-            <a:r>
-              <a:rPr sz="1800" i="1">
-                <a:solidFill>
-                  <a:srgbClr val="60A0B0"/>
-                </a:solidFill>
-                <a:latin typeface="Courier"/>
-              </a:rPr>
-              <a:t># wrangling</a:t>
+              <a:t>glimpse</a:t>
+            </a:r>
+            <a:r>
+              <a:rPr sz="1800">
+                <a:latin typeface="Courier"/>
+              </a:rPr>
+              <a:t>(txsamp)</a:t>
+            </a:r>
+          </a:p>
+          <a:p>
+            <a:pPr lvl="0" marL="1270000" indent="0">
+              <a:buNone/>
+            </a:pPr>
+            <a:r>
+              <a:rPr sz="1800">
+                <a:latin typeface="Courier"/>
+              </a:rPr>
+              <a:t>## Observations: 935
+## Variables: 9
+## $ city      &lt;chr&gt; "Austin", "Austin", "Austin", "Austin", "Austin", "Aus…
+## $ year      &lt;int&gt; 2000, 2000, 2000, 2000, 2000, 2000, 2000, 2000, 2000, …
+## $ month     &lt;int&gt; 1, 2, 3, 4, 5, 6, 7, 8, 9, 10, 11, 12, 1, 2, 3, 4, 5, …
+## $ sales     &lt;dbl&gt; 1025, 1277, 1603, 1556, 1980, 1885, 1818, 1880, 1498, …
+## $ volume    &lt;dbl&gt; 173053635, 226038438, 298557656, 289197960, 393073774,…
+## $ median    &lt;dbl&gt; 133700, 134000, 136700, 136900, 144700, 148800, 149300…
+## $ listings  &lt;dbl&gt; 3084, 2989, 3042, 3192, 3617, 3799, 3944, 3948, 4058, …
+## $ inventory &lt;dbl&gt; 2.0, 2.0, 2.0, 2.1, 2.3, 2.4, 2.6, 2.6, 2.6, 2.6, 2.7,…
+## $ date      &lt;dbl&gt; 2000.000, 2000.083, 2000.167, 2000.250, 2000.333, 2000…</a:t>
             </a:r>
           </a:p>
         </p:txBody>
@@ -4400,7 +4326,7 @@
             </a:pPr>
             <a:r>
               <a:rPr/>
-              <a:t>Texas</a:t>
+              <a:t>Our</a:t>
             </a:r>
             <a:r>
               <a:rPr/>
@@ -4408,7 +4334,7 @@
             </a:r>
             <a:r>
               <a:rPr/>
-              <a:t>housing</a:t>
+              <a:t>data</a:t>
             </a:r>
             <a:r>
               <a:rPr/>
@@ -4416,7 +4342,15 @@
             </a:r>
             <a:r>
               <a:rPr/>
-              <a:t>data</a:t>
+              <a:t>is</a:t>
+            </a:r>
+            <a:r>
+              <a:rPr/>
+              <a:t> </a:t>
+            </a:r>
+            <a:r>
+              <a:rPr/>
+              <a:t>monthly</a:t>
             </a:r>
           </a:p>
         </p:txBody>
@@ -4441,17 +4375,7 @@
             </a:pPr>
             <a:r>
               <a:rPr/>
-              <a:t>This data is loaded for you when you install and load the </a:t>
-            </a:r>
-            <a:r>
-              <a:rPr sz="1800">
-                <a:latin typeface="Courier"/>
-              </a:rPr>
-              <a:t>ggplot2</a:t>
-            </a:r>
-            <a:r>
-              <a:rPr/>
-              <a:t> package.</a:t>
+              <a:t>Here is just a sample of rows from one city to show that we have data for each of the 12 months for each year, except for 2015.</a:t>
             </a:r>
           </a:p>
           <a:p>
@@ -4462,7 +4386,16 @@
               <a:rPr sz="1800">
                 <a:latin typeface="Courier"/>
               </a:rPr>
-              <a:t>txsamp &lt;-</a:t>
+              <a:t>txsamp </a:t>
+            </a:r>
+            <a:r>
+              <a:rPr sz="1800">
+                <a:solidFill>
+                  <a:srgbClr val="666666"/>
+                </a:solidFill>
+                <a:latin typeface="Courier"/>
+              </a:rPr>
+              <a:t>%&gt;%</a:t>
             </a:r>
             <a:r>
               <a:rPr sz="1800">
@@ -4473,11 +4406,30 @@
               </a:rPr>
               <a:t> </a:t>
             </a:r>
-            <a:r>
-              <a:rPr sz="1800">
-                <a:latin typeface="Courier"/>
-              </a:rPr>
-              <a:t>txhousing </a:t>
+            <a:br/>
+            <a:r>
+              <a:rPr sz="1800">
+                <a:solidFill>
+                  <a:srgbClr val="4070A0"/>
+                </a:solidFill>
+                <a:latin typeface="Courier"/>
+              </a:rPr>
+              <a:t>  </a:t>
+            </a:r>
+            <a:r>
+              <a:rPr sz="1800" b="1">
+                <a:solidFill>
+                  <a:srgbClr val="007020"/>
+                </a:solidFill>
+                <a:latin typeface="Courier"/>
+              </a:rPr>
+              <a:t>filter</a:t>
+            </a:r>
+            <a:r>
+              <a:rPr sz="1800">
+                <a:latin typeface="Courier"/>
+              </a:rPr>
+              <a:t>(city </a:t>
             </a:r>
             <a:r>
               <a:rPr sz="1800">
@@ -4486,6 +4438,30 @@
                 </a:solidFill>
                 <a:latin typeface="Courier"/>
               </a:rPr>
+              <a:t>==</a:t>
+            </a:r>
+            <a:r>
+              <a:rPr sz="1800">
+                <a:solidFill>
+                  <a:srgbClr val="4070A0"/>
+                </a:solidFill>
+                <a:latin typeface="Courier"/>
+              </a:rPr>
+              <a:t> "Austin"</a:t>
+            </a:r>
+            <a:r>
+              <a:rPr sz="1800">
+                <a:latin typeface="Courier"/>
+              </a:rPr>
+              <a:t>) </a:t>
+            </a:r>
+            <a:r>
+              <a:rPr sz="1800">
+                <a:solidFill>
+                  <a:srgbClr val="666666"/>
+                </a:solidFill>
+                <a:latin typeface="Courier"/>
+              </a:rPr>
               <a:t>%&gt;%</a:t>
             </a:r>
             <a:r>
@@ -4514,137 +4490,13 @@
                 </a:solidFill>
                 <a:latin typeface="Courier"/>
               </a:rPr>
-              <a:t>filter</a:t>
-            </a:r>
-            <a:r>
-              <a:rPr sz="1800">
-                <a:latin typeface="Courier"/>
-              </a:rPr>
-              <a:t>(city </a:t>
-            </a:r>
-            <a:r>
-              <a:rPr sz="1800">
-                <a:solidFill>
-                  <a:srgbClr val="666666"/>
-                </a:solidFill>
-                <a:latin typeface="Courier"/>
-              </a:rPr>
-              <a:t>%in%</a:t>
-            </a:r>
-            <a:r>
-              <a:rPr sz="1800">
-                <a:solidFill>
-                  <a:srgbClr val="4070A0"/>
-                </a:solidFill>
-                <a:latin typeface="Courier"/>
-              </a:rPr>
-              <a:t> </a:t>
-            </a:r>
-            <a:r>
-              <a:rPr sz="1800" b="1">
-                <a:solidFill>
-                  <a:srgbClr val="007020"/>
-                </a:solidFill>
-                <a:latin typeface="Courier"/>
-              </a:rPr>
-              <a:t>c</a:t>
-            </a:r>
-            <a:r>
-              <a:rPr sz="1800">
-                <a:latin typeface="Courier"/>
-              </a:rPr>
-              <a:t>(</a:t>
-            </a:r>
-            <a:r>
-              <a:rPr sz="1800">
-                <a:solidFill>
-                  <a:srgbClr val="4070A0"/>
-                </a:solidFill>
-                <a:latin typeface="Courier"/>
-              </a:rPr>
-              <a:t>"Houston"</a:t>
-            </a:r>
-            <a:r>
-              <a:rPr sz="1800">
-                <a:latin typeface="Courier"/>
-              </a:rPr>
-              <a:t>, </a:t>
-            </a:r>
-            <a:r>
-              <a:rPr sz="1800">
-                <a:solidFill>
-                  <a:srgbClr val="4070A0"/>
-                </a:solidFill>
-                <a:latin typeface="Courier"/>
-              </a:rPr>
-              <a:t>"Fort Worth"</a:t>
-            </a:r>
-            <a:r>
-              <a:rPr sz="1800">
-                <a:latin typeface="Courier"/>
-              </a:rPr>
-              <a:t>, </a:t>
-            </a:r>
-            <a:r>
-              <a:rPr sz="1800">
-                <a:solidFill>
-                  <a:srgbClr val="4070A0"/>
-                </a:solidFill>
-                <a:latin typeface="Courier"/>
-              </a:rPr>
-              <a:t>"San Antonio"</a:t>
-            </a:r>
-            <a:r>
-              <a:rPr sz="1800">
-                <a:latin typeface="Courier"/>
-              </a:rPr>
-              <a:t>, </a:t>
-            </a:r>
-            <a:r>
-              <a:rPr sz="1800">
-                <a:solidFill>
-                  <a:srgbClr val="4070A0"/>
-                </a:solidFill>
-                <a:latin typeface="Courier"/>
-              </a:rPr>
-              <a:t>"Dallas"</a:t>
-            </a:r>
-            <a:r>
-              <a:rPr sz="1800">
-                <a:latin typeface="Courier"/>
-              </a:rPr>
-              <a:t>, </a:t>
-            </a:r>
-            <a:r>
-              <a:rPr sz="1800">
-                <a:solidFill>
-                  <a:srgbClr val="4070A0"/>
-                </a:solidFill>
-                <a:latin typeface="Courier"/>
-              </a:rPr>
-              <a:t>"Austin"</a:t>
-            </a:r>
-            <a:r>
-              <a:rPr sz="1800">
-                <a:latin typeface="Courier"/>
-              </a:rPr>
-              <a:t>))</a:t>
-            </a:r>
-            <a:br/>
-            <a:r>
-              <a:rPr sz="1800" b="1">
-                <a:solidFill>
-                  <a:srgbClr val="007020"/>
-                </a:solidFill>
-                <a:latin typeface="Courier"/>
-              </a:rPr>
-              <a:t>glimpse</a:t>
-            </a:r>
-            <a:r>
-              <a:rPr sz="1800">
-                <a:latin typeface="Courier"/>
-              </a:rPr>
-              <a:t>(txsamp)</a:t>
+              <a:t>count</a:t>
+            </a:r>
+            <a:r>
+              <a:rPr sz="1800">
+                <a:latin typeface="Courier"/>
+              </a:rPr>
+              <a:t>(year)</a:t>
             </a:r>
           </a:p>
           <a:p>
@@ -4655,17 +4507,25 @@
               <a:rPr sz="1800">
                 <a:latin typeface="Courier"/>
               </a:rPr>
-              <a:t>## Observations: 935
-## Variables: 9
-## $ city      &lt;chr&gt; "Austin", "Austin", "Austin", "Austin", "Austin", "Aus…
-## $ year      &lt;int&gt; 2000, 2000, 2000, 2000, 2000, 2000, 2000, 2000, 2000, …
-## $ month     &lt;int&gt; 1, 2, 3, 4, 5, 6, 7, 8, 9, 10, 11, 12, 1, 2, 3, 4, 5, …
-## $ sales     &lt;dbl&gt; 1025, 1277, 1603, 1556, 1980, 1885, 1818, 1880, 1498, …
-## $ volume    &lt;dbl&gt; 173053635, 226038438, 298557656, 289197960, 393073774,…
-## $ median    &lt;dbl&gt; 133700, 134000, 136700, 136900, 144700, 148800, 149300…
-## $ listings  &lt;dbl&gt; 3084, 2989, 3042, 3192, 3617, 3799, 3944, 3948, 4058, …
-## $ inventory &lt;dbl&gt; 2.0, 2.0, 2.0, 2.1, 2.3, 2.4, 2.6, 2.6, 2.6, 2.6, 2.7,…
-## $ date      &lt;dbl&gt; 2000.000, 2000.083, 2000.167, 2000.250, 2000.333, 2000…</a:t>
+              <a:t>## # A tibble: 16 x 2
+##     year     n
+##    &lt;int&gt; &lt;int&gt;
+##  1  2000    12
+##  2  2001    12
+##  3  2002    12
+##  4  2003    12
+##  5  2004    12
+##  6  2005    12
+##  7  2006    12
+##  8  2007    12
+##  9  2008    12
+## 10  2009    12
+## 11  2010    12
+## 12  2011    12
+## 13  2012    12
+## 14  2013    12
+## 15  2014    12
+## 16  2015     7</a:t>
             </a:r>
           </a:p>
         </p:txBody>
@@ -4712,7 +4572,7 @@
             </a:pPr>
             <a:r>
               <a:rPr/>
-              <a:t>Our</a:t>
+              <a:t>Austin</a:t>
             </a:r>
             <a:r>
               <a:rPr/>
@@ -4720,7 +4580,7 @@
             </a:r>
             <a:r>
               <a:rPr/>
-              <a:t>data</a:t>
+              <a:t>is</a:t>
             </a:r>
             <a:r>
               <a:rPr/>
@@ -4728,51 +4588,240 @@
             </a:r>
             <a:r>
               <a:rPr/>
-              <a:t>is</a:t>
-            </a:r>
-            <a:r>
-              <a:rPr/>
+              <a:t>expensive</a:t>
+            </a:r>
+          </a:p>
+        </p:txBody>
+      </p:sp>
+      <p:sp>
+        <p:nvSpPr>
+          <p:cNvPr id="3" name="Content Placeholder 2"/>
+          <p:cNvSpPr>
+            <a:spLocks noGrp="1"/>
+          </p:cNvSpPr>
+          <p:nvPr>
+            <p:ph idx="1"/>
+          </p:nvPr>
+        </p:nvSpPr>
+        <p:spPr/>
+        <p:txBody>
+          <a:bodyPr/>
+          <a:lstStyle/>
+          <a:p>
+            <a:pPr lvl="0" marL="1270000" indent="0">
+              <a:buNone/>
+            </a:pPr>
+            <a:r>
+              <a:rPr sz="1800" b="1">
+                <a:solidFill>
+                  <a:srgbClr val="007020"/>
+                </a:solidFill>
+                <a:latin typeface="Courier"/>
+              </a:rPr>
+              <a:t>ggplot</a:t>
+            </a:r>
+            <a:r>
+              <a:rPr sz="1800">
+                <a:latin typeface="Courier"/>
+              </a:rPr>
+              <a:t>(</a:t>
+            </a:r>
+            <a:r>
+              <a:rPr sz="1800">
+                <a:solidFill>
+                  <a:srgbClr val="902000"/>
+                </a:solidFill>
+                <a:latin typeface="Courier"/>
+              </a:rPr>
+              <a:t>data =</a:t>
+            </a:r>
+            <a:r>
+              <a:rPr sz="1800">
+                <a:latin typeface="Courier"/>
+              </a:rPr>
+              <a:t> txsamp, </a:t>
+            </a:r>
+            <a:r>
+              <a:rPr sz="1800" b="1">
+                <a:solidFill>
+                  <a:srgbClr val="007020"/>
+                </a:solidFill>
+                <a:latin typeface="Courier"/>
+              </a:rPr>
+              <a:t>aes</a:t>
+            </a:r>
+            <a:r>
+              <a:rPr sz="1800">
+                <a:latin typeface="Courier"/>
+              </a:rPr>
+              <a:t>(</a:t>
+            </a:r>
+            <a:r>
+              <a:rPr sz="1800">
+                <a:solidFill>
+                  <a:srgbClr val="902000"/>
+                </a:solidFill>
+                <a:latin typeface="Courier"/>
+              </a:rPr>
+              <a:t>x =</a:t>
+            </a:r>
+            <a:r>
+              <a:rPr sz="1800">
+                <a:latin typeface="Courier"/>
+              </a:rPr>
+              <a:t> sales, </a:t>
+            </a:r>
+            <a:r>
+              <a:rPr sz="1800">
+                <a:solidFill>
+                  <a:srgbClr val="902000"/>
+                </a:solidFill>
+                <a:latin typeface="Courier"/>
+              </a:rPr>
+              <a:t>y =</a:t>
+            </a:r>
+            <a:r>
+              <a:rPr sz="1800">
+                <a:latin typeface="Courier"/>
+              </a:rPr>
+              <a:t> median)) </a:t>
+            </a:r>
+            <a:r>
+              <a:rPr sz="1800">
+                <a:solidFill>
+                  <a:srgbClr val="666666"/>
+                </a:solidFill>
+                <a:latin typeface="Courier"/>
+              </a:rPr>
+              <a:t>+</a:t>
+            </a:r>
+            <a:br/>
+            <a:r>
+              <a:rPr sz="1800">
+                <a:solidFill>
+                  <a:srgbClr val="4070A0"/>
+                </a:solidFill>
+                <a:latin typeface="Courier"/>
+              </a:rPr>
+              <a:t>   </a:t>
+            </a:r>
+            <a:r>
+              <a:rPr sz="1800" b="1">
+                <a:solidFill>
+                  <a:srgbClr val="007020"/>
+                </a:solidFill>
+                <a:latin typeface="Courier"/>
+              </a:rPr>
+              <a:t>geom_point</a:t>
+            </a:r>
+            <a:r>
+              <a:rPr sz="1800">
+                <a:latin typeface="Courier"/>
+              </a:rPr>
+              <a:t>(</a:t>
+            </a:r>
+            <a:r>
+              <a:rPr sz="1800" b="1">
+                <a:solidFill>
+                  <a:srgbClr val="007020"/>
+                </a:solidFill>
+                <a:latin typeface="Courier"/>
+              </a:rPr>
+              <a:t>aes</a:t>
+            </a:r>
+            <a:r>
+              <a:rPr sz="1800">
+                <a:latin typeface="Courier"/>
+              </a:rPr>
+              <a:t>(</a:t>
+            </a:r>
+            <a:r>
+              <a:rPr sz="1800">
+                <a:solidFill>
+                  <a:srgbClr val="902000"/>
+                </a:solidFill>
+                <a:latin typeface="Courier"/>
+              </a:rPr>
+              <a:t>colour =</a:t>
+            </a:r>
+            <a:r>
+              <a:rPr sz="1800">
+                <a:latin typeface="Courier"/>
+              </a:rPr>
+              <a:t> city)) </a:t>
+            </a:r>
+            <a:r>
+              <a:rPr sz="1800">
+                <a:solidFill>
+                  <a:srgbClr val="666666"/>
+                </a:solidFill>
+                <a:latin typeface="Courier"/>
+              </a:rPr>
+              <a:t>+</a:t>
+            </a:r>
+            <a:r>
+              <a:rPr sz="1800">
+                <a:solidFill>
+                  <a:srgbClr val="4070A0"/>
+                </a:solidFill>
+                <a:latin typeface="Courier"/>
+              </a:rPr>
               <a:t> </a:t>
             </a:r>
-            <a:r>
-              <a:rPr/>
-              <a:t>monthly</a:t>
-            </a:r>
-          </a:p>
-        </p:txBody>
-      </p:sp>
-      <p:sp>
-        <p:nvSpPr>
-          <p:cNvPr id="3" name="Content Placeholder 2"/>
-          <p:cNvSpPr>
-            <a:spLocks noGrp="1"/>
-          </p:cNvSpPr>
-          <p:nvPr>
-            <p:ph idx="1"/>
-          </p:nvPr>
-        </p:nvSpPr>
-        <p:spPr/>
-        <p:txBody>
-          <a:bodyPr/>
-          <a:lstStyle/>
-          <a:p>
-            <a:pPr lvl="0" marL="0" indent="0">
-              <a:buNone/>
-            </a:pPr>
-            <a:r>
-              <a:rPr/>
-              <a:t>Here is just a sample of rows from one city to show that we have data for each of the 12 months for each year, except for 2015.</a:t>
-            </a:r>
-          </a:p>
-          <a:p>
-            <a:pPr lvl="0" marL="1270000" indent="0">
-              <a:buNone/>
-            </a:pPr>
-            <a:r>
-              <a:rPr sz="1800">
-                <a:latin typeface="Courier"/>
-              </a:rPr>
-              <a:t>txsamp </a:t>
+            <a:br/>
+            <a:r>
+              <a:rPr sz="1800">
+                <a:solidFill>
+                  <a:srgbClr val="4070A0"/>
+                </a:solidFill>
+                <a:latin typeface="Courier"/>
+              </a:rPr>
+              <a:t>   </a:t>
+            </a:r>
+            <a:r>
+              <a:rPr sz="1800" b="1">
+                <a:solidFill>
+                  <a:srgbClr val="007020"/>
+                </a:solidFill>
+                <a:latin typeface="Courier"/>
+              </a:rPr>
+              <a:t>scale_colour_viridis_d</a:t>
+            </a:r>
+            <a:r>
+              <a:rPr sz="1800">
+                <a:latin typeface="Courier"/>
+              </a:rPr>
+              <a:t>(</a:t>
+            </a:r>
+            <a:r>
+              <a:rPr sz="1800">
+                <a:solidFill>
+                  <a:srgbClr val="4070A0"/>
+                </a:solidFill>
+                <a:latin typeface="Courier"/>
+              </a:rPr>
+              <a:t>"City\nCenter"</a:t>
+            </a:r>
+            <a:r>
+              <a:rPr sz="1800">
+                <a:latin typeface="Courier"/>
+              </a:rPr>
+              <a:t>, </a:t>
+            </a:r>
+            <a:r>
+              <a:rPr sz="1800">
+                <a:solidFill>
+                  <a:srgbClr val="902000"/>
+                </a:solidFill>
+                <a:latin typeface="Courier"/>
+              </a:rPr>
+              <a:t>option =</a:t>
+            </a:r>
+            <a:r>
+              <a:rPr sz="1800">
+                <a:latin typeface="Courier"/>
+              </a:rPr>
+              <a:t> params</a:t>
             </a:r>
             <a:r>
               <a:rPr sz="1800">
@@ -4781,137 +4830,13 @@
                 </a:solidFill>
                 <a:latin typeface="Courier"/>
               </a:rPr>
-              <a:t>%&gt;%</a:t>
-            </a:r>
-            <a:r>
-              <a:rPr sz="1800">
-                <a:solidFill>
-                  <a:srgbClr val="4070A0"/>
-                </a:solidFill>
-                <a:latin typeface="Courier"/>
-              </a:rPr>
-              <a:t> </a:t>
-            </a:r>
-            <a:br/>
-            <a:r>
-              <a:rPr sz="1800">
-                <a:solidFill>
-                  <a:srgbClr val="4070A0"/>
-                </a:solidFill>
-                <a:latin typeface="Courier"/>
-              </a:rPr>
-              <a:t>  </a:t>
-            </a:r>
-            <a:r>
-              <a:rPr sz="1800" b="1">
-                <a:solidFill>
-                  <a:srgbClr val="007020"/>
-                </a:solidFill>
-                <a:latin typeface="Courier"/>
-              </a:rPr>
-              <a:t>filter</a:t>
-            </a:r>
-            <a:r>
-              <a:rPr sz="1800">
-                <a:latin typeface="Courier"/>
-              </a:rPr>
-              <a:t>(city </a:t>
-            </a:r>
-            <a:r>
-              <a:rPr sz="1800">
-                <a:solidFill>
-                  <a:srgbClr val="666666"/>
-                </a:solidFill>
-                <a:latin typeface="Courier"/>
-              </a:rPr>
-              <a:t>==</a:t>
-            </a:r>
-            <a:r>
-              <a:rPr sz="1800">
-                <a:solidFill>
-                  <a:srgbClr val="4070A0"/>
-                </a:solidFill>
-                <a:latin typeface="Courier"/>
-              </a:rPr>
-              <a:t> "Austin"</a:t>
-            </a:r>
-            <a:r>
-              <a:rPr sz="1800">
-                <a:latin typeface="Courier"/>
-              </a:rPr>
-              <a:t>) </a:t>
-            </a:r>
-            <a:r>
-              <a:rPr sz="1800">
-                <a:solidFill>
-                  <a:srgbClr val="666666"/>
-                </a:solidFill>
-                <a:latin typeface="Courier"/>
-              </a:rPr>
-              <a:t>%&gt;%</a:t>
-            </a:r>
-            <a:r>
-              <a:rPr sz="1800">
-                <a:solidFill>
-                  <a:srgbClr val="4070A0"/>
-                </a:solidFill>
-                <a:latin typeface="Courier"/>
-              </a:rPr>
-              <a:t> </a:t>
-            </a:r>
-            <a:br/>
-            <a:r>
-              <a:rPr sz="1800">
-                <a:solidFill>
-                  <a:srgbClr val="4070A0"/>
-                </a:solidFill>
-                <a:latin typeface="Courier"/>
-              </a:rPr>
-              <a:t>  </a:t>
-            </a:r>
-            <a:r>
-              <a:rPr sz="1800" b="1">
-                <a:solidFill>
-                  <a:srgbClr val="007020"/>
-                </a:solidFill>
-                <a:latin typeface="Courier"/>
-              </a:rPr>
-              <a:t>count</a:t>
-            </a:r>
-            <a:r>
-              <a:rPr sz="1800">
-                <a:latin typeface="Courier"/>
-              </a:rPr>
-              <a:t>(year)</a:t>
-            </a:r>
-          </a:p>
-          <a:p>
-            <a:pPr lvl="0" marL="1270000" indent="0">
-              <a:buNone/>
-            </a:pPr>
-            <a:r>
-              <a:rPr sz="1800">
-                <a:latin typeface="Courier"/>
-              </a:rPr>
-              <a:t>## # A tibble: 16 x 2
-##     year     n
-##    &lt;int&gt; &lt;int&gt;
-##  1  2000    12
-##  2  2001    12
-##  3  2002    12
-##  4  2003    12
-##  5  2004    12
-##  6  2005    12
-##  7  2006    12
-##  8  2007    12
-##  9  2008    12
-## 10  2009    12
-## 11  2010    12
-## 12  2011    12
-## 13  2012    12
-## 14  2013    12
-## 15  2014    12
-## 16  2015     7</a:t>
+              <a:t>$</a:t>
+            </a:r>
+            <a:r>
+              <a:rPr sz="1800">
+                <a:latin typeface="Courier"/>
+              </a:rPr>
+              <a:t>viridis_palette)</a:t>
             </a:r>
           </a:p>
         </p:txBody>
@@ -4922,317 +4847,6 @@
 </file>
 
 <file path=ppt/slides/slide6.xml><?xml version="1.0" encoding="utf-8"?>
-<p:sld xmlns:a="http://schemas.openxmlformats.org/drawingml/2006/main" xmlns:r="http://schemas.openxmlformats.org/officeDocument/2006/relationships" xmlns:p="http://schemas.openxmlformats.org/presentationml/2006/main">
-  <p:cSld>
-    <p:spTree>
-      <p:nvGrpSpPr>
-        <p:cNvPr id="1" name=""/>
-        <p:cNvGrpSpPr/>
-        <p:nvPr/>
-      </p:nvGrpSpPr>
-      <p:grpSpPr>
-        <a:xfrm>
-          <a:off x="0" y="0"/>
-          <a:ext cx="0" cy="0"/>
-          <a:chOff x="0" y="0"/>
-          <a:chExt cx="0" cy="0"/>
-        </a:xfrm>
-      </p:grpSpPr>
-      <p:sp>
-        <p:nvSpPr>
-          <p:cNvPr id="2" name="Title 1"/>
-          <p:cNvSpPr>
-            <a:spLocks noGrp="1"/>
-          </p:cNvSpPr>
-          <p:nvPr>
-            <p:ph type="title"/>
-          </p:nvPr>
-        </p:nvSpPr>
-        <p:spPr/>
-        <p:txBody>
-          <a:bodyPr/>
-          <a:lstStyle/>
-          <a:p>
-            <a:pPr lvl="0" marL="0" indent="0">
-              <a:buNone/>
-            </a:pPr>
-            <a:r>
-              <a:rPr/>
-              <a:t>Austin</a:t>
-            </a:r>
-            <a:r>
-              <a:rPr/>
-              <a:t> </a:t>
-            </a:r>
-            <a:r>
-              <a:rPr/>
-              <a:t>is</a:t>
-            </a:r>
-            <a:r>
-              <a:rPr/>
-              <a:t> </a:t>
-            </a:r>
-            <a:r>
-              <a:rPr/>
-              <a:t>expensive</a:t>
-            </a:r>
-          </a:p>
-        </p:txBody>
-      </p:sp>
-      <p:sp>
-        <p:nvSpPr>
-          <p:cNvPr id="3" name="Content Placeholder 2"/>
-          <p:cNvSpPr>
-            <a:spLocks noGrp="1"/>
-          </p:cNvSpPr>
-          <p:nvPr>
-            <p:ph idx="1"/>
-          </p:nvPr>
-        </p:nvSpPr>
-        <p:spPr/>
-        <p:txBody>
-          <a:bodyPr/>
-          <a:lstStyle/>
-          <a:p>
-            <a:pPr lvl="0" marL="1270000" indent="0">
-              <a:buNone/>
-            </a:pPr>
-            <a:r>
-              <a:rPr sz="1800" b="1">
-                <a:solidFill>
-                  <a:srgbClr val="007020"/>
-                </a:solidFill>
-                <a:latin typeface="Courier"/>
-              </a:rPr>
-              <a:t>ggplot</a:t>
-            </a:r>
-            <a:r>
-              <a:rPr sz="1800">
-                <a:latin typeface="Courier"/>
-              </a:rPr>
-              <a:t>(</a:t>
-            </a:r>
-            <a:r>
-              <a:rPr sz="1800">
-                <a:solidFill>
-                  <a:srgbClr val="902000"/>
-                </a:solidFill>
-                <a:latin typeface="Courier"/>
-              </a:rPr>
-              <a:t>data =</a:t>
-            </a:r>
-            <a:r>
-              <a:rPr sz="1800">
-                <a:latin typeface="Courier"/>
-              </a:rPr>
-              <a:t> txsamp, </a:t>
-            </a:r>
-            <a:r>
-              <a:rPr sz="1800" b="1">
-                <a:solidFill>
-                  <a:srgbClr val="007020"/>
-                </a:solidFill>
-                <a:latin typeface="Courier"/>
-              </a:rPr>
-              <a:t>aes</a:t>
-            </a:r>
-            <a:r>
-              <a:rPr sz="1800">
-                <a:latin typeface="Courier"/>
-              </a:rPr>
-              <a:t>(</a:t>
-            </a:r>
-            <a:r>
-              <a:rPr sz="1800">
-                <a:solidFill>
-                  <a:srgbClr val="902000"/>
-                </a:solidFill>
-                <a:latin typeface="Courier"/>
-              </a:rPr>
-              <a:t>x =</a:t>
-            </a:r>
-            <a:r>
-              <a:rPr sz="1800">
-                <a:latin typeface="Courier"/>
-              </a:rPr>
-              <a:t> sales, </a:t>
-            </a:r>
-            <a:r>
-              <a:rPr sz="1800">
-                <a:solidFill>
-                  <a:srgbClr val="902000"/>
-                </a:solidFill>
-                <a:latin typeface="Courier"/>
-              </a:rPr>
-              <a:t>y =</a:t>
-            </a:r>
-            <a:r>
-              <a:rPr sz="1800">
-                <a:latin typeface="Courier"/>
-              </a:rPr>
-              <a:t> median)) </a:t>
-            </a:r>
-            <a:r>
-              <a:rPr sz="1800">
-                <a:solidFill>
-                  <a:srgbClr val="666666"/>
-                </a:solidFill>
-                <a:latin typeface="Courier"/>
-              </a:rPr>
-              <a:t>+</a:t>
-            </a:r>
-            <a:br/>
-            <a:r>
-              <a:rPr sz="1800">
-                <a:solidFill>
-                  <a:srgbClr val="4070A0"/>
-                </a:solidFill>
-                <a:latin typeface="Courier"/>
-              </a:rPr>
-              <a:t>   </a:t>
-            </a:r>
-            <a:r>
-              <a:rPr sz="1800" b="1">
-                <a:solidFill>
-                  <a:srgbClr val="007020"/>
-                </a:solidFill>
-                <a:latin typeface="Courier"/>
-              </a:rPr>
-              <a:t>geom_point</a:t>
-            </a:r>
-            <a:r>
-              <a:rPr sz="1800">
-                <a:latin typeface="Courier"/>
-              </a:rPr>
-              <a:t>(</a:t>
-            </a:r>
-            <a:r>
-              <a:rPr sz="1800" b="1">
-                <a:solidFill>
-                  <a:srgbClr val="007020"/>
-                </a:solidFill>
-                <a:latin typeface="Courier"/>
-              </a:rPr>
-              <a:t>aes</a:t>
-            </a:r>
-            <a:r>
-              <a:rPr sz="1800">
-                <a:latin typeface="Courier"/>
-              </a:rPr>
-              <a:t>(</a:t>
-            </a:r>
-            <a:r>
-              <a:rPr sz="1800">
-                <a:solidFill>
-                  <a:srgbClr val="902000"/>
-                </a:solidFill>
-                <a:latin typeface="Courier"/>
-              </a:rPr>
-              <a:t>colour =</a:t>
-            </a:r>
-            <a:r>
-              <a:rPr sz="1800">
-                <a:latin typeface="Courier"/>
-              </a:rPr>
-              <a:t> city)) </a:t>
-            </a:r>
-            <a:r>
-              <a:rPr sz="1800">
-                <a:solidFill>
-                  <a:srgbClr val="666666"/>
-                </a:solidFill>
-                <a:latin typeface="Courier"/>
-              </a:rPr>
-              <a:t>+</a:t>
-            </a:r>
-            <a:r>
-              <a:rPr sz="1800">
-                <a:solidFill>
-                  <a:srgbClr val="4070A0"/>
-                </a:solidFill>
-                <a:latin typeface="Courier"/>
-              </a:rPr>
-              <a:t> </a:t>
-            </a:r>
-            <a:br/>
-            <a:r>
-              <a:rPr sz="1800">
-                <a:solidFill>
-                  <a:srgbClr val="4070A0"/>
-                </a:solidFill>
-                <a:latin typeface="Courier"/>
-              </a:rPr>
-              <a:t>   </a:t>
-            </a:r>
-            <a:r>
-              <a:rPr sz="1800" b="1">
-                <a:solidFill>
-                  <a:srgbClr val="007020"/>
-                </a:solidFill>
-                <a:latin typeface="Courier"/>
-              </a:rPr>
-              <a:t>scale_colour_viridis_d</a:t>
-            </a:r>
-            <a:r>
-              <a:rPr sz="1800">
-                <a:latin typeface="Courier"/>
-              </a:rPr>
-              <a:t>(</a:t>
-            </a:r>
-            <a:r>
-              <a:rPr sz="1800">
-                <a:solidFill>
-                  <a:srgbClr val="4070A0"/>
-                </a:solidFill>
-                <a:latin typeface="Courier"/>
-              </a:rPr>
-              <a:t>"City\nCenter"</a:t>
-            </a:r>
-            <a:r>
-              <a:rPr sz="1800">
-                <a:latin typeface="Courier"/>
-              </a:rPr>
-              <a:t>, </a:t>
-            </a:r>
-            <a:r>
-              <a:rPr sz="1800">
-                <a:solidFill>
-                  <a:srgbClr val="902000"/>
-                </a:solidFill>
-                <a:latin typeface="Courier"/>
-              </a:rPr>
-              <a:t>option =</a:t>
-            </a:r>
-            <a:r>
-              <a:rPr sz="1800">
-                <a:latin typeface="Courier"/>
-              </a:rPr>
-              <a:t> params</a:t>
-            </a:r>
-            <a:r>
-              <a:rPr sz="1800">
-                <a:solidFill>
-                  <a:srgbClr val="666666"/>
-                </a:solidFill>
-                <a:latin typeface="Courier"/>
-              </a:rPr>
-              <a:t>$</a:t>
-            </a:r>
-            <a:r>
-              <a:rPr sz="1800">
-                <a:latin typeface="Courier"/>
-              </a:rPr>
-              <a:t>viridis_palette)</a:t>
-            </a:r>
-          </a:p>
-        </p:txBody>
-      </p:sp>
-    </p:spTree>
-  </p:cSld>
-</p:sld>
-</file>
-
-<file path=ppt/slides/slide7.xml><?xml version="1.0" encoding="utf-8"?>
 <p:sld xmlns:a="http://schemas.openxmlformats.org/drawingml/2006/main" xmlns:r="http://schemas.openxmlformats.org/officeDocument/2006/relationships" xmlns:p="http://schemas.openxmlformats.org/presentationml/2006/main">
   <p:cSld>
     <p:spTree>
@@ -5284,7 +4898,7 @@
 </p:sld>
 </file>
 
-<file path=ppt/slides/slide8.xml><?xml version="1.0" encoding="utf-8"?>
+<file path=ppt/slides/slide7.xml><?xml version="1.0" encoding="utf-8"?>
 <p:sld xmlns:a="http://schemas.openxmlformats.org/drawingml/2006/main" xmlns:r="http://schemas.openxmlformats.org/officeDocument/2006/relationships" xmlns:p="http://schemas.openxmlformats.org/presentationml/2006/main">
   <p:cSld>
     <p:spTree>
@@ -5680,7 +5294,7 @@
 </p:sld>
 </file>
 
-<file path=ppt/slides/slide9.xml><?xml version="1.0" encoding="utf-8"?>
+<file path=ppt/slides/slide8.xml><?xml version="1.0" encoding="utf-8"?>
 <p:sld xmlns:a="http://schemas.openxmlformats.org/drawingml/2006/main" xmlns:r="http://schemas.openxmlformats.org/officeDocument/2006/relationships" xmlns:p="http://schemas.openxmlformats.org/presentationml/2006/main">
   <p:cSld>
     <p:spTree>
@@ -5727,6 +5341,436 @@
           </a:ln>
         </p:spPr>
       </p:pic>
+    </p:spTree>
+  </p:cSld>
+</p:sld>
+</file>
+
+<file path=ppt/slides/slide9.xml><?xml version="1.0" encoding="utf-8"?>
+<p:sld xmlns:a="http://schemas.openxmlformats.org/drawingml/2006/main" xmlns:r="http://schemas.openxmlformats.org/officeDocument/2006/relationships" xmlns:p="http://schemas.openxmlformats.org/presentationml/2006/main">
+  <p:cSld>
+    <p:spTree>
+      <p:nvGrpSpPr>
+        <p:cNvPr id="1" name=""/>
+        <p:cNvGrpSpPr/>
+        <p:nvPr/>
+      </p:nvGrpSpPr>
+      <p:grpSpPr>
+        <a:xfrm>
+          <a:off x="0" y="0"/>
+          <a:ext cx="0" cy="0"/>
+          <a:chOff x="0" y="0"/>
+          <a:chExt cx="0" cy="0"/>
+        </a:xfrm>
+      </p:grpSpPr>
+      <p:sp>
+        <p:nvSpPr>
+          <p:cNvPr id="2" name="Title 1"/>
+          <p:cNvSpPr>
+            <a:spLocks noGrp="1"/>
+          </p:cNvSpPr>
+          <p:nvPr>
+            <p:ph type="title"/>
+          </p:nvPr>
+        </p:nvSpPr>
+        <p:spPr/>
+        <p:txBody>
+          <a:bodyPr/>
+          <a:lstStyle/>
+          <a:p>
+            <a:pPr lvl="0" marL="0" indent="0">
+              <a:buNone/>
+            </a:pPr>
+            <a:r>
+              <a:rPr/>
+              <a:t>Fort</a:t>
+            </a:r>
+            <a:r>
+              <a:rPr/>
+              <a:t> </a:t>
+            </a:r>
+            <a:r>
+              <a:rPr/>
+              <a:t>Worth</a:t>
+            </a:r>
+            <a:r>
+              <a:rPr/>
+              <a:t> </a:t>
+            </a:r>
+            <a:r>
+              <a:rPr/>
+              <a:t>has</a:t>
+            </a:r>
+            <a:r>
+              <a:rPr/>
+              <a:t> </a:t>
+            </a:r>
+            <a:r>
+              <a:rPr/>
+              <a:t>more</a:t>
+            </a:r>
+            <a:r>
+              <a:rPr/>
+              <a:t> </a:t>
+            </a:r>
+            <a:r>
+              <a:rPr/>
+              <a:t>affordable</a:t>
+            </a:r>
+            <a:r>
+              <a:rPr/>
+              <a:t> </a:t>
+            </a:r>
+            <a:r>
+              <a:rPr/>
+              <a:t>housing</a:t>
+            </a:r>
+          </a:p>
+        </p:txBody>
+      </p:sp>
+      <p:sp>
+        <p:nvSpPr>
+          <p:cNvPr id="3" name="Content Placeholder 2"/>
+          <p:cNvSpPr>
+            <a:spLocks noGrp="1"/>
+          </p:cNvSpPr>
+          <p:nvPr>
+            <p:ph idx="1"/>
+          </p:nvPr>
+        </p:nvSpPr>
+        <p:spPr/>
+        <p:txBody>
+          <a:bodyPr/>
+          <a:lstStyle/>
+          <a:p>
+            <a:pPr lvl="0" marL="1270000" indent="0">
+              <a:buNone/>
+            </a:pPr>
+            <a:r>
+              <a:rPr sz="1800" b="1">
+                <a:solidFill>
+                  <a:srgbClr val="007020"/>
+                </a:solidFill>
+                <a:latin typeface="Courier"/>
+              </a:rPr>
+              <a:t>library</a:t>
+            </a:r>
+            <a:r>
+              <a:rPr sz="1800">
+                <a:latin typeface="Courier"/>
+              </a:rPr>
+              <a:t>(scales) </a:t>
+            </a:r>
+            <a:r>
+              <a:rPr sz="1800" i="1">
+                <a:solidFill>
+                  <a:srgbClr val="60A0B0"/>
+                </a:solidFill>
+                <a:latin typeface="Courier"/>
+              </a:rPr>
+              <a:t># to make y-axis in non-scientific notation</a:t>
+            </a:r>
+            <a:br/>
+            <a:r>
+              <a:rPr sz="1800" b="1">
+                <a:solidFill>
+                  <a:srgbClr val="007020"/>
+                </a:solidFill>
+                <a:latin typeface="Courier"/>
+              </a:rPr>
+              <a:t>ggplot</a:t>
+            </a:r>
+            <a:r>
+              <a:rPr sz="1800">
+                <a:latin typeface="Courier"/>
+              </a:rPr>
+              <a:t>(txsamp, </a:t>
+            </a:r>
+            <a:r>
+              <a:rPr sz="1800" b="1">
+                <a:solidFill>
+                  <a:srgbClr val="007020"/>
+                </a:solidFill>
+                <a:latin typeface="Courier"/>
+              </a:rPr>
+              <a:t>aes</a:t>
+            </a:r>
+            <a:r>
+              <a:rPr sz="1800">
+                <a:latin typeface="Courier"/>
+              </a:rPr>
+              <a:t>(</a:t>
+            </a:r>
+            <a:r>
+              <a:rPr sz="1800">
+                <a:solidFill>
+                  <a:srgbClr val="902000"/>
+                </a:solidFill>
+                <a:latin typeface="Courier"/>
+              </a:rPr>
+              <a:t>x =</a:t>
+            </a:r>
+            <a:r>
+              <a:rPr sz="1800">
+                <a:latin typeface="Courier"/>
+              </a:rPr>
+              <a:t> median, </a:t>
+            </a:r>
+            <a:r>
+              <a:rPr sz="1800">
+                <a:solidFill>
+                  <a:srgbClr val="902000"/>
+                </a:solidFill>
+                <a:latin typeface="Courier"/>
+              </a:rPr>
+              <a:t>fill =</a:t>
+            </a:r>
+            <a:r>
+              <a:rPr sz="1800">
+                <a:latin typeface="Courier"/>
+              </a:rPr>
+              <a:t> city)) </a:t>
+            </a:r>
+            <a:r>
+              <a:rPr sz="1800">
+                <a:solidFill>
+                  <a:srgbClr val="666666"/>
+                </a:solidFill>
+                <a:latin typeface="Courier"/>
+              </a:rPr>
+              <a:t>+</a:t>
+            </a:r>
+            <a:br/>
+            <a:r>
+              <a:rPr sz="1800">
+                <a:solidFill>
+                  <a:srgbClr val="4070A0"/>
+                </a:solidFill>
+                <a:latin typeface="Courier"/>
+              </a:rPr>
+              <a:t>  </a:t>
+            </a:r>
+            <a:r>
+              <a:rPr sz="1800" b="1">
+                <a:solidFill>
+                  <a:srgbClr val="007020"/>
+                </a:solidFill>
+                <a:latin typeface="Courier"/>
+              </a:rPr>
+              <a:t>geom_histogram</a:t>
+            </a:r>
+            <a:r>
+              <a:rPr sz="1800">
+                <a:latin typeface="Courier"/>
+              </a:rPr>
+              <a:t>(</a:t>
+            </a:r>
+            <a:r>
+              <a:rPr sz="1800" b="1">
+                <a:solidFill>
+                  <a:srgbClr val="007020"/>
+                </a:solidFill>
+                <a:latin typeface="Courier"/>
+              </a:rPr>
+              <a:t>aes</a:t>
+            </a:r>
+            <a:r>
+              <a:rPr sz="1800">
+                <a:latin typeface="Courier"/>
+              </a:rPr>
+              <a:t>(</a:t>
+            </a:r>
+            <a:r>
+              <a:rPr sz="1800">
+                <a:solidFill>
+                  <a:srgbClr val="902000"/>
+                </a:solidFill>
+                <a:latin typeface="Courier"/>
+              </a:rPr>
+              <a:t>weight =</a:t>
+            </a:r>
+            <a:r>
+              <a:rPr sz="1800">
+                <a:latin typeface="Courier"/>
+              </a:rPr>
+              <a:t> sales), </a:t>
+            </a:r>
+            <a:r>
+              <a:rPr sz="1800">
+                <a:solidFill>
+                  <a:srgbClr val="902000"/>
+                </a:solidFill>
+                <a:latin typeface="Courier"/>
+              </a:rPr>
+              <a:t>position =</a:t>
+            </a:r>
+            <a:r>
+              <a:rPr sz="1800">
+                <a:latin typeface="Courier"/>
+              </a:rPr>
+              <a:t> </a:t>
+            </a:r>
+            <a:r>
+              <a:rPr sz="1800">
+                <a:solidFill>
+                  <a:srgbClr val="4070A0"/>
+                </a:solidFill>
+                <a:latin typeface="Courier"/>
+              </a:rPr>
+              <a:t>"dodge"</a:t>
+            </a:r>
+            <a:r>
+              <a:rPr sz="1800">
+                <a:latin typeface="Courier"/>
+              </a:rPr>
+              <a:t>, </a:t>
+            </a:r>
+            <a:r>
+              <a:rPr sz="1800">
+                <a:solidFill>
+                  <a:srgbClr val="902000"/>
+                </a:solidFill>
+                <a:latin typeface="Courier"/>
+              </a:rPr>
+              <a:t>binwidth =</a:t>
+            </a:r>
+            <a:r>
+              <a:rPr sz="1800">
+                <a:latin typeface="Courier"/>
+              </a:rPr>
+              <a:t> </a:t>
+            </a:r>
+            <a:r>
+              <a:rPr sz="1800">
+                <a:solidFill>
+                  <a:srgbClr val="40A070"/>
+                </a:solidFill>
+                <a:latin typeface="Courier"/>
+              </a:rPr>
+              <a:t>15000</a:t>
+            </a:r>
+            <a:r>
+              <a:rPr sz="1800">
+                <a:latin typeface="Courier"/>
+              </a:rPr>
+              <a:t>) </a:t>
+            </a:r>
+            <a:r>
+              <a:rPr sz="1800">
+                <a:solidFill>
+                  <a:srgbClr val="666666"/>
+                </a:solidFill>
+                <a:latin typeface="Courier"/>
+              </a:rPr>
+              <a:t>+</a:t>
+            </a:r>
+            <a:br/>
+            <a:r>
+              <a:rPr sz="1800">
+                <a:solidFill>
+                  <a:srgbClr val="4070A0"/>
+                </a:solidFill>
+                <a:latin typeface="Courier"/>
+              </a:rPr>
+              <a:t>  </a:t>
+            </a:r>
+            <a:r>
+              <a:rPr sz="1800" b="1">
+                <a:solidFill>
+                  <a:srgbClr val="007020"/>
+                </a:solidFill>
+                <a:latin typeface="Courier"/>
+              </a:rPr>
+              <a:t>scale_fill_viridis_d</a:t>
+            </a:r>
+            <a:r>
+              <a:rPr sz="1800">
+                <a:latin typeface="Courier"/>
+              </a:rPr>
+              <a:t>(</a:t>
+            </a:r>
+            <a:r>
+              <a:rPr sz="1800">
+                <a:solidFill>
+                  <a:srgbClr val="902000"/>
+                </a:solidFill>
+                <a:latin typeface="Courier"/>
+              </a:rPr>
+              <a:t>option =</a:t>
+            </a:r>
+            <a:r>
+              <a:rPr sz="1800">
+                <a:latin typeface="Courier"/>
+              </a:rPr>
+              <a:t> params</a:t>
+            </a:r>
+            <a:r>
+              <a:rPr sz="1800">
+                <a:solidFill>
+                  <a:srgbClr val="666666"/>
+                </a:solidFill>
+                <a:latin typeface="Courier"/>
+              </a:rPr>
+              <a:t>$</a:t>
+            </a:r>
+            <a:r>
+              <a:rPr sz="1800">
+                <a:latin typeface="Courier"/>
+              </a:rPr>
+              <a:t>viridis_palette)</a:t>
+            </a:r>
+            <a:r>
+              <a:rPr sz="1800">
+                <a:solidFill>
+                  <a:srgbClr val="666666"/>
+                </a:solidFill>
+                <a:latin typeface="Courier"/>
+              </a:rPr>
+              <a:t>+</a:t>
+            </a:r>
+            <a:br/>
+            <a:r>
+              <a:rPr sz="1800">
+                <a:solidFill>
+                  <a:srgbClr val="4070A0"/>
+                </a:solidFill>
+                <a:latin typeface="Courier"/>
+              </a:rPr>
+              <a:t>  </a:t>
+            </a:r>
+            <a:r>
+              <a:rPr sz="1800" b="1">
+                <a:solidFill>
+                  <a:srgbClr val="007020"/>
+                </a:solidFill>
+                <a:latin typeface="Courier"/>
+              </a:rPr>
+              <a:t>scale_y_continuous</a:t>
+            </a:r>
+            <a:r>
+              <a:rPr sz="1800">
+                <a:latin typeface="Courier"/>
+              </a:rPr>
+              <a:t>(</a:t>
+            </a:r>
+            <a:r>
+              <a:rPr sz="1800">
+                <a:solidFill>
+                  <a:srgbClr val="902000"/>
+                </a:solidFill>
+                <a:latin typeface="Courier"/>
+              </a:rPr>
+              <a:t>labels =</a:t>
+            </a:r>
+            <a:r>
+              <a:rPr sz="1800">
+                <a:latin typeface="Courier"/>
+              </a:rPr>
+              <a:t> comma)</a:t>
+            </a:r>
+          </a:p>
+        </p:txBody>
+      </p:sp>
     </p:spTree>
   </p:cSld>
 </p:sld>

</xml_diff>

<commit_message>
make output formats follow my naming convention
</commit_message>
<xml_diff>
--- a/gallery/outputs/slides/powerpoint_presentation.pptx
+++ b/gallery/outputs/slides/powerpoint_presentation.pptx
@@ -15,9 +15,6 @@
     <p:sldId id="263" r:id="rId9"/>
     <p:sldId id="264" r:id="rId10"/>
     <p:sldId id="265" r:id="rId11"/>
-    <p:sldId id="266" r:id="rId12"/>
-    <p:sldId id="267" r:id="rId13"/>
-    <p:sldId id="268" r:id="rId14"/>
   </p:sldIdLst>
   <p:sldSz cx="9144000" cy="6858000" type="screen4x3"/>
   <p:notesSz cx="6858000" cy="9144000"/>
@@ -3246,9 +3243,483 @@
           <a:chExt cx="0" cy="0"/>
         </a:xfrm>
       </p:grpSpPr>
+      <p:sp>
+        <p:nvSpPr>
+          <p:cNvPr id="2" name="Title 1"/>
+          <p:cNvSpPr>
+            <a:spLocks noGrp="1"/>
+          </p:cNvSpPr>
+          <p:nvPr>
+            <p:ph type="title"/>
+          </p:nvPr>
+        </p:nvSpPr>
+        <p:spPr/>
+        <p:txBody>
+          <a:bodyPr/>
+          <a:lstStyle/>
+          <a:p>
+            <a:pPr lvl="0" marL="0" indent="0">
+              <a:buNone/>
+            </a:pPr>
+            <a:r>
+              <a:rPr/>
+              <a:t>Thanks</a:t>
+            </a:r>
+            <a:r>
+              <a:rPr/>
+              <a:t> </a:t>
+            </a:r>
+            <a:r>
+              <a:rPr/>
+              <a:t>to…</a:t>
+            </a:r>
+          </a:p>
+        </p:txBody>
+      </p:sp>
+      <p:sp>
+        <p:nvSpPr>
+          <p:cNvPr id="3" name="Content Placeholder 2"/>
+          <p:cNvSpPr>
+            <a:spLocks noGrp="1"/>
+          </p:cNvSpPr>
+          <p:nvPr>
+            <p:ph idx="1"/>
+          </p:nvPr>
+        </p:nvSpPr>
+        <p:spPr/>
+        <p:txBody>
+          <a:bodyPr/>
+          <a:lstStyle/>
+          <a:p>
+            <a:pPr lvl="1"/>
+            <a:r>
+              <a:rPr/>
+              <a:t>Jennifer Thompson: </a:t>
+            </a:r>
+            <a:r>
+              <a:rPr>
+                <a:hlinkClick r:id="rId2"/>
+              </a:rPr>
+              <a:t>https://github.com/jenniferthompson/ParamRmdExample</a:t>
+            </a:r>
+          </a:p>
+          <a:p>
+            <a:pPr lvl="1"/>
+            <a:r>
+              <a:rPr/>
+              <a:t>Garrett Grolemund: </a:t>
+            </a:r>
+            <a:r>
+              <a:rPr>
+                <a:hlinkClick r:id="rId3"/>
+              </a:rPr>
+              <a:t>https://rmarkdown.rstudio.com/lesson-6.html</a:t>
+            </a:r>
+          </a:p>
+        </p:txBody>
+      </p:sp>
+    </p:spTree>
+  </p:cSld>
+</p:sld>
+</file>
+
+<file path=ppt/slides/slide2.xml><?xml version="1.0" encoding="utf-8"?>
+<p:sld xmlns:a="http://schemas.openxmlformats.org/drawingml/2006/main" xmlns:r="http://schemas.openxmlformats.org/officeDocument/2006/relationships" xmlns:p="http://schemas.openxmlformats.org/presentationml/2006/main">
+  <p:cSld>
+    <p:spTree>
+      <p:nvGrpSpPr>
+        <p:cNvPr id="1" name=""/>
+        <p:cNvGrpSpPr/>
+        <p:nvPr/>
+      </p:nvGrpSpPr>
+      <p:grpSpPr>
+        <a:xfrm>
+          <a:off x="0" y="0"/>
+          <a:ext cx="0" cy="0"/>
+          <a:chOff x="0" y="0"/>
+          <a:chExt cx="0" cy="0"/>
+        </a:xfrm>
+      </p:grpSpPr>
+      <p:sp>
+        <p:nvSpPr>
+          <p:cNvPr id="2" name="Title 1"/>
+          <p:cNvSpPr>
+            <a:spLocks noGrp="1"/>
+          </p:cNvSpPr>
+          <p:nvPr>
+            <p:ph type="title"/>
+          </p:nvPr>
+        </p:nvSpPr>
+        <p:spPr/>
+        <p:txBody>
+          <a:bodyPr/>
+          <a:lstStyle/>
+          <a:p>
+            <a:pPr lvl="0" marL="0" indent="0">
+              <a:buNone/>
+            </a:pPr>
+            <a:r>
+              <a:rPr/>
+              <a:t>Packages</a:t>
+            </a:r>
+          </a:p>
+        </p:txBody>
+      </p:sp>
+      <p:sp>
+        <p:nvSpPr>
+          <p:cNvPr id="3" name="Content Placeholder 2"/>
+          <p:cNvSpPr>
+            <a:spLocks noGrp="1"/>
+          </p:cNvSpPr>
+          <p:nvPr>
+            <p:ph idx="1"/>
+          </p:nvPr>
+        </p:nvSpPr>
+        <p:spPr/>
+        <p:txBody>
+          <a:bodyPr/>
+          <a:lstStyle/>
+          <a:p>
+            <a:pPr lvl="0" marL="0" indent="0">
+              <a:buNone/>
+            </a:pPr>
+            <a:r>
+              <a:rPr/>
+              <a:t>We’ll use </a:t>
+            </a:r>
+            <a:r>
+              <a:rPr sz="1800">
+                <a:latin typeface="Courier"/>
+              </a:rPr>
+              <a:t>ggplot2</a:t>
+            </a:r>
+            <a:r>
+              <a:rPr/>
+              <a:t> for visualization, and some light </a:t>
+            </a:r>
+            <a:r>
+              <a:rPr sz="1800">
+                <a:latin typeface="Courier"/>
+              </a:rPr>
+              <a:t>dplyr</a:t>
+            </a:r>
+            <a:r>
+              <a:rPr/>
+              <a:t> for data wrangling.</a:t>
+            </a:r>
+          </a:p>
+        </p:txBody>
+      </p:sp>
+    </p:spTree>
+  </p:cSld>
+</p:sld>
+</file>
+
+<file path=ppt/slides/slide3.xml><?xml version="1.0" encoding="utf-8"?>
+<p:sld xmlns:a="http://schemas.openxmlformats.org/drawingml/2006/main" xmlns:r="http://schemas.openxmlformats.org/officeDocument/2006/relationships" xmlns:p="http://schemas.openxmlformats.org/presentationml/2006/main">
+  <p:cSld>
+    <p:spTree>
+      <p:nvGrpSpPr>
+        <p:cNvPr id="1" name=""/>
+        <p:cNvGrpSpPr/>
+        <p:nvPr/>
+      </p:nvGrpSpPr>
+      <p:grpSpPr>
+        <a:xfrm>
+          <a:off x="0" y="0"/>
+          <a:ext cx="0" cy="0"/>
+          <a:chOff x="0" y="0"/>
+          <a:chExt cx="0" cy="0"/>
+        </a:xfrm>
+      </p:grpSpPr>
+      <p:sp>
+        <p:nvSpPr>
+          <p:cNvPr id="2" name="Title 1"/>
+          <p:cNvSpPr>
+            <a:spLocks noGrp="1"/>
+          </p:cNvSpPr>
+          <p:nvPr>
+            <p:ph type="title"/>
+          </p:nvPr>
+        </p:nvSpPr>
+        <p:spPr/>
+        <p:txBody>
+          <a:bodyPr/>
+          <a:lstStyle/>
+          <a:p>
+            <a:pPr lvl="0" marL="0" indent="0">
+              <a:buNone/>
+            </a:pPr>
+            <a:r>
+              <a:rPr/>
+              <a:t>Texas</a:t>
+            </a:r>
+            <a:r>
+              <a:rPr/>
+              <a:t> </a:t>
+            </a:r>
+            <a:r>
+              <a:rPr/>
+              <a:t>housing</a:t>
+            </a:r>
+            <a:r>
+              <a:rPr/>
+              <a:t> </a:t>
+            </a:r>
+            <a:r>
+              <a:rPr/>
+              <a:t>data</a:t>
+            </a:r>
+          </a:p>
+        </p:txBody>
+      </p:sp>
+      <p:sp>
+        <p:nvSpPr>
+          <p:cNvPr id="3" name="Content Placeholder 2"/>
+          <p:cNvSpPr>
+            <a:spLocks noGrp="1"/>
+          </p:cNvSpPr>
+          <p:nvPr>
+            <p:ph idx="1"/>
+          </p:nvPr>
+        </p:nvSpPr>
+        <p:spPr/>
+        <p:txBody>
+          <a:bodyPr/>
+          <a:lstStyle/>
+          <a:p>
+            <a:pPr lvl="0" marL="0" indent="0">
+              <a:buNone/>
+            </a:pPr>
+            <a:r>
+              <a:rPr/>
+              <a:t>This data is loaded for you when you install and load the </a:t>
+            </a:r>
+            <a:r>
+              <a:rPr sz="1800">
+                <a:latin typeface="Courier"/>
+              </a:rPr>
+              <a:t>ggplot2</a:t>
+            </a:r>
+            <a:r>
+              <a:rPr/>
+              <a:t> package.</a:t>
+            </a:r>
+          </a:p>
+          <a:p>
+            <a:pPr lvl="0" marL="1270000" indent="0">
+              <a:buNone/>
+            </a:pPr>
+            <a:r>
+              <a:rPr sz="1800">
+                <a:latin typeface="Courier"/>
+              </a:rPr>
+              <a:t>## Observations: 935
+## Variables: 9
+## $ city      &lt;chr&gt; "Austin", "Austin", "Austin", "Austin", "Austin", "Aus…
+## $ year      &lt;int&gt; 2000, 2000, 2000, 2000, 2000, 2000, 2000, 2000, 2000, …
+## $ month     &lt;int&gt; 1, 2, 3, 4, 5, 6, 7, 8, 9, 10, 11, 12, 1, 2, 3, 4, 5, …
+## $ sales     &lt;dbl&gt; 1025, 1277, 1603, 1556, 1980, 1885, 1818, 1880, 1498, …
+## $ volume    &lt;dbl&gt; 173053635, 226038438, 298557656, 289197960, 393073774,…
+## $ median    &lt;dbl&gt; 133700, 134000, 136700, 136900, 144700, 148800, 149300…
+## $ listings  &lt;dbl&gt; 3084, 2989, 3042, 3192, 3617, 3799, 3944, 3948, 4058, …
+## $ inventory &lt;dbl&gt; 2.0, 2.0, 2.0, 2.1, 2.3, 2.4, 2.6, 2.6, 2.6, 2.6, 2.7,…
+## $ date      &lt;dbl&gt; 2000.000, 2000.083, 2000.167, 2000.250, 2000.333, 2000…</a:t>
+            </a:r>
+          </a:p>
+        </p:txBody>
+      </p:sp>
+    </p:spTree>
+  </p:cSld>
+</p:sld>
+</file>
+
+<file path=ppt/slides/slide4.xml><?xml version="1.0" encoding="utf-8"?>
+<p:sld xmlns:a="http://schemas.openxmlformats.org/drawingml/2006/main" xmlns:r="http://schemas.openxmlformats.org/officeDocument/2006/relationships" xmlns:p="http://schemas.openxmlformats.org/presentationml/2006/main">
+  <p:cSld>
+    <p:spTree>
+      <p:nvGrpSpPr>
+        <p:cNvPr id="1" name=""/>
+        <p:cNvGrpSpPr/>
+        <p:nvPr/>
+      </p:nvGrpSpPr>
+      <p:grpSpPr>
+        <a:xfrm>
+          <a:off x="0" y="0"/>
+          <a:ext cx="0" cy="0"/>
+          <a:chOff x="0" y="0"/>
+          <a:chExt cx="0" cy="0"/>
+        </a:xfrm>
+      </p:grpSpPr>
+      <p:sp>
+        <p:nvSpPr>
+          <p:cNvPr id="2" name="Title 1"/>
+          <p:cNvSpPr>
+            <a:spLocks noGrp="1"/>
+          </p:cNvSpPr>
+          <p:nvPr>
+            <p:ph type="title"/>
+          </p:nvPr>
+        </p:nvSpPr>
+        <p:spPr/>
+        <p:txBody>
+          <a:bodyPr/>
+          <a:lstStyle/>
+          <a:p>
+            <a:pPr lvl="0" marL="0" indent="0">
+              <a:buNone/>
+            </a:pPr>
+            <a:r>
+              <a:rPr/>
+              <a:t>Our</a:t>
+            </a:r>
+            <a:r>
+              <a:rPr/>
+              <a:t> </a:t>
+            </a:r>
+            <a:r>
+              <a:rPr/>
+              <a:t>data</a:t>
+            </a:r>
+            <a:r>
+              <a:rPr/>
+              <a:t> </a:t>
+            </a:r>
+            <a:r>
+              <a:rPr/>
+              <a:t>is</a:t>
+            </a:r>
+            <a:r>
+              <a:rPr/>
+              <a:t> </a:t>
+            </a:r>
+            <a:r>
+              <a:rPr/>
+              <a:t>monthly</a:t>
+            </a:r>
+          </a:p>
+        </p:txBody>
+      </p:sp>
+      <p:sp>
+        <p:nvSpPr>
+          <p:cNvPr id="3" name="Content Placeholder 2"/>
+          <p:cNvSpPr>
+            <a:spLocks noGrp="1"/>
+          </p:cNvSpPr>
+          <p:nvPr>
+            <p:ph idx="1"/>
+          </p:nvPr>
+        </p:nvSpPr>
+        <p:spPr/>
+        <p:txBody>
+          <a:bodyPr/>
+          <a:lstStyle/>
+          <a:p>
+            <a:pPr lvl="0" marL="0" indent="0">
+              <a:buNone/>
+            </a:pPr>
+            <a:r>
+              <a:rPr/>
+              <a:t>Here is just a sample of rows from one city to show that we have data for each of the 12 months for each year, except for 2015.</a:t>
+            </a:r>
+          </a:p>
+          <a:p>
+            <a:pPr lvl="0" marL="1270000" indent="0">
+              <a:buNone/>
+            </a:pPr>
+            <a:r>
+              <a:rPr sz="1800">
+                <a:latin typeface="Courier"/>
+              </a:rPr>
+              <a:t>## # A tibble: 16 x 2
+##     year     n
+##    &lt;int&gt; &lt;int&gt;
+##  1  2000    12
+##  2  2001    12
+##  3  2002    12
+##  4  2003    12
+##  5  2004    12
+##  6  2005    12
+##  7  2006    12
+##  8  2007    12
+##  9  2008    12
+## 10  2009    12
+## 11  2010    12
+## 12  2011    12
+## 13  2012    12
+## 14  2013    12
+## 15  2014    12
+## 16  2015     7</a:t>
+            </a:r>
+          </a:p>
+        </p:txBody>
+      </p:sp>
+    </p:spTree>
+  </p:cSld>
+</p:sld>
+</file>
+
+<file path=ppt/slides/slide5.xml><?xml version="1.0" encoding="utf-8"?>
+<p:sld xmlns:a="http://schemas.openxmlformats.org/drawingml/2006/main" xmlns:r="http://schemas.openxmlformats.org/officeDocument/2006/relationships" xmlns:p="http://schemas.openxmlformats.org/presentationml/2006/main">
+  <p:cSld>
+    <p:spTree>
+      <p:nvGrpSpPr>
+        <p:cNvPr id="1" name=""/>
+        <p:cNvGrpSpPr/>
+        <p:nvPr/>
+      </p:nvGrpSpPr>
+      <p:grpSpPr>
+        <a:xfrm>
+          <a:off x="0" y="0"/>
+          <a:ext cx="0" cy="0"/>
+          <a:chOff x="0" y="0"/>
+          <a:chExt cx="0" cy="0"/>
+        </a:xfrm>
+      </p:grpSpPr>
+      <p:sp>
+        <p:nvSpPr>
+          <p:cNvPr id="2" name="Title 1"/>
+          <p:cNvSpPr>
+            <a:spLocks noGrp="1"/>
+          </p:cNvSpPr>
+          <p:nvPr>
+            <p:ph type="title"/>
+          </p:nvPr>
+        </p:nvSpPr>
+        <p:spPr/>
+        <p:txBody>
+          <a:bodyPr/>
+          <a:lstStyle/>
+          <a:p>
+            <a:pPr lvl="0" marL="0" indent="0">
+              <a:buNone/>
+            </a:pPr>
+            <a:r>
+              <a:rPr/>
+              <a:t>Austin</a:t>
+            </a:r>
+            <a:r>
+              <a:rPr/>
+              <a:t> </a:t>
+            </a:r>
+            <a:r>
+              <a:rPr/>
+              <a:t>is</a:t>
+            </a:r>
+            <a:r>
+              <a:rPr/>
+              <a:t> </a:t>
+            </a:r>
+            <a:r>
+              <a:rPr/>
+              <a:t>expensive</a:t>
+            </a:r>
+          </a:p>
+        </p:txBody>
+      </p:sp>
       <p:pic>
         <p:nvPicPr>
-          <p:cNvPr descr="/Users/alison/rprojs/rmd-render-factory/gallery/outputs/slides/powerpoint_presentation_files/figure-pptx/unnamed-chunk-6-1.png" id="0" name="Picture 1"/>
+          <p:cNvPr descr="/Users/alison/rprojs/rmd-render-factory/gallery/outputs/slides/powerpoint_presentation_files/figure-pptx/unnamed-chunk-4-1.png" id="0" name="Picture 1"/>
           <p:cNvPicPr>
             <a:picLocks noGrp="1" noChangeAspect="1"/>
           </p:cNvPicPr>
@@ -3281,1571 +3752,6 @@
 </p:sld>
 </file>
 
-<file path=ppt/slides/slide11.xml><?xml version="1.0" encoding="utf-8"?>
-<p:sld xmlns:a="http://schemas.openxmlformats.org/drawingml/2006/main" xmlns:r="http://schemas.openxmlformats.org/officeDocument/2006/relationships" xmlns:p="http://schemas.openxmlformats.org/presentationml/2006/main">
-  <p:cSld>
-    <p:spTree>
-      <p:nvGrpSpPr>
-        <p:cNvPr id="1" name=""/>
-        <p:cNvGrpSpPr/>
-        <p:nvPr/>
-      </p:nvGrpSpPr>
-      <p:grpSpPr>
-        <a:xfrm>
-          <a:off x="0" y="0"/>
-          <a:ext cx="0" cy="0"/>
-          <a:chOff x="0" y="0"/>
-          <a:chExt cx="0" cy="0"/>
-        </a:xfrm>
-      </p:grpSpPr>
-      <p:sp>
-        <p:nvSpPr>
-          <p:cNvPr id="2" name="Title 1"/>
-          <p:cNvSpPr>
-            <a:spLocks noGrp="1"/>
-          </p:cNvSpPr>
-          <p:nvPr>
-            <p:ph type="title"/>
-          </p:nvPr>
-        </p:nvSpPr>
-        <p:spPr/>
-        <p:txBody>
-          <a:bodyPr/>
-          <a:lstStyle/>
-          <a:p>
-            <a:pPr lvl="0" marL="0" indent="0">
-              <a:buNone/>
-            </a:pPr>
-            <a:r>
-              <a:rPr/>
-              <a:t>The</a:t>
-            </a:r>
-            <a:r>
-              <a:rPr/>
-              <a:t> </a:t>
-            </a:r>
-            <a:r>
-              <a:rPr/>
-              <a:t>current</a:t>
-            </a:r>
-            <a:r>
-              <a:rPr/>
-              <a:t> </a:t>
-            </a:r>
-            <a:r>
-              <a:rPr/>
-              <a:t>pace</a:t>
-            </a:r>
-            <a:r>
-              <a:rPr/>
-              <a:t> </a:t>
-            </a:r>
-            <a:r>
-              <a:rPr/>
-              <a:t>of</a:t>
-            </a:r>
-            <a:r>
-              <a:rPr/>
-              <a:t> </a:t>
-            </a:r>
-            <a:r>
-              <a:rPr/>
-              <a:t>sales</a:t>
-            </a:r>
-            <a:r>
-              <a:rPr/>
-              <a:t> </a:t>
-            </a:r>
-            <a:r>
-              <a:rPr/>
-              <a:t>is</a:t>
-            </a:r>
-            <a:r>
-              <a:rPr/>
-              <a:t> </a:t>
-            </a:r>
-            <a:r>
-              <a:rPr/>
-              <a:t>fast</a:t>
-            </a:r>
-          </a:p>
-        </p:txBody>
-      </p:sp>
-      <p:sp>
-        <p:nvSpPr>
-          <p:cNvPr id="3" name="Content Placeholder 2"/>
-          <p:cNvSpPr>
-            <a:spLocks noGrp="1"/>
-          </p:cNvSpPr>
-          <p:nvPr>
-            <p:ph idx="1"/>
-          </p:nvPr>
-        </p:nvSpPr>
-        <p:spPr/>
-        <p:txBody>
-          <a:bodyPr/>
-          <a:lstStyle/>
-          <a:p>
-            <a:pPr lvl="0" marL="0" indent="0">
-              <a:buNone/>
-            </a:pPr>
-            <a:r>
-              <a:rPr/>
-              <a:t>“Months inventory”: amount of time it would take to sell all current listings at current pace of sales.</a:t>
-            </a:r>
-          </a:p>
-          <a:p>
-            <a:pPr lvl="0" marL="1270000" indent="0">
-              <a:buNone/>
-            </a:pPr>
-            <a:r>
-              <a:rPr sz="1800" b="1">
-                <a:solidFill>
-                  <a:srgbClr val="007020"/>
-                </a:solidFill>
-                <a:latin typeface="Courier"/>
-              </a:rPr>
-              <a:t>ggplot</a:t>
-            </a:r>
-            <a:r>
-              <a:rPr sz="1800">
-                <a:latin typeface="Courier"/>
-              </a:rPr>
-              <a:t>(</a:t>
-            </a:r>
-            <a:r>
-              <a:rPr sz="1800">
-                <a:solidFill>
-                  <a:srgbClr val="902000"/>
-                </a:solidFill>
-                <a:latin typeface="Courier"/>
-              </a:rPr>
-              <a:t>data =</a:t>
-            </a:r>
-            <a:r>
-              <a:rPr sz="1800">
-                <a:latin typeface="Courier"/>
-              </a:rPr>
-              <a:t> txsamp, </a:t>
-            </a:r>
-            <a:r>
-              <a:rPr sz="1800" b="1">
-                <a:solidFill>
-                  <a:srgbClr val="007020"/>
-                </a:solidFill>
-                <a:latin typeface="Courier"/>
-              </a:rPr>
-              <a:t>aes</a:t>
-            </a:r>
-            <a:r>
-              <a:rPr sz="1800">
-                <a:latin typeface="Courier"/>
-              </a:rPr>
-              <a:t>(</a:t>
-            </a:r>
-            <a:r>
-              <a:rPr sz="1800">
-                <a:solidFill>
-                  <a:srgbClr val="902000"/>
-                </a:solidFill>
-                <a:latin typeface="Courier"/>
-              </a:rPr>
-              <a:t>x =</a:t>
-            </a:r>
-            <a:r>
-              <a:rPr sz="1800">
-                <a:latin typeface="Courier"/>
-              </a:rPr>
-              <a:t> year, </a:t>
-            </a:r>
-            <a:r>
-              <a:rPr sz="1800">
-                <a:solidFill>
-                  <a:srgbClr val="902000"/>
-                </a:solidFill>
-                <a:latin typeface="Courier"/>
-              </a:rPr>
-              <a:t>y =</a:t>
-            </a:r>
-            <a:r>
-              <a:rPr sz="1800">
-                <a:latin typeface="Courier"/>
-              </a:rPr>
-              <a:t> inventory, </a:t>
-            </a:r>
-            <a:r>
-              <a:rPr sz="1800">
-                <a:solidFill>
-                  <a:srgbClr val="902000"/>
-                </a:solidFill>
-                <a:latin typeface="Courier"/>
-              </a:rPr>
-              <a:t>colour =</a:t>
-            </a:r>
-            <a:r>
-              <a:rPr sz="1800">
-                <a:latin typeface="Courier"/>
-              </a:rPr>
-              <a:t> city)) </a:t>
-            </a:r>
-            <a:r>
-              <a:rPr sz="1800">
-                <a:solidFill>
-                  <a:srgbClr val="666666"/>
-                </a:solidFill>
-                <a:latin typeface="Courier"/>
-              </a:rPr>
-              <a:t>+</a:t>
-            </a:r>
-            <a:br/>
-            <a:r>
-              <a:rPr sz="1800">
-                <a:solidFill>
-                  <a:srgbClr val="4070A0"/>
-                </a:solidFill>
-                <a:latin typeface="Courier"/>
-              </a:rPr>
-              <a:t>  </a:t>
-            </a:r>
-            <a:r>
-              <a:rPr sz="1800" b="1">
-                <a:solidFill>
-                  <a:srgbClr val="007020"/>
-                </a:solidFill>
-                <a:latin typeface="Courier"/>
-              </a:rPr>
-              <a:t>geom_point</a:t>
-            </a:r>
-            <a:r>
-              <a:rPr sz="1800">
-                <a:latin typeface="Courier"/>
-              </a:rPr>
-              <a:t>() </a:t>
-            </a:r>
-            <a:r>
-              <a:rPr sz="1800">
-                <a:solidFill>
-                  <a:srgbClr val="666666"/>
-                </a:solidFill>
-                <a:latin typeface="Courier"/>
-              </a:rPr>
-              <a:t>+</a:t>
-            </a:r>
-            <a:r>
-              <a:rPr sz="1800">
-                <a:solidFill>
-                  <a:srgbClr val="4070A0"/>
-                </a:solidFill>
-                <a:latin typeface="Courier"/>
-              </a:rPr>
-              <a:t> </a:t>
-            </a:r>
-            <a:br/>
-            <a:r>
-              <a:rPr sz="1800">
-                <a:solidFill>
-                  <a:srgbClr val="4070A0"/>
-                </a:solidFill>
-                <a:latin typeface="Courier"/>
-              </a:rPr>
-              <a:t>  </a:t>
-            </a:r>
-            <a:r>
-              <a:rPr sz="1800" b="1">
-                <a:solidFill>
-                  <a:srgbClr val="007020"/>
-                </a:solidFill>
-                <a:latin typeface="Courier"/>
-              </a:rPr>
-              <a:t>geom_smooth</a:t>
-            </a:r>
-            <a:r>
-              <a:rPr sz="1800">
-                <a:latin typeface="Courier"/>
-              </a:rPr>
-              <a:t>(</a:t>
-            </a:r>
-            <a:r>
-              <a:rPr sz="1800">
-                <a:solidFill>
-                  <a:srgbClr val="902000"/>
-                </a:solidFill>
-                <a:latin typeface="Courier"/>
-              </a:rPr>
-              <a:t>se =</a:t>
-            </a:r>
-            <a:r>
-              <a:rPr sz="1800">
-                <a:latin typeface="Courier"/>
-              </a:rPr>
-              <a:t> </a:t>
-            </a:r>
-            <a:r>
-              <a:rPr sz="1800">
-                <a:solidFill>
-                  <a:srgbClr val="007020"/>
-                </a:solidFill>
-                <a:latin typeface="Courier"/>
-              </a:rPr>
-              <a:t>FALSE</a:t>
-            </a:r>
-            <a:r>
-              <a:rPr sz="1800">
-                <a:latin typeface="Courier"/>
-              </a:rPr>
-              <a:t>) </a:t>
-            </a:r>
-            <a:r>
-              <a:rPr sz="1800">
-                <a:solidFill>
-                  <a:srgbClr val="666666"/>
-                </a:solidFill>
-                <a:latin typeface="Courier"/>
-              </a:rPr>
-              <a:t>+</a:t>
-            </a:r>
-            <a:br/>
-            <a:r>
-              <a:rPr sz="1800">
-                <a:solidFill>
-                  <a:srgbClr val="4070A0"/>
-                </a:solidFill>
-                <a:latin typeface="Courier"/>
-              </a:rPr>
-              <a:t>  </a:t>
-            </a:r>
-            <a:r>
-              <a:rPr sz="1800" b="1">
-                <a:solidFill>
-                  <a:srgbClr val="007020"/>
-                </a:solidFill>
-                <a:latin typeface="Courier"/>
-              </a:rPr>
-              <a:t>scale_colour_viridis_d</a:t>
-            </a:r>
-            <a:r>
-              <a:rPr sz="1800">
-                <a:latin typeface="Courier"/>
-              </a:rPr>
-              <a:t>(</a:t>
-            </a:r>
-            <a:r>
-              <a:rPr sz="1800">
-                <a:solidFill>
-                  <a:srgbClr val="4070A0"/>
-                </a:solidFill>
-                <a:latin typeface="Courier"/>
-              </a:rPr>
-              <a:t>"City\nCenter"</a:t>
-            </a:r>
-            <a:r>
-              <a:rPr sz="1800">
-                <a:latin typeface="Courier"/>
-              </a:rPr>
-              <a:t>, </a:t>
-            </a:r>
-            <a:r>
-              <a:rPr sz="1800">
-                <a:solidFill>
-                  <a:srgbClr val="902000"/>
-                </a:solidFill>
-                <a:latin typeface="Courier"/>
-              </a:rPr>
-              <a:t>option =</a:t>
-            </a:r>
-            <a:r>
-              <a:rPr sz="1800">
-                <a:latin typeface="Courier"/>
-              </a:rPr>
-              <a:t> params</a:t>
-            </a:r>
-            <a:r>
-              <a:rPr sz="1800">
-                <a:solidFill>
-                  <a:srgbClr val="666666"/>
-                </a:solidFill>
-                <a:latin typeface="Courier"/>
-              </a:rPr>
-              <a:t>$</a:t>
-            </a:r>
-            <a:r>
-              <a:rPr sz="1800">
-                <a:latin typeface="Courier"/>
-              </a:rPr>
-              <a:t>viridis_palette) </a:t>
-            </a:r>
-          </a:p>
-        </p:txBody>
-      </p:sp>
-    </p:spTree>
-  </p:cSld>
-</p:sld>
-</file>
-
-<file path=ppt/slides/slide12.xml><?xml version="1.0" encoding="utf-8"?>
-<p:sld xmlns:a="http://schemas.openxmlformats.org/drawingml/2006/main" xmlns:r="http://schemas.openxmlformats.org/officeDocument/2006/relationships" xmlns:p="http://schemas.openxmlformats.org/presentationml/2006/main">
-  <p:cSld>
-    <p:spTree>
-      <p:nvGrpSpPr>
-        <p:cNvPr id="1" name=""/>
-        <p:cNvGrpSpPr/>
-        <p:nvPr/>
-      </p:nvGrpSpPr>
-      <p:grpSpPr>
-        <a:xfrm>
-          <a:off x="0" y="0"/>
-          <a:ext cx="0" cy="0"/>
-          <a:chOff x="0" y="0"/>
-          <a:chExt cx="0" cy="0"/>
-        </a:xfrm>
-      </p:grpSpPr>
-      <p:pic>
-        <p:nvPicPr>
-          <p:cNvPr descr="/Users/alison/rprojs/rmd-render-factory/gallery/outputs/slides/powerpoint_presentation_files/figure-pptx/unnamed-chunk-7-1.png" id="0" name="Picture 1"/>
-          <p:cNvPicPr>
-            <a:picLocks noGrp="1" noChangeAspect="1"/>
-          </p:cNvPicPr>
-          <p:nvPr/>
-        </p:nvPicPr>
-        <p:blipFill>
-          <a:blip r:embed="rId2"/>
-          <a:stretch>
-            <a:fillRect/>
-          </a:stretch>
-        </p:blipFill>
-        <p:spPr bwMode="auto">
-          <a:xfrm>
-            <a:off x="1752600" y="1600200"/>
-            <a:ext cx="5651500" cy="4521200"/>
-          </a:xfrm>
-          <a:prstGeom prst="rect">
-            <a:avLst/>
-          </a:prstGeom>
-          <a:noFill/>
-          <a:ln w="9525">
-            <a:noFill/>
-            <a:headEnd/>
-            <a:tailEnd/>
-          </a:ln>
-        </p:spPr>
-      </p:pic>
-    </p:spTree>
-  </p:cSld>
-</p:sld>
-</file>
-
-<file path=ppt/slides/slide13.xml><?xml version="1.0" encoding="utf-8"?>
-<p:sld xmlns:a="http://schemas.openxmlformats.org/drawingml/2006/main" xmlns:r="http://schemas.openxmlformats.org/officeDocument/2006/relationships" xmlns:p="http://schemas.openxmlformats.org/presentationml/2006/main">
-  <p:cSld>
-    <p:spTree>
-      <p:nvGrpSpPr>
-        <p:cNvPr id="1" name=""/>
-        <p:cNvGrpSpPr/>
-        <p:nvPr/>
-      </p:nvGrpSpPr>
-      <p:grpSpPr>
-        <a:xfrm>
-          <a:off x="0" y="0"/>
-          <a:ext cx="0" cy="0"/>
-          <a:chOff x="0" y="0"/>
-          <a:chExt cx="0" cy="0"/>
-        </a:xfrm>
-      </p:grpSpPr>
-      <p:sp>
-        <p:nvSpPr>
-          <p:cNvPr id="2" name="Title 1"/>
-          <p:cNvSpPr>
-            <a:spLocks noGrp="1"/>
-          </p:cNvSpPr>
-          <p:nvPr>
-            <p:ph type="title"/>
-          </p:nvPr>
-        </p:nvSpPr>
-        <p:spPr/>
-        <p:txBody>
-          <a:bodyPr/>
-          <a:lstStyle/>
-          <a:p>
-            <a:pPr lvl="0" marL="0" indent="0">
-              <a:buNone/>
-            </a:pPr>
-            <a:r>
-              <a:rPr/>
-              <a:t>Thanks</a:t>
-            </a:r>
-            <a:r>
-              <a:rPr/>
-              <a:t> </a:t>
-            </a:r>
-            <a:r>
-              <a:rPr/>
-              <a:t>to…</a:t>
-            </a:r>
-          </a:p>
-        </p:txBody>
-      </p:sp>
-      <p:sp>
-        <p:nvSpPr>
-          <p:cNvPr id="3" name="Content Placeholder 2"/>
-          <p:cNvSpPr>
-            <a:spLocks noGrp="1"/>
-          </p:cNvSpPr>
-          <p:nvPr>
-            <p:ph idx="1"/>
-          </p:nvPr>
-        </p:nvSpPr>
-        <p:spPr/>
-        <p:txBody>
-          <a:bodyPr/>
-          <a:lstStyle/>
-          <a:p>
-            <a:pPr lvl="1"/>
-            <a:r>
-              <a:rPr/>
-              <a:t>Jennifer Thompson: </a:t>
-            </a:r>
-            <a:r>
-              <a:rPr>
-                <a:hlinkClick r:id="rId2"/>
-              </a:rPr>
-              <a:t>https://github.com/jenniferthompson/ParamRmdExample</a:t>
-            </a:r>
-          </a:p>
-          <a:p>
-            <a:pPr lvl="1"/>
-            <a:r>
-              <a:rPr/>
-              <a:t>Garrett Grolemund: </a:t>
-            </a:r>
-            <a:r>
-              <a:rPr>
-                <a:hlinkClick r:id="rId3"/>
-              </a:rPr>
-              <a:t>https://rmarkdown.rstudio.com/lesson-6.html</a:t>
-            </a:r>
-          </a:p>
-        </p:txBody>
-      </p:sp>
-    </p:spTree>
-  </p:cSld>
-</p:sld>
-</file>
-
-<file path=ppt/slides/slide2.xml><?xml version="1.0" encoding="utf-8"?>
-<p:sld xmlns:a="http://schemas.openxmlformats.org/drawingml/2006/main" xmlns:r="http://schemas.openxmlformats.org/officeDocument/2006/relationships" xmlns:p="http://schemas.openxmlformats.org/presentationml/2006/main">
-  <p:cSld>
-    <p:spTree>
-      <p:nvGrpSpPr>
-        <p:cNvPr id="1" name=""/>
-        <p:cNvGrpSpPr/>
-        <p:nvPr/>
-      </p:nvGrpSpPr>
-      <p:grpSpPr>
-        <a:xfrm>
-          <a:off x="0" y="0"/>
-          <a:ext cx="0" cy="0"/>
-          <a:chOff x="0" y="0"/>
-          <a:chExt cx="0" cy="0"/>
-        </a:xfrm>
-      </p:grpSpPr>
-      <p:sp>
-        <p:nvSpPr>
-          <p:cNvPr id="2" name="Title 1"/>
-          <p:cNvSpPr>
-            <a:spLocks noGrp="1"/>
-          </p:cNvSpPr>
-          <p:nvPr>
-            <p:ph type="title"/>
-          </p:nvPr>
-        </p:nvSpPr>
-        <p:spPr/>
-        <p:txBody>
-          <a:bodyPr/>
-          <a:lstStyle/>
-          <a:p>
-            <a:pPr lvl="0" marL="0" indent="0">
-              <a:buNone/>
-            </a:pPr>
-            <a:r>
-              <a:rPr/>
-              <a:t>Packages</a:t>
-            </a:r>
-          </a:p>
-        </p:txBody>
-      </p:sp>
-      <p:sp>
-        <p:nvSpPr>
-          <p:cNvPr id="3" name="Content Placeholder 2"/>
-          <p:cNvSpPr>
-            <a:spLocks noGrp="1"/>
-          </p:cNvSpPr>
-          <p:nvPr>
-            <p:ph idx="1"/>
-          </p:nvPr>
-        </p:nvSpPr>
-        <p:spPr/>
-        <p:txBody>
-          <a:bodyPr/>
-          <a:lstStyle/>
-          <a:p>
-            <a:pPr lvl="0" marL="0" indent="0">
-              <a:buNone/>
-            </a:pPr>
-            <a:r>
-              <a:rPr/>
-              <a:t>We’ll use </a:t>
-            </a:r>
-            <a:r>
-              <a:rPr sz="1800">
-                <a:latin typeface="Courier"/>
-              </a:rPr>
-              <a:t>ggplot2</a:t>
-            </a:r>
-            <a:r>
-              <a:rPr/>
-              <a:t> for visualization, and some light </a:t>
-            </a:r>
-            <a:r>
-              <a:rPr sz="1800">
-                <a:latin typeface="Courier"/>
-              </a:rPr>
-              <a:t>dplyr</a:t>
-            </a:r>
-            <a:r>
-              <a:rPr/>
-              <a:t> for data wrangling.</a:t>
-            </a:r>
-          </a:p>
-          <a:p>
-            <a:pPr lvl="0" marL="1270000" indent="0">
-              <a:buNone/>
-            </a:pPr>
-            <a:r>
-              <a:rPr sz="1800" b="1">
-                <a:solidFill>
-                  <a:srgbClr val="007020"/>
-                </a:solidFill>
-                <a:latin typeface="Courier"/>
-              </a:rPr>
-              <a:t>library</a:t>
-            </a:r>
-            <a:r>
-              <a:rPr sz="1800">
-                <a:latin typeface="Courier"/>
-              </a:rPr>
-              <a:t>(ggplot2) </a:t>
-            </a:r>
-            <a:r>
-              <a:rPr sz="1800" i="1">
-                <a:solidFill>
-                  <a:srgbClr val="60A0B0"/>
-                </a:solidFill>
-                <a:latin typeface="Courier"/>
-              </a:rPr>
-              <a:t># plotting</a:t>
-            </a:r>
-            <a:br/>
-            <a:r>
-              <a:rPr sz="1800" b="1">
-                <a:solidFill>
-                  <a:srgbClr val="007020"/>
-                </a:solidFill>
-                <a:latin typeface="Courier"/>
-              </a:rPr>
-              <a:t>library</a:t>
-            </a:r>
-            <a:r>
-              <a:rPr sz="1800">
-                <a:latin typeface="Courier"/>
-              </a:rPr>
-              <a:t>(dplyr) </a:t>
-            </a:r>
-            <a:r>
-              <a:rPr sz="1800" i="1">
-                <a:solidFill>
-                  <a:srgbClr val="60A0B0"/>
-                </a:solidFill>
-                <a:latin typeface="Courier"/>
-              </a:rPr>
-              <a:t># wrangling</a:t>
-            </a:r>
-          </a:p>
-        </p:txBody>
-      </p:sp>
-    </p:spTree>
-  </p:cSld>
-</p:sld>
-</file>
-
-<file path=ppt/slides/slide3.xml><?xml version="1.0" encoding="utf-8"?>
-<p:sld xmlns:a="http://schemas.openxmlformats.org/drawingml/2006/main" xmlns:r="http://schemas.openxmlformats.org/officeDocument/2006/relationships" xmlns:p="http://schemas.openxmlformats.org/presentationml/2006/main">
-  <p:cSld>
-    <p:spTree>
-      <p:nvGrpSpPr>
-        <p:cNvPr id="1" name=""/>
-        <p:cNvGrpSpPr/>
-        <p:nvPr/>
-      </p:nvGrpSpPr>
-      <p:grpSpPr>
-        <a:xfrm>
-          <a:off x="0" y="0"/>
-          <a:ext cx="0" cy="0"/>
-          <a:chOff x="0" y="0"/>
-          <a:chExt cx="0" cy="0"/>
-        </a:xfrm>
-      </p:grpSpPr>
-      <p:sp>
-        <p:nvSpPr>
-          <p:cNvPr id="2" name="Title 1"/>
-          <p:cNvSpPr>
-            <a:spLocks noGrp="1"/>
-          </p:cNvSpPr>
-          <p:nvPr>
-            <p:ph type="title"/>
-          </p:nvPr>
-        </p:nvSpPr>
-        <p:spPr/>
-        <p:txBody>
-          <a:bodyPr/>
-          <a:lstStyle/>
-          <a:p>
-            <a:pPr lvl="0" marL="0" indent="0">
-              <a:buNone/>
-            </a:pPr>
-            <a:r>
-              <a:rPr/>
-              <a:t>Texas</a:t>
-            </a:r>
-            <a:r>
-              <a:rPr/>
-              <a:t> </a:t>
-            </a:r>
-            <a:r>
-              <a:rPr/>
-              <a:t>housing</a:t>
-            </a:r>
-            <a:r>
-              <a:rPr/>
-              <a:t> </a:t>
-            </a:r>
-            <a:r>
-              <a:rPr/>
-              <a:t>data</a:t>
-            </a:r>
-          </a:p>
-        </p:txBody>
-      </p:sp>
-      <p:sp>
-        <p:nvSpPr>
-          <p:cNvPr id="3" name="Content Placeholder 2"/>
-          <p:cNvSpPr>
-            <a:spLocks noGrp="1"/>
-          </p:cNvSpPr>
-          <p:nvPr>
-            <p:ph idx="1"/>
-          </p:nvPr>
-        </p:nvSpPr>
-        <p:spPr/>
-        <p:txBody>
-          <a:bodyPr/>
-          <a:lstStyle/>
-          <a:p>
-            <a:pPr lvl="0" marL="0" indent="0">
-              <a:buNone/>
-            </a:pPr>
-            <a:r>
-              <a:rPr/>
-              <a:t>This data is loaded for you when you install and load the </a:t>
-            </a:r>
-            <a:r>
-              <a:rPr sz="1800">
-                <a:latin typeface="Courier"/>
-              </a:rPr>
-              <a:t>ggplot2</a:t>
-            </a:r>
-            <a:r>
-              <a:rPr/>
-              <a:t> package.</a:t>
-            </a:r>
-          </a:p>
-          <a:p>
-            <a:pPr lvl="0" marL="1270000" indent="0">
-              <a:buNone/>
-            </a:pPr>
-            <a:r>
-              <a:rPr sz="1800">
-                <a:latin typeface="Courier"/>
-              </a:rPr>
-              <a:t>txsamp &lt;-</a:t>
-            </a:r>
-            <a:r>
-              <a:rPr sz="1800">
-                <a:solidFill>
-                  <a:srgbClr val="4070A0"/>
-                </a:solidFill>
-                <a:latin typeface="Courier"/>
-              </a:rPr>
-              <a:t> </a:t>
-            </a:r>
-            <a:r>
-              <a:rPr sz="1800">
-                <a:latin typeface="Courier"/>
-              </a:rPr>
-              <a:t>txhousing </a:t>
-            </a:r>
-            <a:r>
-              <a:rPr sz="1800">
-                <a:solidFill>
-                  <a:srgbClr val="666666"/>
-                </a:solidFill>
-                <a:latin typeface="Courier"/>
-              </a:rPr>
-              <a:t>%&gt;%</a:t>
-            </a:r>
-            <a:r>
-              <a:rPr sz="1800">
-                <a:solidFill>
-                  <a:srgbClr val="4070A0"/>
-                </a:solidFill>
-                <a:latin typeface="Courier"/>
-              </a:rPr>
-              <a:t> </a:t>
-            </a:r>
-            <a:br/>
-            <a:r>
-              <a:rPr sz="1800">
-                <a:solidFill>
-                  <a:srgbClr val="4070A0"/>
-                </a:solidFill>
-                <a:latin typeface="Courier"/>
-              </a:rPr>
-              <a:t>  </a:t>
-            </a:r>
-            <a:r>
-              <a:rPr sz="1800" b="1">
-                <a:solidFill>
-                  <a:srgbClr val="007020"/>
-                </a:solidFill>
-                <a:latin typeface="Courier"/>
-              </a:rPr>
-              <a:t>filter</a:t>
-            </a:r>
-            <a:r>
-              <a:rPr sz="1800">
-                <a:latin typeface="Courier"/>
-              </a:rPr>
-              <a:t>(city </a:t>
-            </a:r>
-            <a:r>
-              <a:rPr sz="1800">
-                <a:solidFill>
-                  <a:srgbClr val="666666"/>
-                </a:solidFill>
-                <a:latin typeface="Courier"/>
-              </a:rPr>
-              <a:t>%in%</a:t>
-            </a:r>
-            <a:r>
-              <a:rPr sz="1800">
-                <a:solidFill>
-                  <a:srgbClr val="4070A0"/>
-                </a:solidFill>
-                <a:latin typeface="Courier"/>
-              </a:rPr>
-              <a:t> </a:t>
-            </a:r>
-            <a:r>
-              <a:rPr sz="1800" b="1">
-                <a:solidFill>
-                  <a:srgbClr val="007020"/>
-                </a:solidFill>
-                <a:latin typeface="Courier"/>
-              </a:rPr>
-              <a:t>c</a:t>
-            </a:r>
-            <a:r>
-              <a:rPr sz="1800">
-                <a:latin typeface="Courier"/>
-              </a:rPr>
-              <a:t>(</a:t>
-            </a:r>
-            <a:r>
-              <a:rPr sz="1800">
-                <a:solidFill>
-                  <a:srgbClr val="4070A0"/>
-                </a:solidFill>
-                <a:latin typeface="Courier"/>
-              </a:rPr>
-              <a:t>"Houston"</a:t>
-            </a:r>
-            <a:r>
-              <a:rPr sz="1800">
-                <a:latin typeface="Courier"/>
-              </a:rPr>
-              <a:t>, </a:t>
-            </a:r>
-            <a:r>
-              <a:rPr sz="1800">
-                <a:solidFill>
-                  <a:srgbClr val="4070A0"/>
-                </a:solidFill>
-                <a:latin typeface="Courier"/>
-              </a:rPr>
-              <a:t>"Fort Worth"</a:t>
-            </a:r>
-            <a:r>
-              <a:rPr sz="1800">
-                <a:latin typeface="Courier"/>
-              </a:rPr>
-              <a:t>, </a:t>
-            </a:r>
-            <a:r>
-              <a:rPr sz="1800">
-                <a:solidFill>
-                  <a:srgbClr val="4070A0"/>
-                </a:solidFill>
-                <a:latin typeface="Courier"/>
-              </a:rPr>
-              <a:t>"San Antonio"</a:t>
-            </a:r>
-            <a:r>
-              <a:rPr sz="1800">
-                <a:latin typeface="Courier"/>
-              </a:rPr>
-              <a:t>, </a:t>
-            </a:r>
-            <a:r>
-              <a:rPr sz="1800">
-                <a:solidFill>
-                  <a:srgbClr val="4070A0"/>
-                </a:solidFill>
-                <a:latin typeface="Courier"/>
-              </a:rPr>
-              <a:t>"Dallas"</a:t>
-            </a:r>
-            <a:r>
-              <a:rPr sz="1800">
-                <a:latin typeface="Courier"/>
-              </a:rPr>
-              <a:t>, </a:t>
-            </a:r>
-            <a:r>
-              <a:rPr sz="1800">
-                <a:solidFill>
-                  <a:srgbClr val="4070A0"/>
-                </a:solidFill>
-                <a:latin typeface="Courier"/>
-              </a:rPr>
-              <a:t>"Austin"</a:t>
-            </a:r>
-            <a:r>
-              <a:rPr sz="1800">
-                <a:latin typeface="Courier"/>
-              </a:rPr>
-              <a:t>))</a:t>
-            </a:r>
-            <a:br/>
-            <a:r>
-              <a:rPr sz="1800" b="1">
-                <a:solidFill>
-                  <a:srgbClr val="007020"/>
-                </a:solidFill>
-                <a:latin typeface="Courier"/>
-              </a:rPr>
-              <a:t>glimpse</a:t>
-            </a:r>
-            <a:r>
-              <a:rPr sz="1800">
-                <a:latin typeface="Courier"/>
-              </a:rPr>
-              <a:t>(txsamp)</a:t>
-            </a:r>
-          </a:p>
-          <a:p>
-            <a:pPr lvl="0" marL="1270000" indent="0">
-              <a:buNone/>
-            </a:pPr>
-            <a:r>
-              <a:rPr sz="1800">
-                <a:latin typeface="Courier"/>
-              </a:rPr>
-              <a:t>## Observations: 935
-## Variables: 9
-## $ city      &lt;chr&gt; "Austin", "Austin", "Austin", "Austin", "Austin", "Aus…
-## $ year      &lt;int&gt; 2000, 2000, 2000, 2000, 2000, 2000, 2000, 2000, 2000, …
-## $ month     &lt;int&gt; 1, 2, 3, 4, 5, 6, 7, 8, 9, 10, 11, 12, 1, 2, 3, 4, 5, …
-## $ sales     &lt;dbl&gt; 1025, 1277, 1603, 1556, 1980, 1885, 1818, 1880, 1498, …
-## $ volume    &lt;dbl&gt; 173053635, 226038438, 298557656, 289197960, 393073774,…
-## $ median    &lt;dbl&gt; 133700, 134000, 136700, 136900, 144700, 148800, 149300…
-## $ listings  &lt;dbl&gt; 3084, 2989, 3042, 3192, 3617, 3799, 3944, 3948, 4058, …
-## $ inventory &lt;dbl&gt; 2.0, 2.0, 2.0, 2.1, 2.3, 2.4, 2.6, 2.6, 2.6, 2.6, 2.7,…
-## $ date      &lt;dbl&gt; 2000.000, 2000.083, 2000.167, 2000.250, 2000.333, 2000…</a:t>
-            </a:r>
-          </a:p>
-        </p:txBody>
-      </p:sp>
-    </p:spTree>
-  </p:cSld>
-</p:sld>
-</file>
-
-<file path=ppt/slides/slide4.xml><?xml version="1.0" encoding="utf-8"?>
-<p:sld xmlns:a="http://schemas.openxmlformats.org/drawingml/2006/main" xmlns:r="http://schemas.openxmlformats.org/officeDocument/2006/relationships" xmlns:p="http://schemas.openxmlformats.org/presentationml/2006/main">
-  <p:cSld>
-    <p:spTree>
-      <p:nvGrpSpPr>
-        <p:cNvPr id="1" name=""/>
-        <p:cNvGrpSpPr/>
-        <p:nvPr/>
-      </p:nvGrpSpPr>
-      <p:grpSpPr>
-        <a:xfrm>
-          <a:off x="0" y="0"/>
-          <a:ext cx="0" cy="0"/>
-          <a:chOff x="0" y="0"/>
-          <a:chExt cx="0" cy="0"/>
-        </a:xfrm>
-      </p:grpSpPr>
-      <p:sp>
-        <p:nvSpPr>
-          <p:cNvPr id="2" name="Title 1"/>
-          <p:cNvSpPr>
-            <a:spLocks noGrp="1"/>
-          </p:cNvSpPr>
-          <p:nvPr>
-            <p:ph type="title"/>
-          </p:nvPr>
-        </p:nvSpPr>
-        <p:spPr/>
-        <p:txBody>
-          <a:bodyPr/>
-          <a:lstStyle/>
-          <a:p>
-            <a:pPr lvl="0" marL="0" indent="0">
-              <a:buNone/>
-            </a:pPr>
-            <a:r>
-              <a:rPr/>
-              <a:t>Our</a:t>
-            </a:r>
-            <a:r>
-              <a:rPr/>
-              <a:t> </a:t>
-            </a:r>
-            <a:r>
-              <a:rPr/>
-              <a:t>data</a:t>
-            </a:r>
-            <a:r>
-              <a:rPr/>
-              <a:t> </a:t>
-            </a:r>
-            <a:r>
-              <a:rPr/>
-              <a:t>is</a:t>
-            </a:r>
-            <a:r>
-              <a:rPr/>
-              <a:t> </a:t>
-            </a:r>
-            <a:r>
-              <a:rPr/>
-              <a:t>monthly</a:t>
-            </a:r>
-          </a:p>
-        </p:txBody>
-      </p:sp>
-      <p:sp>
-        <p:nvSpPr>
-          <p:cNvPr id="3" name="Content Placeholder 2"/>
-          <p:cNvSpPr>
-            <a:spLocks noGrp="1"/>
-          </p:cNvSpPr>
-          <p:nvPr>
-            <p:ph idx="1"/>
-          </p:nvPr>
-        </p:nvSpPr>
-        <p:spPr/>
-        <p:txBody>
-          <a:bodyPr/>
-          <a:lstStyle/>
-          <a:p>
-            <a:pPr lvl="0" marL="0" indent="0">
-              <a:buNone/>
-            </a:pPr>
-            <a:r>
-              <a:rPr/>
-              <a:t>Here is just a sample of rows from one city to show that we have data for each of the 12 months for each year, except for 2015.</a:t>
-            </a:r>
-          </a:p>
-          <a:p>
-            <a:pPr lvl="0" marL="1270000" indent="0">
-              <a:buNone/>
-            </a:pPr>
-            <a:r>
-              <a:rPr sz="1800">
-                <a:latin typeface="Courier"/>
-              </a:rPr>
-              <a:t>txsamp </a:t>
-            </a:r>
-            <a:r>
-              <a:rPr sz="1800">
-                <a:solidFill>
-                  <a:srgbClr val="666666"/>
-                </a:solidFill>
-                <a:latin typeface="Courier"/>
-              </a:rPr>
-              <a:t>%&gt;%</a:t>
-            </a:r>
-            <a:r>
-              <a:rPr sz="1800">
-                <a:solidFill>
-                  <a:srgbClr val="4070A0"/>
-                </a:solidFill>
-                <a:latin typeface="Courier"/>
-              </a:rPr>
-              <a:t> </a:t>
-            </a:r>
-            <a:br/>
-            <a:r>
-              <a:rPr sz="1800">
-                <a:solidFill>
-                  <a:srgbClr val="4070A0"/>
-                </a:solidFill>
-                <a:latin typeface="Courier"/>
-              </a:rPr>
-              <a:t>  </a:t>
-            </a:r>
-            <a:r>
-              <a:rPr sz="1800" b="1">
-                <a:solidFill>
-                  <a:srgbClr val="007020"/>
-                </a:solidFill>
-                <a:latin typeface="Courier"/>
-              </a:rPr>
-              <a:t>filter</a:t>
-            </a:r>
-            <a:r>
-              <a:rPr sz="1800">
-                <a:latin typeface="Courier"/>
-              </a:rPr>
-              <a:t>(city </a:t>
-            </a:r>
-            <a:r>
-              <a:rPr sz="1800">
-                <a:solidFill>
-                  <a:srgbClr val="666666"/>
-                </a:solidFill>
-                <a:latin typeface="Courier"/>
-              </a:rPr>
-              <a:t>==</a:t>
-            </a:r>
-            <a:r>
-              <a:rPr sz="1800">
-                <a:solidFill>
-                  <a:srgbClr val="4070A0"/>
-                </a:solidFill>
-                <a:latin typeface="Courier"/>
-              </a:rPr>
-              <a:t> "Austin"</a:t>
-            </a:r>
-            <a:r>
-              <a:rPr sz="1800">
-                <a:latin typeface="Courier"/>
-              </a:rPr>
-              <a:t>) </a:t>
-            </a:r>
-            <a:r>
-              <a:rPr sz="1800">
-                <a:solidFill>
-                  <a:srgbClr val="666666"/>
-                </a:solidFill>
-                <a:latin typeface="Courier"/>
-              </a:rPr>
-              <a:t>%&gt;%</a:t>
-            </a:r>
-            <a:r>
-              <a:rPr sz="1800">
-                <a:solidFill>
-                  <a:srgbClr val="4070A0"/>
-                </a:solidFill>
-                <a:latin typeface="Courier"/>
-              </a:rPr>
-              <a:t> </a:t>
-            </a:r>
-            <a:br/>
-            <a:r>
-              <a:rPr sz="1800">
-                <a:solidFill>
-                  <a:srgbClr val="4070A0"/>
-                </a:solidFill>
-                <a:latin typeface="Courier"/>
-              </a:rPr>
-              <a:t>  </a:t>
-            </a:r>
-            <a:r>
-              <a:rPr sz="1800" b="1">
-                <a:solidFill>
-                  <a:srgbClr val="007020"/>
-                </a:solidFill>
-                <a:latin typeface="Courier"/>
-              </a:rPr>
-              <a:t>count</a:t>
-            </a:r>
-            <a:r>
-              <a:rPr sz="1800">
-                <a:latin typeface="Courier"/>
-              </a:rPr>
-              <a:t>(year)</a:t>
-            </a:r>
-          </a:p>
-          <a:p>
-            <a:pPr lvl="0" marL="1270000" indent="0">
-              <a:buNone/>
-            </a:pPr>
-            <a:r>
-              <a:rPr sz="1800">
-                <a:latin typeface="Courier"/>
-              </a:rPr>
-              <a:t>## # A tibble: 16 x 2
-##     year     n
-##    &lt;int&gt; &lt;int&gt;
-##  1  2000    12
-##  2  2001    12
-##  3  2002    12
-##  4  2003    12
-##  5  2004    12
-##  6  2005    12
-##  7  2006    12
-##  8  2007    12
-##  9  2008    12
-## 10  2009    12
-## 11  2010    12
-## 12  2011    12
-## 13  2012    12
-## 14  2013    12
-## 15  2014    12
-## 16  2015     7</a:t>
-            </a:r>
-          </a:p>
-        </p:txBody>
-      </p:sp>
-    </p:spTree>
-  </p:cSld>
-</p:sld>
-</file>
-
-<file path=ppt/slides/slide5.xml><?xml version="1.0" encoding="utf-8"?>
-<p:sld xmlns:a="http://schemas.openxmlformats.org/drawingml/2006/main" xmlns:r="http://schemas.openxmlformats.org/officeDocument/2006/relationships" xmlns:p="http://schemas.openxmlformats.org/presentationml/2006/main">
-  <p:cSld>
-    <p:spTree>
-      <p:nvGrpSpPr>
-        <p:cNvPr id="1" name=""/>
-        <p:cNvGrpSpPr/>
-        <p:nvPr/>
-      </p:nvGrpSpPr>
-      <p:grpSpPr>
-        <a:xfrm>
-          <a:off x="0" y="0"/>
-          <a:ext cx="0" cy="0"/>
-          <a:chOff x="0" y="0"/>
-          <a:chExt cx="0" cy="0"/>
-        </a:xfrm>
-      </p:grpSpPr>
-      <p:sp>
-        <p:nvSpPr>
-          <p:cNvPr id="2" name="Title 1"/>
-          <p:cNvSpPr>
-            <a:spLocks noGrp="1"/>
-          </p:cNvSpPr>
-          <p:nvPr>
-            <p:ph type="title"/>
-          </p:nvPr>
-        </p:nvSpPr>
-        <p:spPr/>
-        <p:txBody>
-          <a:bodyPr/>
-          <a:lstStyle/>
-          <a:p>
-            <a:pPr lvl="0" marL="0" indent="0">
-              <a:buNone/>
-            </a:pPr>
-            <a:r>
-              <a:rPr/>
-              <a:t>Austin</a:t>
-            </a:r>
-            <a:r>
-              <a:rPr/>
-              <a:t> </a:t>
-            </a:r>
-            <a:r>
-              <a:rPr/>
-              <a:t>is</a:t>
-            </a:r>
-            <a:r>
-              <a:rPr/>
-              <a:t> </a:t>
-            </a:r>
-            <a:r>
-              <a:rPr/>
-              <a:t>expensive</a:t>
-            </a:r>
-          </a:p>
-        </p:txBody>
-      </p:sp>
-      <p:sp>
-        <p:nvSpPr>
-          <p:cNvPr id="3" name="Content Placeholder 2"/>
-          <p:cNvSpPr>
-            <a:spLocks noGrp="1"/>
-          </p:cNvSpPr>
-          <p:nvPr>
-            <p:ph idx="1"/>
-          </p:nvPr>
-        </p:nvSpPr>
-        <p:spPr/>
-        <p:txBody>
-          <a:bodyPr/>
-          <a:lstStyle/>
-          <a:p>
-            <a:pPr lvl="0" marL="1270000" indent="0">
-              <a:buNone/>
-            </a:pPr>
-            <a:r>
-              <a:rPr sz="1800" b="1">
-                <a:solidFill>
-                  <a:srgbClr val="007020"/>
-                </a:solidFill>
-                <a:latin typeface="Courier"/>
-              </a:rPr>
-              <a:t>ggplot</a:t>
-            </a:r>
-            <a:r>
-              <a:rPr sz="1800">
-                <a:latin typeface="Courier"/>
-              </a:rPr>
-              <a:t>(</a:t>
-            </a:r>
-            <a:r>
-              <a:rPr sz="1800">
-                <a:solidFill>
-                  <a:srgbClr val="902000"/>
-                </a:solidFill>
-                <a:latin typeface="Courier"/>
-              </a:rPr>
-              <a:t>data =</a:t>
-            </a:r>
-            <a:r>
-              <a:rPr sz="1800">
-                <a:latin typeface="Courier"/>
-              </a:rPr>
-              <a:t> txsamp, </a:t>
-            </a:r>
-            <a:r>
-              <a:rPr sz="1800" b="1">
-                <a:solidFill>
-                  <a:srgbClr val="007020"/>
-                </a:solidFill>
-                <a:latin typeface="Courier"/>
-              </a:rPr>
-              <a:t>aes</a:t>
-            </a:r>
-            <a:r>
-              <a:rPr sz="1800">
-                <a:latin typeface="Courier"/>
-              </a:rPr>
-              <a:t>(</a:t>
-            </a:r>
-            <a:r>
-              <a:rPr sz="1800">
-                <a:solidFill>
-                  <a:srgbClr val="902000"/>
-                </a:solidFill>
-                <a:latin typeface="Courier"/>
-              </a:rPr>
-              <a:t>x =</a:t>
-            </a:r>
-            <a:r>
-              <a:rPr sz="1800">
-                <a:latin typeface="Courier"/>
-              </a:rPr>
-              <a:t> sales, </a:t>
-            </a:r>
-            <a:r>
-              <a:rPr sz="1800">
-                <a:solidFill>
-                  <a:srgbClr val="902000"/>
-                </a:solidFill>
-                <a:latin typeface="Courier"/>
-              </a:rPr>
-              <a:t>y =</a:t>
-            </a:r>
-            <a:r>
-              <a:rPr sz="1800">
-                <a:latin typeface="Courier"/>
-              </a:rPr>
-              <a:t> median)) </a:t>
-            </a:r>
-            <a:r>
-              <a:rPr sz="1800">
-                <a:solidFill>
-                  <a:srgbClr val="666666"/>
-                </a:solidFill>
-                <a:latin typeface="Courier"/>
-              </a:rPr>
-              <a:t>+</a:t>
-            </a:r>
-            <a:br/>
-            <a:r>
-              <a:rPr sz="1800">
-                <a:solidFill>
-                  <a:srgbClr val="4070A0"/>
-                </a:solidFill>
-                <a:latin typeface="Courier"/>
-              </a:rPr>
-              <a:t>   </a:t>
-            </a:r>
-            <a:r>
-              <a:rPr sz="1800" b="1">
-                <a:solidFill>
-                  <a:srgbClr val="007020"/>
-                </a:solidFill>
-                <a:latin typeface="Courier"/>
-              </a:rPr>
-              <a:t>geom_point</a:t>
-            </a:r>
-            <a:r>
-              <a:rPr sz="1800">
-                <a:latin typeface="Courier"/>
-              </a:rPr>
-              <a:t>(</a:t>
-            </a:r>
-            <a:r>
-              <a:rPr sz="1800" b="1">
-                <a:solidFill>
-                  <a:srgbClr val="007020"/>
-                </a:solidFill>
-                <a:latin typeface="Courier"/>
-              </a:rPr>
-              <a:t>aes</a:t>
-            </a:r>
-            <a:r>
-              <a:rPr sz="1800">
-                <a:latin typeface="Courier"/>
-              </a:rPr>
-              <a:t>(</a:t>
-            </a:r>
-            <a:r>
-              <a:rPr sz="1800">
-                <a:solidFill>
-                  <a:srgbClr val="902000"/>
-                </a:solidFill>
-                <a:latin typeface="Courier"/>
-              </a:rPr>
-              <a:t>colour =</a:t>
-            </a:r>
-            <a:r>
-              <a:rPr sz="1800">
-                <a:latin typeface="Courier"/>
-              </a:rPr>
-              <a:t> city)) </a:t>
-            </a:r>
-            <a:r>
-              <a:rPr sz="1800">
-                <a:solidFill>
-                  <a:srgbClr val="666666"/>
-                </a:solidFill>
-                <a:latin typeface="Courier"/>
-              </a:rPr>
-              <a:t>+</a:t>
-            </a:r>
-            <a:r>
-              <a:rPr sz="1800">
-                <a:solidFill>
-                  <a:srgbClr val="4070A0"/>
-                </a:solidFill>
-                <a:latin typeface="Courier"/>
-              </a:rPr>
-              <a:t> </a:t>
-            </a:r>
-            <a:br/>
-            <a:r>
-              <a:rPr sz="1800">
-                <a:solidFill>
-                  <a:srgbClr val="4070A0"/>
-                </a:solidFill>
-                <a:latin typeface="Courier"/>
-              </a:rPr>
-              <a:t>   </a:t>
-            </a:r>
-            <a:r>
-              <a:rPr sz="1800" b="1">
-                <a:solidFill>
-                  <a:srgbClr val="007020"/>
-                </a:solidFill>
-                <a:latin typeface="Courier"/>
-              </a:rPr>
-              <a:t>scale_colour_viridis_d</a:t>
-            </a:r>
-            <a:r>
-              <a:rPr sz="1800">
-                <a:latin typeface="Courier"/>
-              </a:rPr>
-              <a:t>(</a:t>
-            </a:r>
-            <a:r>
-              <a:rPr sz="1800">
-                <a:solidFill>
-                  <a:srgbClr val="4070A0"/>
-                </a:solidFill>
-                <a:latin typeface="Courier"/>
-              </a:rPr>
-              <a:t>"City\nCenter"</a:t>
-            </a:r>
-            <a:r>
-              <a:rPr sz="1800">
-                <a:latin typeface="Courier"/>
-              </a:rPr>
-              <a:t>, </a:t>
-            </a:r>
-            <a:r>
-              <a:rPr sz="1800">
-                <a:solidFill>
-                  <a:srgbClr val="902000"/>
-                </a:solidFill>
-                <a:latin typeface="Courier"/>
-              </a:rPr>
-              <a:t>option =</a:t>
-            </a:r>
-            <a:r>
-              <a:rPr sz="1800">
-                <a:latin typeface="Courier"/>
-              </a:rPr>
-              <a:t> params</a:t>
-            </a:r>
-            <a:r>
-              <a:rPr sz="1800">
-                <a:solidFill>
-                  <a:srgbClr val="666666"/>
-                </a:solidFill>
-                <a:latin typeface="Courier"/>
-              </a:rPr>
-              <a:t>$</a:t>
-            </a:r>
-            <a:r>
-              <a:rPr sz="1800">
-                <a:latin typeface="Courier"/>
-              </a:rPr>
-              <a:t>viridis_palette)</a:t>
-            </a:r>
-          </a:p>
-        </p:txBody>
-      </p:sp>
-    </p:spTree>
-  </p:cSld>
-</p:sld>
-</file>
-
 <file path=ppt/slides/slide6.xml><?xml version="1.0" encoding="utf-8"?>
 <p:sld xmlns:a="http://schemas.openxmlformats.org/drawingml/2006/main" xmlns:r="http://schemas.openxmlformats.org/officeDocument/2006/relationships" xmlns:p="http://schemas.openxmlformats.org/presentationml/2006/main">
   <p:cSld>
@@ -4863,9 +3769,66 @@
           <a:chExt cx="0" cy="0"/>
         </a:xfrm>
       </p:grpSpPr>
+      <p:sp>
+        <p:nvSpPr>
+          <p:cNvPr id="2" name="Title 1"/>
+          <p:cNvSpPr>
+            <a:spLocks noGrp="1"/>
+          </p:cNvSpPr>
+          <p:nvPr>
+            <p:ph type="title"/>
+          </p:nvPr>
+        </p:nvSpPr>
+        <p:spPr/>
+        <p:txBody>
+          <a:bodyPr/>
+          <a:lstStyle/>
+          <a:p>
+            <a:pPr lvl="0" marL="0" indent="0">
+              <a:buNone/>
+            </a:pPr>
+            <a:r>
+              <a:rPr/>
+              <a:t>Austin</a:t>
+            </a:r>
+            <a:r>
+              <a:rPr/>
+              <a:t> </a:t>
+            </a:r>
+            <a:r>
+              <a:rPr/>
+              <a:t>prices</a:t>
+            </a:r>
+            <a:r>
+              <a:rPr/>
+              <a:t> </a:t>
+            </a:r>
+            <a:r>
+              <a:rPr/>
+              <a:t>on</a:t>
+            </a:r>
+            <a:r>
+              <a:rPr/>
+              <a:t> </a:t>
+            </a:r>
+            <a:r>
+              <a:rPr/>
+              <a:t>the</a:t>
+            </a:r>
+            <a:r>
+              <a:rPr/>
+              <a:t> </a:t>
+            </a:r>
+            <a:r>
+              <a:rPr/>
+              <a:t>rise</a:t>
+            </a:r>
+          </a:p>
+        </p:txBody>
+      </p:sp>
       <p:pic>
         <p:nvPicPr>
-          <p:cNvPr descr="/Users/alison/rprojs/rmd-render-factory/gallery/outputs/slides/powerpoint_presentation_files/figure-pptx/unnamed-chunk-4-1.png" id="0" name="Picture 1"/>
+          <p:cNvPr descr="/Users/alison/rprojs/rmd-render-factory/gallery/outputs/slides/powerpoint_presentation_files/figure-pptx/unnamed-chunk-5-1.png" id="0" name="Picture 1"/>
           <p:cNvPicPr>
             <a:picLocks noGrp="1" noChangeAspect="1"/>
           </p:cNvPicPr>
@@ -4935,7 +3898,7 @@
             </a:pPr>
             <a:r>
               <a:rPr/>
-              <a:t>Austin</a:t>
+              <a:t>Fort</a:t>
             </a:r>
             <a:r>
               <a:rPr/>
@@ -4943,7 +3906,7 @@
             </a:r>
             <a:r>
               <a:rPr/>
-              <a:t>prices</a:t>
+              <a:t>Worth</a:t>
             </a:r>
             <a:r>
               <a:rPr/>
@@ -4951,7 +3914,7 @@
             </a:r>
             <a:r>
               <a:rPr/>
-              <a:t>on</a:t>
+              <a:t>has</a:t>
             </a:r>
             <a:r>
               <a:rPr/>
@@ -4959,7 +3922,7 @@
             </a:r>
             <a:r>
               <a:rPr/>
-              <a:t>the</a:t>
+              <a:t>more</a:t>
             </a:r>
             <a:r>
               <a:rPr/>
@@ -4967,353 +3930,22 @@
             </a:r>
             <a:r>
               <a:rPr/>
-              <a:t>rise</a:t>
-            </a:r>
-          </a:p>
-        </p:txBody>
-      </p:sp>
-      <p:sp>
-        <p:nvSpPr>
-          <p:cNvPr id="3" name="Content Placeholder 2"/>
-          <p:cNvSpPr>
-            <a:spLocks noGrp="1"/>
-          </p:cNvSpPr>
-          <p:nvPr>
-            <p:ph idx="1"/>
-          </p:nvPr>
-        </p:nvSpPr>
-        <p:spPr/>
-        <p:txBody>
-          <a:bodyPr/>
-          <a:lstStyle/>
-          <a:p>
-            <a:pPr lvl="0" marL="1270000" indent="0">
-              <a:buNone/>
-            </a:pPr>
-            <a:r>
-              <a:rPr sz="1800" b="1">
-                <a:solidFill>
-                  <a:srgbClr val="007020"/>
-                </a:solidFill>
-                <a:latin typeface="Courier"/>
-              </a:rPr>
-              <a:t>ggplot</a:t>
-            </a:r>
-            <a:r>
-              <a:rPr sz="1800">
-                <a:latin typeface="Courier"/>
-              </a:rPr>
-              <a:t>(</a:t>
-            </a:r>
-            <a:r>
-              <a:rPr sz="1800">
-                <a:solidFill>
-                  <a:srgbClr val="902000"/>
-                </a:solidFill>
-                <a:latin typeface="Courier"/>
-              </a:rPr>
-              <a:t>data =</a:t>
-            </a:r>
-            <a:r>
-              <a:rPr sz="1800">
-                <a:latin typeface="Courier"/>
-              </a:rPr>
+              <a:t>affordable</a:t>
+            </a:r>
+            <a:r>
+              <a:rPr/>
               <a:t> </a:t>
             </a:r>
             <a:r>
-              <a:rPr sz="1800" b="1">
-                <a:solidFill>
-                  <a:srgbClr val="007020"/>
-                </a:solidFill>
-                <a:latin typeface="Courier"/>
-              </a:rPr>
-              <a:t>filter</a:t>
-            </a:r>
-            <a:r>
-              <a:rPr sz="1800">
-                <a:latin typeface="Courier"/>
-              </a:rPr>
-              <a:t>(txsamp, city </a:t>
-            </a:r>
-            <a:r>
-              <a:rPr sz="1800">
-                <a:solidFill>
-                  <a:srgbClr val="666666"/>
-                </a:solidFill>
-                <a:latin typeface="Courier"/>
-              </a:rPr>
-              <a:t>==</a:t>
-            </a:r>
-            <a:r>
-              <a:rPr sz="1800">
-                <a:solidFill>
-                  <a:srgbClr val="4070A0"/>
-                </a:solidFill>
-                <a:latin typeface="Courier"/>
-              </a:rPr>
-              <a:t> "Austin"</a:t>
-            </a:r>
-            <a:r>
-              <a:rPr sz="1800">
-                <a:latin typeface="Courier"/>
-              </a:rPr>
-              <a:t>), </a:t>
-            </a:r>
-            <a:r>
-              <a:rPr sz="1800" b="1">
-                <a:solidFill>
-                  <a:srgbClr val="007020"/>
-                </a:solidFill>
-                <a:latin typeface="Courier"/>
-              </a:rPr>
-              <a:t>aes</a:t>
-            </a:r>
-            <a:r>
-              <a:rPr sz="1800">
-                <a:latin typeface="Courier"/>
-              </a:rPr>
-              <a:t>(</a:t>
-            </a:r>
-            <a:r>
-              <a:rPr sz="1800">
-                <a:solidFill>
-                  <a:srgbClr val="902000"/>
-                </a:solidFill>
-                <a:latin typeface="Courier"/>
-              </a:rPr>
-              <a:t>x =</a:t>
-            </a:r>
-            <a:r>
-              <a:rPr sz="1800">
-                <a:latin typeface="Courier"/>
-              </a:rPr>
-              <a:t> sales, </a:t>
-            </a:r>
-            <a:r>
-              <a:rPr sz="1800">
-                <a:solidFill>
-                  <a:srgbClr val="902000"/>
-                </a:solidFill>
-                <a:latin typeface="Courier"/>
-              </a:rPr>
-              <a:t>y =</a:t>
-            </a:r>
-            <a:r>
-              <a:rPr sz="1800">
-                <a:latin typeface="Courier"/>
-              </a:rPr>
-              <a:t> median)) </a:t>
-            </a:r>
-            <a:r>
-              <a:rPr sz="1800">
-                <a:solidFill>
-                  <a:srgbClr val="666666"/>
-                </a:solidFill>
-                <a:latin typeface="Courier"/>
-              </a:rPr>
-              <a:t>+</a:t>
-            </a:r>
-            <a:br/>
-            <a:r>
-              <a:rPr sz="1800">
-                <a:solidFill>
-                  <a:srgbClr val="4070A0"/>
-                </a:solidFill>
-                <a:latin typeface="Courier"/>
-              </a:rPr>
-              <a:t>   </a:t>
-            </a:r>
-            <a:r>
-              <a:rPr sz="1800" b="1">
-                <a:solidFill>
-                  <a:srgbClr val="007020"/>
-                </a:solidFill>
-                <a:latin typeface="Courier"/>
-              </a:rPr>
-              <a:t>geom_point</a:t>
-            </a:r>
-            <a:r>
-              <a:rPr sz="1800">
-                <a:latin typeface="Courier"/>
-              </a:rPr>
-              <a:t>(</a:t>
-            </a:r>
-            <a:r>
-              <a:rPr sz="1800" b="1">
-                <a:solidFill>
-                  <a:srgbClr val="007020"/>
-                </a:solidFill>
-                <a:latin typeface="Courier"/>
-              </a:rPr>
-              <a:t>aes</a:t>
-            </a:r>
-            <a:r>
-              <a:rPr sz="1800">
-                <a:latin typeface="Courier"/>
-              </a:rPr>
-              <a:t>(</a:t>
-            </a:r>
-            <a:r>
-              <a:rPr sz="1800">
-                <a:solidFill>
-                  <a:srgbClr val="902000"/>
-                </a:solidFill>
-                <a:latin typeface="Courier"/>
-              </a:rPr>
-              <a:t>colour =</a:t>
-            </a:r>
-            <a:r>
-              <a:rPr sz="1800">
-                <a:latin typeface="Courier"/>
-              </a:rPr>
-              <a:t> year)) </a:t>
-            </a:r>
-            <a:r>
-              <a:rPr sz="1800">
-                <a:solidFill>
-                  <a:srgbClr val="666666"/>
-                </a:solidFill>
-                <a:latin typeface="Courier"/>
-              </a:rPr>
-              <a:t>+</a:t>
-            </a:r>
-            <a:r>
-              <a:rPr sz="1800">
-                <a:solidFill>
-                  <a:srgbClr val="4070A0"/>
-                </a:solidFill>
-                <a:latin typeface="Courier"/>
-              </a:rPr>
-              <a:t> </a:t>
-            </a:r>
-            <a:br/>
-            <a:r>
-              <a:rPr sz="1800">
-                <a:solidFill>
-                  <a:srgbClr val="4070A0"/>
-                </a:solidFill>
-                <a:latin typeface="Courier"/>
-              </a:rPr>
-              <a:t>   </a:t>
-            </a:r>
-            <a:r>
-              <a:rPr sz="1800" b="1">
-                <a:solidFill>
-                  <a:srgbClr val="007020"/>
-                </a:solidFill>
-                <a:latin typeface="Courier"/>
-              </a:rPr>
-              <a:t>scale_colour_viridis_c</a:t>
-            </a:r>
-            <a:r>
-              <a:rPr sz="1800">
-                <a:latin typeface="Courier"/>
-              </a:rPr>
-              <a:t>(</a:t>
-            </a:r>
-            <a:r>
-              <a:rPr sz="1800">
-                <a:solidFill>
-                  <a:srgbClr val="4070A0"/>
-                </a:solidFill>
-                <a:latin typeface="Courier"/>
-              </a:rPr>
-              <a:t>"Austin by year"</a:t>
-            </a:r>
-            <a:r>
-              <a:rPr sz="1800">
-                <a:latin typeface="Courier"/>
-              </a:rPr>
-              <a:t>, </a:t>
-            </a:r>
-            <a:r>
-              <a:rPr sz="1800">
-                <a:solidFill>
-                  <a:srgbClr val="902000"/>
-                </a:solidFill>
-                <a:latin typeface="Courier"/>
-              </a:rPr>
-              <a:t>option =</a:t>
-            </a:r>
-            <a:r>
-              <a:rPr sz="1800">
-                <a:latin typeface="Courier"/>
-              </a:rPr>
-              <a:t> params</a:t>
-            </a:r>
-            <a:r>
-              <a:rPr sz="1800">
-                <a:solidFill>
-                  <a:srgbClr val="666666"/>
-                </a:solidFill>
-                <a:latin typeface="Courier"/>
-              </a:rPr>
-              <a:t>$</a:t>
-            </a:r>
-            <a:r>
-              <a:rPr sz="1800">
-                <a:latin typeface="Courier"/>
-              </a:rPr>
-              <a:t>viridis_palette, </a:t>
-            </a:r>
-            <a:r>
-              <a:rPr sz="1800">
-                <a:solidFill>
-                  <a:srgbClr val="902000"/>
-                </a:solidFill>
-                <a:latin typeface="Courier"/>
-              </a:rPr>
-              <a:t>direction =</a:t>
-            </a:r>
-            <a:r>
-              <a:rPr sz="1800">
-                <a:latin typeface="Courier"/>
-              </a:rPr>
-              <a:t> </a:t>
-            </a:r>
-            <a:r>
-              <a:rPr sz="1800">
-                <a:solidFill>
-                  <a:srgbClr val="40A070"/>
-                </a:solidFill>
-                <a:latin typeface="Courier"/>
-              </a:rPr>
-              <a:t>-1</a:t>
-            </a:r>
-            <a:r>
-              <a:rPr sz="1800">
-                <a:latin typeface="Courier"/>
-              </a:rPr>
-              <a:t>) </a:t>
-            </a:r>
-          </a:p>
-        </p:txBody>
-      </p:sp>
-    </p:spTree>
-  </p:cSld>
-</p:sld>
-</file>
-
-<file path=ppt/slides/slide8.xml><?xml version="1.0" encoding="utf-8"?>
-<p:sld xmlns:a="http://schemas.openxmlformats.org/drawingml/2006/main" xmlns:r="http://schemas.openxmlformats.org/officeDocument/2006/relationships" xmlns:p="http://schemas.openxmlformats.org/presentationml/2006/main">
-  <p:cSld>
-    <p:spTree>
-      <p:nvGrpSpPr>
-        <p:cNvPr id="1" name=""/>
-        <p:cNvGrpSpPr/>
-        <p:nvPr/>
-      </p:nvGrpSpPr>
-      <p:grpSpPr>
-        <a:xfrm>
-          <a:off x="0" y="0"/>
-          <a:ext cx="0" cy="0"/>
-          <a:chOff x="0" y="0"/>
-          <a:chExt cx="0" cy="0"/>
-        </a:xfrm>
-      </p:grpSpPr>
+              <a:rPr/>
+              <a:t>housing</a:t>
+            </a:r>
+          </a:p>
+        </p:txBody>
+      </p:sp>
       <p:pic>
         <p:nvPicPr>
-          <p:cNvPr descr="/Users/alison/rprojs/rmd-render-factory/gallery/outputs/slides/powerpoint_presentation_files/figure-pptx/unnamed-chunk-5-1.png" id="0" name="Picture 1"/>
+          <p:cNvPr descr="/Users/alison/rprojs/rmd-render-factory/gallery/outputs/slides/powerpoint_presentation_files/figure-pptx/unnamed-chunk-6-1.png" id="0" name="Picture 1"/>
           <p:cNvPicPr>
             <a:picLocks noGrp="1" noChangeAspect="1"/>
           </p:cNvPicPr>
@@ -5346,6 +3978,126 @@
 </p:sld>
 </file>
 
+<file path=ppt/slides/slide8.xml><?xml version="1.0" encoding="utf-8"?>
+<p:sld xmlns:a="http://schemas.openxmlformats.org/drawingml/2006/main" xmlns:r="http://schemas.openxmlformats.org/officeDocument/2006/relationships" xmlns:p="http://schemas.openxmlformats.org/presentationml/2006/main">
+  <p:cSld>
+    <p:spTree>
+      <p:nvGrpSpPr>
+        <p:cNvPr id="1" name=""/>
+        <p:cNvGrpSpPr/>
+        <p:nvPr/>
+      </p:nvGrpSpPr>
+      <p:grpSpPr>
+        <a:xfrm>
+          <a:off x="0" y="0"/>
+          <a:ext cx="0" cy="0"/>
+          <a:chOff x="0" y="0"/>
+          <a:chExt cx="0" cy="0"/>
+        </a:xfrm>
+      </p:grpSpPr>
+      <p:sp>
+        <p:nvSpPr>
+          <p:cNvPr id="2" name="Title 1"/>
+          <p:cNvSpPr>
+            <a:spLocks noGrp="1"/>
+          </p:cNvSpPr>
+          <p:nvPr>
+            <p:ph type="title"/>
+          </p:nvPr>
+        </p:nvSpPr>
+        <p:spPr/>
+        <p:txBody>
+          <a:bodyPr/>
+          <a:lstStyle/>
+          <a:p>
+            <a:pPr lvl="0" marL="0" indent="0">
+              <a:buNone/>
+            </a:pPr>
+            <a:r>
+              <a:rPr/>
+              <a:t>The</a:t>
+            </a:r>
+            <a:r>
+              <a:rPr/>
+              <a:t> </a:t>
+            </a:r>
+            <a:r>
+              <a:rPr/>
+              <a:t>current</a:t>
+            </a:r>
+            <a:r>
+              <a:rPr/>
+              <a:t> </a:t>
+            </a:r>
+            <a:r>
+              <a:rPr/>
+              <a:t>pace</a:t>
+            </a:r>
+            <a:r>
+              <a:rPr/>
+              <a:t> </a:t>
+            </a:r>
+            <a:r>
+              <a:rPr/>
+              <a:t>of</a:t>
+            </a:r>
+            <a:r>
+              <a:rPr/>
+              <a:t> </a:t>
+            </a:r>
+            <a:r>
+              <a:rPr/>
+              <a:t>sales</a:t>
+            </a:r>
+            <a:r>
+              <a:rPr/>
+              <a:t> </a:t>
+            </a:r>
+            <a:r>
+              <a:rPr/>
+              <a:t>is</a:t>
+            </a:r>
+            <a:r>
+              <a:rPr/>
+              <a:t> </a:t>
+            </a:r>
+            <a:r>
+              <a:rPr/>
+              <a:t>fast</a:t>
+            </a:r>
+          </a:p>
+        </p:txBody>
+      </p:sp>
+      <p:sp>
+        <p:nvSpPr>
+          <p:cNvPr id="3" name="Content Placeholder 2"/>
+          <p:cNvSpPr>
+            <a:spLocks noGrp="1"/>
+          </p:cNvSpPr>
+          <p:nvPr>
+            <p:ph idx="1"/>
+          </p:nvPr>
+        </p:nvSpPr>
+        <p:spPr/>
+        <p:txBody>
+          <a:bodyPr/>
+          <a:lstStyle/>
+          <a:p>
+            <a:pPr lvl="0" marL="0" indent="0">
+              <a:buNone/>
+            </a:pPr>
+            <a:r>
+              <a:rPr/>
+              <a:t>“Months inventory”: amount of time it would take to sell all current listings at current pace of sales.</a:t>
+            </a:r>
+          </a:p>
+        </p:txBody>
+      </p:sp>
+    </p:spTree>
+  </p:cSld>
+</p:sld>
+</file>
+
 <file path=ppt/slides/slide9.xml><?xml version="1.0" encoding="utf-8"?>
 <p:sld xmlns:a="http://schemas.openxmlformats.org/drawingml/2006/main" xmlns:r="http://schemas.openxmlformats.org/officeDocument/2006/relationships" xmlns:p="http://schemas.openxmlformats.org/presentationml/2006/main">
   <p:cSld>
@@ -5363,414 +4115,36 @@
           <a:chExt cx="0" cy="0"/>
         </a:xfrm>
       </p:grpSpPr>
-      <p:sp>
-        <p:nvSpPr>
-          <p:cNvPr id="2" name="Title 1"/>
-          <p:cNvSpPr>
-            <a:spLocks noGrp="1"/>
-          </p:cNvSpPr>
-          <p:nvPr>
-            <p:ph type="title"/>
-          </p:nvPr>
-        </p:nvSpPr>
-        <p:spPr/>
-        <p:txBody>
-          <a:bodyPr/>
-          <a:lstStyle/>
-          <a:p>
-            <a:pPr lvl="0" marL="0" indent="0">
-              <a:buNone/>
-            </a:pPr>
-            <a:r>
-              <a:rPr/>
-              <a:t>Fort</a:t>
-            </a:r>
-            <a:r>
-              <a:rPr/>
-              <a:t> </a:t>
-            </a:r>
-            <a:r>
-              <a:rPr/>
-              <a:t>Worth</a:t>
-            </a:r>
-            <a:r>
-              <a:rPr/>
-              <a:t> </a:t>
-            </a:r>
-            <a:r>
-              <a:rPr/>
-              <a:t>has</a:t>
-            </a:r>
-            <a:r>
-              <a:rPr/>
-              <a:t> </a:t>
-            </a:r>
-            <a:r>
-              <a:rPr/>
-              <a:t>more</a:t>
-            </a:r>
-            <a:r>
-              <a:rPr/>
-              <a:t> </a:t>
-            </a:r>
-            <a:r>
-              <a:rPr/>
-              <a:t>affordable</a:t>
-            </a:r>
-            <a:r>
-              <a:rPr/>
-              <a:t> </a:t>
-            </a:r>
-            <a:r>
-              <a:rPr/>
-              <a:t>housing</a:t>
-            </a:r>
-          </a:p>
-        </p:txBody>
-      </p:sp>
-      <p:sp>
-        <p:nvSpPr>
-          <p:cNvPr id="3" name="Content Placeholder 2"/>
-          <p:cNvSpPr>
-            <a:spLocks noGrp="1"/>
-          </p:cNvSpPr>
-          <p:nvPr>
-            <p:ph idx="1"/>
-          </p:nvPr>
-        </p:nvSpPr>
-        <p:spPr/>
-        <p:txBody>
-          <a:bodyPr/>
-          <a:lstStyle/>
-          <a:p>
-            <a:pPr lvl="0" marL="1270000" indent="0">
-              <a:buNone/>
-            </a:pPr>
-            <a:r>
-              <a:rPr sz="1800" b="1">
-                <a:solidFill>
-                  <a:srgbClr val="007020"/>
-                </a:solidFill>
-                <a:latin typeface="Courier"/>
-              </a:rPr>
-              <a:t>library</a:t>
-            </a:r>
-            <a:r>
-              <a:rPr sz="1800">
-                <a:latin typeface="Courier"/>
-              </a:rPr>
-              <a:t>(scales) </a:t>
-            </a:r>
-            <a:r>
-              <a:rPr sz="1800" i="1">
-                <a:solidFill>
-                  <a:srgbClr val="60A0B0"/>
-                </a:solidFill>
-                <a:latin typeface="Courier"/>
-              </a:rPr>
-              <a:t># to make y-axis in non-scientific notation</a:t>
-            </a:r>
-            <a:br/>
-            <a:r>
-              <a:rPr sz="1800" b="1">
-                <a:solidFill>
-                  <a:srgbClr val="007020"/>
-                </a:solidFill>
-                <a:latin typeface="Courier"/>
-              </a:rPr>
-              <a:t>ggplot</a:t>
-            </a:r>
-            <a:r>
-              <a:rPr sz="1800">
-                <a:latin typeface="Courier"/>
-              </a:rPr>
-              <a:t>(txsamp, </a:t>
-            </a:r>
-            <a:r>
-              <a:rPr sz="1800" b="1">
-                <a:solidFill>
-                  <a:srgbClr val="007020"/>
-                </a:solidFill>
-                <a:latin typeface="Courier"/>
-              </a:rPr>
-              <a:t>aes</a:t>
-            </a:r>
-            <a:r>
-              <a:rPr sz="1800">
-                <a:latin typeface="Courier"/>
-              </a:rPr>
-              <a:t>(</a:t>
-            </a:r>
-            <a:r>
-              <a:rPr sz="1800">
-                <a:solidFill>
-                  <a:srgbClr val="902000"/>
-                </a:solidFill>
-                <a:latin typeface="Courier"/>
-              </a:rPr>
-              <a:t>x =</a:t>
-            </a:r>
-            <a:r>
-              <a:rPr sz="1800">
-                <a:latin typeface="Courier"/>
-              </a:rPr>
-              <a:t> median, </a:t>
-            </a:r>
-            <a:r>
-              <a:rPr sz="1800">
-                <a:solidFill>
-                  <a:srgbClr val="902000"/>
-                </a:solidFill>
-                <a:latin typeface="Courier"/>
-              </a:rPr>
-              <a:t>fill =</a:t>
-            </a:r>
-            <a:r>
-              <a:rPr sz="1800">
-                <a:latin typeface="Courier"/>
-              </a:rPr>
-              <a:t> city)) </a:t>
-            </a:r>
-            <a:r>
-              <a:rPr sz="1800">
-                <a:solidFill>
-                  <a:srgbClr val="666666"/>
-                </a:solidFill>
-                <a:latin typeface="Courier"/>
-              </a:rPr>
-              <a:t>+</a:t>
-            </a:r>
-            <a:br/>
-            <a:r>
-              <a:rPr sz="1800">
-                <a:solidFill>
-                  <a:srgbClr val="4070A0"/>
-                </a:solidFill>
-                <a:latin typeface="Courier"/>
-              </a:rPr>
-              <a:t>  </a:t>
-            </a:r>
-            <a:r>
-              <a:rPr sz="1800" b="1">
-                <a:solidFill>
-                  <a:srgbClr val="007020"/>
-                </a:solidFill>
-                <a:latin typeface="Courier"/>
-              </a:rPr>
-              <a:t>geom_histogram</a:t>
-            </a:r>
-            <a:r>
-              <a:rPr sz="1800">
-                <a:latin typeface="Courier"/>
-              </a:rPr>
-              <a:t>(</a:t>
-            </a:r>
-            <a:r>
-              <a:rPr sz="1800" b="1">
-                <a:solidFill>
-                  <a:srgbClr val="007020"/>
-                </a:solidFill>
-                <a:latin typeface="Courier"/>
-              </a:rPr>
-              <a:t>aes</a:t>
-            </a:r>
-            <a:r>
-              <a:rPr sz="1800">
-                <a:latin typeface="Courier"/>
-              </a:rPr>
-              <a:t>(</a:t>
-            </a:r>
-            <a:r>
-              <a:rPr sz="1800">
-                <a:solidFill>
-                  <a:srgbClr val="902000"/>
-                </a:solidFill>
-                <a:latin typeface="Courier"/>
-              </a:rPr>
-              <a:t>weight =</a:t>
-            </a:r>
-            <a:r>
-              <a:rPr sz="1800">
-                <a:latin typeface="Courier"/>
-              </a:rPr>
-              <a:t> sales), </a:t>
-            </a:r>
-            <a:r>
-              <a:rPr sz="1800">
-                <a:solidFill>
-                  <a:srgbClr val="902000"/>
-                </a:solidFill>
-                <a:latin typeface="Courier"/>
-              </a:rPr>
-              <a:t>position =</a:t>
-            </a:r>
-            <a:r>
-              <a:rPr sz="1800">
-                <a:latin typeface="Courier"/>
-              </a:rPr>
-              <a:t> </a:t>
-            </a:r>
-            <a:r>
-              <a:rPr sz="1800">
-                <a:solidFill>
-                  <a:srgbClr val="4070A0"/>
-                </a:solidFill>
-                <a:latin typeface="Courier"/>
-              </a:rPr>
-              <a:t>"dodge"</a:t>
-            </a:r>
-            <a:r>
-              <a:rPr sz="1800">
-                <a:latin typeface="Courier"/>
-              </a:rPr>
-              <a:t>, </a:t>
-            </a:r>
-            <a:r>
-              <a:rPr sz="1800">
-                <a:solidFill>
-                  <a:srgbClr val="902000"/>
-                </a:solidFill>
-                <a:latin typeface="Courier"/>
-              </a:rPr>
-              <a:t>binwidth =</a:t>
-            </a:r>
-            <a:r>
-              <a:rPr sz="1800">
-                <a:latin typeface="Courier"/>
-              </a:rPr>
-              <a:t> </a:t>
-            </a:r>
-            <a:r>
-              <a:rPr sz="1800">
-                <a:solidFill>
-                  <a:srgbClr val="40A070"/>
-                </a:solidFill>
-                <a:latin typeface="Courier"/>
-              </a:rPr>
-              <a:t>15000</a:t>
-            </a:r>
-            <a:r>
-              <a:rPr sz="1800">
-                <a:latin typeface="Courier"/>
-              </a:rPr>
-              <a:t>) </a:t>
-            </a:r>
-            <a:r>
-              <a:rPr sz="1800">
-                <a:solidFill>
-                  <a:srgbClr val="666666"/>
-                </a:solidFill>
-                <a:latin typeface="Courier"/>
-              </a:rPr>
-              <a:t>+</a:t>
-            </a:r>
-            <a:br/>
-            <a:r>
-              <a:rPr sz="1800">
-                <a:solidFill>
-                  <a:srgbClr val="4070A0"/>
-                </a:solidFill>
-                <a:latin typeface="Courier"/>
-              </a:rPr>
-              <a:t>  </a:t>
-            </a:r>
-            <a:r>
-              <a:rPr sz="1800" b="1">
-                <a:solidFill>
-                  <a:srgbClr val="007020"/>
-                </a:solidFill>
-                <a:latin typeface="Courier"/>
-              </a:rPr>
-              <a:t>scale_fill_viridis_d</a:t>
-            </a:r>
-            <a:r>
-              <a:rPr sz="1800">
-                <a:latin typeface="Courier"/>
-              </a:rPr>
-              <a:t>(</a:t>
-            </a:r>
-            <a:r>
-              <a:rPr sz="1800">
-                <a:solidFill>
-                  <a:srgbClr val="902000"/>
-                </a:solidFill>
-                <a:latin typeface="Courier"/>
-              </a:rPr>
-              <a:t>option =</a:t>
-            </a:r>
-            <a:r>
-              <a:rPr sz="1800">
-                <a:latin typeface="Courier"/>
-              </a:rPr>
-              <a:t> params</a:t>
-            </a:r>
-            <a:r>
-              <a:rPr sz="1800">
-                <a:solidFill>
-                  <a:srgbClr val="666666"/>
-                </a:solidFill>
-                <a:latin typeface="Courier"/>
-              </a:rPr>
-              <a:t>$</a:t>
-            </a:r>
-            <a:r>
-              <a:rPr sz="1800">
-                <a:latin typeface="Courier"/>
-              </a:rPr>
-              <a:t>viridis_palette)</a:t>
-            </a:r>
-            <a:r>
-              <a:rPr sz="1800">
-                <a:solidFill>
-                  <a:srgbClr val="666666"/>
-                </a:solidFill>
-                <a:latin typeface="Courier"/>
-              </a:rPr>
-              <a:t>+</a:t>
-            </a:r>
-            <a:br/>
-            <a:r>
-              <a:rPr sz="1800">
-                <a:solidFill>
-                  <a:srgbClr val="4070A0"/>
-                </a:solidFill>
-                <a:latin typeface="Courier"/>
-              </a:rPr>
-              <a:t>  </a:t>
-            </a:r>
-            <a:r>
-              <a:rPr sz="1800" b="1">
-                <a:solidFill>
-                  <a:srgbClr val="007020"/>
-                </a:solidFill>
-                <a:latin typeface="Courier"/>
-              </a:rPr>
-              <a:t>scale_y_continuous</a:t>
-            </a:r>
-            <a:r>
-              <a:rPr sz="1800">
-                <a:latin typeface="Courier"/>
-              </a:rPr>
-              <a:t>(</a:t>
-            </a:r>
-            <a:r>
-              <a:rPr sz="1800">
-                <a:solidFill>
-                  <a:srgbClr val="902000"/>
-                </a:solidFill>
-                <a:latin typeface="Courier"/>
-              </a:rPr>
-              <a:t>labels =</a:t>
-            </a:r>
-            <a:r>
-              <a:rPr sz="1800">
-                <a:latin typeface="Courier"/>
-              </a:rPr>
-              <a:t> comma)</a:t>
-            </a:r>
-          </a:p>
-        </p:txBody>
-      </p:sp>
+      <p:pic>
+        <p:nvPicPr>
+          <p:cNvPr descr="/Users/alison/rprojs/rmd-render-factory/gallery/outputs/slides/powerpoint_presentation_files/figure-pptx/unnamed-chunk-7-1.png" id="0" name="Picture 1"/>
+          <p:cNvPicPr>
+            <a:picLocks noGrp="1" noChangeAspect="1"/>
+          </p:cNvPicPr>
+          <p:nvPr/>
+        </p:nvPicPr>
+        <p:blipFill>
+          <a:blip r:embed="rId2"/>
+          <a:stretch>
+            <a:fillRect/>
+          </a:stretch>
+        </p:blipFill>
+        <p:spPr bwMode="auto">
+          <a:xfrm>
+            <a:off x="1752600" y="1600200"/>
+            <a:ext cx="5651500" cy="4521200"/>
+          </a:xfrm>
+          <a:prstGeom prst="rect">
+            <a:avLst/>
+          </a:prstGeom>
+          <a:noFill/>
+          <a:ln w="9525">
+            <a:noFill/>
+            <a:headEnd/>
+            <a:tailEnd/>
+          </a:ln>
+        </p:spPr>
+      </p:pic>
     </p:spTree>
   </p:cSld>
 </p:sld>

</xml_diff>

<commit_message>
make webshot viewports more colorful
</commit_message>
<xml_diff>
--- a/gallery/outputs/slides/powerpoint_presentation.pptx
+++ b/gallery/outputs/slides/powerpoint_presentation.pptx
@@ -15,6 +15,7 @@
     <p:sldId id="263" r:id="rId9"/>
     <p:sldId id="264" r:id="rId10"/>
     <p:sldId id="265" r:id="rId11"/>
+    <p:sldId id="266" r:id="rId12"/>
   </p:sldIdLst>
   <p:sldSz cx="9144000" cy="6858000" type="screen4x3"/>
   <p:notesSz cx="6858000" cy="9144000"/>
@@ -3255,483 +3256,9 @@
           <a:chExt cx="0" cy="0"/>
         </a:xfrm>
       </p:grpSpPr>
-      <p:sp>
-        <p:nvSpPr>
-          <p:cNvPr id="2" name="Title 1"/>
-          <p:cNvSpPr>
-            <a:spLocks noGrp="1"/>
-          </p:cNvSpPr>
-          <p:nvPr>
-            <p:ph type="title"/>
-          </p:nvPr>
-        </p:nvSpPr>
-        <p:spPr/>
-        <p:txBody>
-          <a:bodyPr/>
-          <a:lstStyle/>
-          <a:p>
-            <a:pPr lvl="0" marL="0" indent="0">
-              <a:buNone/>
-            </a:pPr>
-            <a:r>
-              <a:rPr/>
-              <a:t>Thanks</a:t>
-            </a:r>
-            <a:r>
-              <a:rPr/>
-              <a:t> </a:t>
-            </a:r>
-            <a:r>
-              <a:rPr/>
-              <a:t>to…</a:t>
-            </a:r>
-          </a:p>
-        </p:txBody>
-      </p:sp>
-      <p:sp>
-        <p:nvSpPr>
-          <p:cNvPr id="3" name="Content Placeholder 2"/>
-          <p:cNvSpPr>
-            <a:spLocks noGrp="1"/>
-          </p:cNvSpPr>
-          <p:nvPr>
-            <p:ph idx="1"/>
-          </p:nvPr>
-        </p:nvSpPr>
-        <p:spPr/>
-        <p:txBody>
-          <a:bodyPr/>
-          <a:lstStyle/>
-          <a:p>
-            <a:pPr lvl="1"/>
-            <a:r>
-              <a:rPr/>
-              <a:t>Jennifer Thompson: </a:t>
-            </a:r>
-            <a:r>
-              <a:rPr>
-                <a:hlinkClick r:id="rId2"/>
-              </a:rPr>
-              <a:t>https://github.com/jenniferthompson/ParamRmdExample</a:t>
-            </a:r>
-          </a:p>
-          <a:p>
-            <a:pPr lvl="1"/>
-            <a:r>
-              <a:rPr/>
-              <a:t>Garrett Grolemund: </a:t>
-            </a:r>
-            <a:r>
-              <a:rPr>
-                <a:hlinkClick r:id="rId3"/>
-              </a:rPr>
-              <a:t>https://rmarkdown.rstudio.com/lesson-6.html</a:t>
-            </a:r>
-          </a:p>
-        </p:txBody>
-      </p:sp>
-    </p:spTree>
-  </p:cSld>
-</p:sld>
-</file>
-
-<file path=ppt/slides/slide2.xml><?xml version="1.0" encoding="utf-8"?>
-<p:sld xmlns:a="http://schemas.openxmlformats.org/drawingml/2006/main" xmlns:r="http://schemas.openxmlformats.org/officeDocument/2006/relationships" xmlns:p="http://schemas.openxmlformats.org/presentationml/2006/main">
-  <p:cSld>
-    <p:spTree>
-      <p:nvGrpSpPr>
-        <p:cNvPr id="1" name=""/>
-        <p:cNvGrpSpPr/>
-        <p:nvPr/>
-      </p:nvGrpSpPr>
-      <p:grpSpPr>
-        <a:xfrm>
-          <a:off x="0" y="0"/>
-          <a:ext cx="0" cy="0"/>
-          <a:chOff x="0" y="0"/>
-          <a:chExt cx="0" cy="0"/>
-        </a:xfrm>
-      </p:grpSpPr>
-      <p:sp>
-        <p:nvSpPr>
-          <p:cNvPr id="2" name="Title 1"/>
-          <p:cNvSpPr>
-            <a:spLocks noGrp="1"/>
-          </p:cNvSpPr>
-          <p:nvPr>
-            <p:ph type="title"/>
-          </p:nvPr>
-        </p:nvSpPr>
-        <p:spPr/>
-        <p:txBody>
-          <a:bodyPr/>
-          <a:lstStyle/>
-          <a:p>
-            <a:pPr lvl="0" marL="0" indent="0">
-              <a:buNone/>
-            </a:pPr>
-            <a:r>
-              <a:rPr/>
-              <a:t>Packages</a:t>
-            </a:r>
-          </a:p>
-        </p:txBody>
-      </p:sp>
-      <p:sp>
-        <p:nvSpPr>
-          <p:cNvPr id="3" name="Content Placeholder 2"/>
-          <p:cNvSpPr>
-            <a:spLocks noGrp="1"/>
-          </p:cNvSpPr>
-          <p:nvPr>
-            <p:ph idx="1"/>
-          </p:nvPr>
-        </p:nvSpPr>
-        <p:spPr/>
-        <p:txBody>
-          <a:bodyPr/>
-          <a:lstStyle/>
-          <a:p>
-            <a:pPr lvl="0" marL="0" indent="0">
-              <a:buNone/>
-            </a:pPr>
-            <a:r>
-              <a:rPr/>
-              <a:t>We’ll use </a:t>
-            </a:r>
-            <a:r>
-              <a:rPr sz="1800">
-                <a:latin typeface="Courier"/>
-              </a:rPr>
-              <a:t>ggplot2</a:t>
-            </a:r>
-            <a:r>
-              <a:rPr/>
-              <a:t> for visualization, and some light </a:t>
-            </a:r>
-            <a:r>
-              <a:rPr sz="1800">
-                <a:latin typeface="Courier"/>
-              </a:rPr>
-              <a:t>dplyr</a:t>
-            </a:r>
-            <a:r>
-              <a:rPr/>
-              <a:t> for data wrangling.</a:t>
-            </a:r>
-          </a:p>
-        </p:txBody>
-      </p:sp>
-    </p:spTree>
-  </p:cSld>
-</p:sld>
-</file>
-
-<file path=ppt/slides/slide3.xml><?xml version="1.0" encoding="utf-8"?>
-<p:sld xmlns:a="http://schemas.openxmlformats.org/drawingml/2006/main" xmlns:r="http://schemas.openxmlformats.org/officeDocument/2006/relationships" xmlns:p="http://schemas.openxmlformats.org/presentationml/2006/main">
-  <p:cSld>
-    <p:spTree>
-      <p:nvGrpSpPr>
-        <p:cNvPr id="1" name=""/>
-        <p:cNvGrpSpPr/>
-        <p:nvPr/>
-      </p:nvGrpSpPr>
-      <p:grpSpPr>
-        <a:xfrm>
-          <a:off x="0" y="0"/>
-          <a:ext cx="0" cy="0"/>
-          <a:chOff x="0" y="0"/>
-          <a:chExt cx="0" cy="0"/>
-        </a:xfrm>
-      </p:grpSpPr>
-      <p:sp>
-        <p:nvSpPr>
-          <p:cNvPr id="2" name="Title 1"/>
-          <p:cNvSpPr>
-            <a:spLocks noGrp="1"/>
-          </p:cNvSpPr>
-          <p:nvPr>
-            <p:ph type="title"/>
-          </p:nvPr>
-        </p:nvSpPr>
-        <p:spPr/>
-        <p:txBody>
-          <a:bodyPr/>
-          <a:lstStyle/>
-          <a:p>
-            <a:pPr lvl="0" marL="0" indent="0">
-              <a:buNone/>
-            </a:pPr>
-            <a:r>
-              <a:rPr/>
-              <a:t>Texas</a:t>
-            </a:r>
-            <a:r>
-              <a:rPr/>
-              <a:t> </a:t>
-            </a:r>
-            <a:r>
-              <a:rPr/>
-              <a:t>housing</a:t>
-            </a:r>
-            <a:r>
-              <a:rPr/>
-              <a:t> </a:t>
-            </a:r>
-            <a:r>
-              <a:rPr/>
-              <a:t>data</a:t>
-            </a:r>
-          </a:p>
-        </p:txBody>
-      </p:sp>
-      <p:sp>
-        <p:nvSpPr>
-          <p:cNvPr id="3" name="Content Placeholder 2"/>
-          <p:cNvSpPr>
-            <a:spLocks noGrp="1"/>
-          </p:cNvSpPr>
-          <p:nvPr>
-            <p:ph idx="1"/>
-          </p:nvPr>
-        </p:nvSpPr>
-        <p:spPr/>
-        <p:txBody>
-          <a:bodyPr/>
-          <a:lstStyle/>
-          <a:p>
-            <a:pPr lvl="0" marL="0" indent="0">
-              <a:buNone/>
-            </a:pPr>
-            <a:r>
-              <a:rPr/>
-              <a:t>This data is loaded for you when you install and load the </a:t>
-            </a:r>
-            <a:r>
-              <a:rPr sz="1800">
-                <a:latin typeface="Courier"/>
-              </a:rPr>
-              <a:t>ggplot2</a:t>
-            </a:r>
-            <a:r>
-              <a:rPr/>
-              <a:t> package.</a:t>
-            </a:r>
-          </a:p>
-          <a:p>
-            <a:pPr lvl="0" marL="1270000" indent="0">
-              <a:buNone/>
-            </a:pPr>
-            <a:r>
-              <a:rPr sz="1800">
-                <a:latin typeface="Courier"/>
-              </a:rPr>
-              <a:t>## Observations: 935
-## Variables: 9
-## $ city      &lt;chr&gt; "Austin", "Austin", "Austin", "Austin", "Austin", "Aus…
-## $ year      &lt;int&gt; 2000, 2000, 2000, 2000, 2000, 2000, 2000, 2000, 2000, …
-## $ month     &lt;int&gt; 1, 2, 3, 4, 5, 6, 7, 8, 9, 10, 11, 12, 1, 2, 3, 4, 5, …
-## $ sales     &lt;dbl&gt; 1025, 1277, 1603, 1556, 1980, 1885, 1818, 1880, 1498, …
-## $ volume    &lt;dbl&gt; 173053635, 226038438, 298557656, 289197960, 393073774,…
-## $ median    &lt;dbl&gt; 133700, 134000, 136700, 136900, 144700, 148800, 149300…
-## $ listings  &lt;dbl&gt; 3084, 2989, 3042, 3192, 3617, 3799, 3944, 3948, 4058, …
-## $ inventory &lt;dbl&gt; 2.0, 2.0, 2.0, 2.1, 2.3, 2.4, 2.6, 2.6, 2.6, 2.6, 2.7,…
-## $ date      &lt;dbl&gt; 2000.000, 2000.083, 2000.167, 2000.250, 2000.333, 2000…</a:t>
-            </a:r>
-          </a:p>
-        </p:txBody>
-      </p:sp>
-    </p:spTree>
-  </p:cSld>
-</p:sld>
-</file>
-
-<file path=ppt/slides/slide4.xml><?xml version="1.0" encoding="utf-8"?>
-<p:sld xmlns:a="http://schemas.openxmlformats.org/drawingml/2006/main" xmlns:r="http://schemas.openxmlformats.org/officeDocument/2006/relationships" xmlns:p="http://schemas.openxmlformats.org/presentationml/2006/main">
-  <p:cSld>
-    <p:spTree>
-      <p:nvGrpSpPr>
-        <p:cNvPr id="1" name=""/>
-        <p:cNvGrpSpPr/>
-        <p:nvPr/>
-      </p:nvGrpSpPr>
-      <p:grpSpPr>
-        <a:xfrm>
-          <a:off x="0" y="0"/>
-          <a:ext cx="0" cy="0"/>
-          <a:chOff x="0" y="0"/>
-          <a:chExt cx="0" cy="0"/>
-        </a:xfrm>
-      </p:grpSpPr>
-      <p:sp>
-        <p:nvSpPr>
-          <p:cNvPr id="2" name="Title 1"/>
-          <p:cNvSpPr>
-            <a:spLocks noGrp="1"/>
-          </p:cNvSpPr>
-          <p:nvPr>
-            <p:ph type="title"/>
-          </p:nvPr>
-        </p:nvSpPr>
-        <p:spPr/>
-        <p:txBody>
-          <a:bodyPr/>
-          <a:lstStyle/>
-          <a:p>
-            <a:pPr lvl="0" marL="0" indent="0">
-              <a:buNone/>
-            </a:pPr>
-            <a:r>
-              <a:rPr/>
-              <a:t>Our</a:t>
-            </a:r>
-            <a:r>
-              <a:rPr/>
-              <a:t> </a:t>
-            </a:r>
-            <a:r>
-              <a:rPr/>
-              <a:t>data</a:t>
-            </a:r>
-            <a:r>
-              <a:rPr/>
-              <a:t> </a:t>
-            </a:r>
-            <a:r>
-              <a:rPr/>
-              <a:t>is</a:t>
-            </a:r>
-            <a:r>
-              <a:rPr/>
-              <a:t> </a:t>
-            </a:r>
-            <a:r>
-              <a:rPr/>
-              <a:t>monthly</a:t>
-            </a:r>
-          </a:p>
-        </p:txBody>
-      </p:sp>
-      <p:sp>
-        <p:nvSpPr>
-          <p:cNvPr id="3" name="Content Placeholder 2"/>
-          <p:cNvSpPr>
-            <a:spLocks noGrp="1"/>
-          </p:cNvSpPr>
-          <p:nvPr>
-            <p:ph idx="1"/>
-          </p:nvPr>
-        </p:nvSpPr>
-        <p:spPr/>
-        <p:txBody>
-          <a:bodyPr/>
-          <a:lstStyle/>
-          <a:p>
-            <a:pPr lvl="0" marL="0" indent="0">
-              <a:buNone/>
-            </a:pPr>
-            <a:r>
-              <a:rPr/>
-              <a:t>Here is just a sample of rows from one city to show that we have data for each of the 12 months for each year, except for 2015.</a:t>
-            </a:r>
-          </a:p>
-          <a:p>
-            <a:pPr lvl="0" marL="1270000" indent="0">
-              <a:buNone/>
-            </a:pPr>
-            <a:r>
-              <a:rPr sz="1800">
-                <a:latin typeface="Courier"/>
-              </a:rPr>
-              <a:t>## # A tibble: 16 x 2
-##     year     n
-##    &lt;int&gt; &lt;int&gt;
-##  1  2000    12
-##  2  2001    12
-##  3  2002    12
-##  4  2003    12
-##  5  2004    12
-##  6  2005    12
-##  7  2006    12
-##  8  2007    12
-##  9  2008    12
-## 10  2009    12
-## 11  2010    12
-## 12  2011    12
-## 13  2012    12
-## 14  2013    12
-## 15  2014    12
-## 16  2015     7</a:t>
-            </a:r>
-          </a:p>
-        </p:txBody>
-      </p:sp>
-    </p:spTree>
-  </p:cSld>
-</p:sld>
-</file>
-
-<file path=ppt/slides/slide5.xml><?xml version="1.0" encoding="utf-8"?>
-<p:sld xmlns:a="http://schemas.openxmlformats.org/drawingml/2006/main" xmlns:r="http://schemas.openxmlformats.org/officeDocument/2006/relationships" xmlns:p="http://schemas.openxmlformats.org/presentationml/2006/main">
-  <p:cSld>
-    <p:spTree>
-      <p:nvGrpSpPr>
-        <p:cNvPr id="1" name=""/>
-        <p:cNvGrpSpPr/>
-        <p:nvPr/>
-      </p:nvGrpSpPr>
-      <p:grpSpPr>
-        <a:xfrm>
-          <a:off x="0" y="0"/>
-          <a:ext cx="0" cy="0"/>
-          <a:chOff x="0" y="0"/>
-          <a:chExt cx="0" cy="0"/>
-        </a:xfrm>
-      </p:grpSpPr>
-      <p:sp>
-        <p:nvSpPr>
-          <p:cNvPr id="2" name="Title 1"/>
-          <p:cNvSpPr>
-            <a:spLocks noGrp="1"/>
-          </p:cNvSpPr>
-          <p:nvPr>
-            <p:ph type="title"/>
-          </p:nvPr>
-        </p:nvSpPr>
-        <p:spPr/>
-        <p:txBody>
-          <a:bodyPr/>
-          <a:lstStyle/>
-          <a:p>
-            <a:pPr lvl="0" marL="0" indent="0">
-              <a:buNone/>
-            </a:pPr>
-            <a:r>
-              <a:rPr/>
-              <a:t>Austin</a:t>
-            </a:r>
-            <a:r>
-              <a:rPr/>
-              <a:t> </a:t>
-            </a:r>
-            <a:r>
-              <a:rPr/>
-              <a:t>is</a:t>
-            </a:r>
-            <a:r>
-              <a:rPr/>
-              <a:t> </a:t>
-            </a:r>
-            <a:r>
-              <a:rPr/>
-              <a:t>expensive</a:t>
-            </a:r>
-          </a:p>
-        </p:txBody>
-      </p:sp>
       <p:pic>
         <p:nvPicPr>
-          <p:cNvPr descr="/Users/alison/rprojs/rmd-render-factory/gallery/outputs/slides/powerpoint_presentation_files/figure-pptx/unnamed-chunk-4-1.png" id="0" name="Picture 1"/>
+          <p:cNvPr descr="/Users/alison/rprojs/rmd-render-factory/gallery/outputs/slides/powerpoint_presentation_files/figure-pptx/unnamed-chunk-5-1.png" id="0" name="Picture 1"/>
           <p:cNvPicPr>
             <a:picLocks noGrp="1" noChangeAspect="1"/>
           </p:cNvPicPr>
@@ -3764,6 +3291,1217 @@
 </p:sld>
 </file>
 
+<file path=ppt/slides/slide11.xml><?xml version="1.0" encoding="utf-8"?>
+<p:sld xmlns:a="http://schemas.openxmlformats.org/drawingml/2006/main" xmlns:r="http://schemas.openxmlformats.org/officeDocument/2006/relationships" xmlns:p="http://schemas.openxmlformats.org/presentationml/2006/main">
+  <p:cSld>
+    <p:spTree>
+      <p:nvGrpSpPr>
+        <p:cNvPr id="1" name=""/>
+        <p:cNvGrpSpPr/>
+        <p:nvPr/>
+      </p:nvGrpSpPr>
+      <p:grpSpPr>
+        <a:xfrm>
+          <a:off x="0" y="0"/>
+          <a:ext cx="0" cy="0"/>
+          <a:chOff x="0" y="0"/>
+          <a:chExt cx="0" cy="0"/>
+        </a:xfrm>
+      </p:grpSpPr>
+      <p:sp>
+        <p:nvSpPr>
+          <p:cNvPr id="2" name="Title 1"/>
+          <p:cNvSpPr>
+            <a:spLocks noGrp="1"/>
+          </p:cNvSpPr>
+          <p:nvPr>
+            <p:ph type="title"/>
+          </p:nvPr>
+        </p:nvSpPr>
+        <p:spPr/>
+        <p:txBody>
+          <a:bodyPr/>
+          <a:lstStyle/>
+          <a:p>
+            <a:pPr lvl="0" marL="0" indent="0">
+              <a:buNone/>
+            </a:pPr>
+            <a:r>
+              <a:rPr/>
+              <a:t>Thanks</a:t>
+            </a:r>
+            <a:r>
+              <a:rPr/>
+              <a:t> </a:t>
+            </a:r>
+            <a:r>
+              <a:rPr/>
+              <a:t>to…</a:t>
+            </a:r>
+          </a:p>
+        </p:txBody>
+      </p:sp>
+      <p:sp>
+        <p:nvSpPr>
+          <p:cNvPr id="3" name="Content Placeholder 2"/>
+          <p:cNvSpPr>
+            <a:spLocks noGrp="1"/>
+          </p:cNvSpPr>
+          <p:nvPr>
+            <p:ph idx="1"/>
+          </p:nvPr>
+        </p:nvSpPr>
+        <p:spPr/>
+        <p:txBody>
+          <a:bodyPr/>
+          <a:lstStyle/>
+          <a:p>
+            <a:pPr lvl="1"/>
+            <a:r>
+              <a:rPr/>
+              <a:t>Jennifer Thompson: </a:t>
+            </a:r>
+            <a:r>
+              <a:rPr>
+                <a:hlinkClick r:id="rId2"/>
+              </a:rPr>
+              <a:t>https://github.com/jenniferthompson/ParamRmdExample</a:t>
+            </a:r>
+          </a:p>
+          <a:p>
+            <a:pPr lvl="1"/>
+            <a:r>
+              <a:rPr/>
+              <a:t>Garrett Grolemund: </a:t>
+            </a:r>
+            <a:r>
+              <a:rPr>
+                <a:hlinkClick r:id="rId3"/>
+              </a:rPr>
+              <a:t>https://rmarkdown.rstudio.com/lesson-6.html</a:t>
+            </a:r>
+          </a:p>
+        </p:txBody>
+      </p:sp>
+    </p:spTree>
+  </p:cSld>
+</p:sld>
+</file>
+
+<file path=ppt/slides/slide2.xml><?xml version="1.0" encoding="utf-8"?>
+<p:sld xmlns:a="http://schemas.openxmlformats.org/drawingml/2006/main" xmlns:r="http://schemas.openxmlformats.org/officeDocument/2006/relationships" xmlns:p="http://schemas.openxmlformats.org/presentationml/2006/main">
+  <p:cSld>
+    <p:spTree>
+      <p:nvGrpSpPr>
+        <p:cNvPr id="1" name=""/>
+        <p:cNvGrpSpPr/>
+        <p:nvPr/>
+      </p:nvGrpSpPr>
+      <p:grpSpPr>
+        <a:xfrm>
+          <a:off x="0" y="0"/>
+          <a:ext cx="0" cy="0"/>
+          <a:chOff x="0" y="0"/>
+          <a:chExt cx="0" cy="0"/>
+        </a:xfrm>
+      </p:grpSpPr>
+      <p:sp>
+        <p:nvSpPr>
+          <p:cNvPr id="2" name="Title 1"/>
+          <p:cNvSpPr>
+            <a:spLocks noGrp="1"/>
+          </p:cNvSpPr>
+          <p:nvPr>
+            <p:ph type="title"/>
+          </p:nvPr>
+        </p:nvSpPr>
+        <p:spPr/>
+        <p:txBody>
+          <a:bodyPr/>
+          <a:lstStyle/>
+          <a:p>
+            <a:pPr lvl="0" marL="0" indent="0">
+              <a:buNone/>
+            </a:pPr>
+            <a:r>
+              <a:rPr/>
+              <a:t>Packages</a:t>
+            </a:r>
+            <a:r>
+              <a:rPr/>
+              <a:t> </a:t>
+            </a:r>
+            <a:r>
+              <a:rPr/>
+              <a:t>and</a:t>
+            </a:r>
+            <a:r>
+              <a:rPr/>
+              <a:t> </a:t>
+            </a:r>
+            <a:r>
+              <a:rPr/>
+              <a:t>data</a:t>
+            </a:r>
+          </a:p>
+        </p:txBody>
+      </p:sp>
+      <p:sp>
+        <p:nvSpPr>
+          <p:cNvPr id="3" name="Content Placeholder 2"/>
+          <p:cNvSpPr>
+            <a:spLocks noGrp="1"/>
+          </p:cNvSpPr>
+          <p:nvPr>
+            <p:ph idx="1"/>
+          </p:nvPr>
+        </p:nvSpPr>
+        <p:spPr/>
+        <p:txBody>
+          <a:bodyPr/>
+          <a:lstStyle/>
+          <a:p>
+            <a:pPr lvl="0" marL="0" indent="0">
+              <a:buNone/>
+            </a:pPr>
+            <a:r>
+              <a:rPr/>
+              <a:t>We’ll use </a:t>
+            </a:r>
+            <a:r>
+              <a:rPr sz="1800">
+                <a:latin typeface="Courier"/>
+              </a:rPr>
+              <a:t>ggplot2</a:t>
+            </a:r>
+            <a:r>
+              <a:rPr/>
+              <a:t> for visualization, and some light </a:t>
+            </a:r>
+            <a:r>
+              <a:rPr sz="1800">
+                <a:latin typeface="Courier"/>
+              </a:rPr>
+              <a:t>dplyr</a:t>
+            </a:r>
+            <a:r>
+              <a:rPr/>
+              <a:t> for data wrangling. The </a:t>
+            </a:r>
+            <a:r>
+              <a:rPr sz="1800">
+                <a:latin typeface="Courier"/>
+              </a:rPr>
+              <a:t>txhousing</a:t>
+            </a:r>
+            <a:r>
+              <a:rPr/>
+              <a:t> data is loaded for you when you install and load the </a:t>
+            </a:r>
+            <a:r>
+              <a:rPr sz="1800">
+                <a:latin typeface="Courier"/>
+              </a:rPr>
+              <a:t>ggplot2</a:t>
+            </a:r>
+            <a:r>
+              <a:rPr/>
+              <a:t> package.</a:t>
+            </a:r>
+          </a:p>
+          <a:p>
+            <a:pPr lvl="0" marL="1270000" indent="0">
+              <a:buNone/>
+            </a:pPr>
+            <a:r>
+              <a:rPr sz="1800" b="1">
+                <a:solidFill>
+                  <a:srgbClr val="007020"/>
+                </a:solidFill>
+                <a:latin typeface="Courier"/>
+              </a:rPr>
+              <a:t>library</a:t>
+            </a:r>
+            <a:r>
+              <a:rPr sz="1800">
+                <a:latin typeface="Courier"/>
+              </a:rPr>
+              <a:t>(ggplot2) </a:t>
+            </a:r>
+            <a:r>
+              <a:rPr sz="1800" i="1">
+                <a:solidFill>
+                  <a:srgbClr val="60A0B0"/>
+                </a:solidFill>
+                <a:latin typeface="Courier"/>
+              </a:rPr>
+              <a:t># plotting</a:t>
+            </a:r>
+            <a:br/>
+            <a:r>
+              <a:rPr sz="1800" b="1">
+                <a:solidFill>
+                  <a:srgbClr val="007020"/>
+                </a:solidFill>
+                <a:latin typeface="Courier"/>
+              </a:rPr>
+              <a:t>library</a:t>
+            </a:r>
+            <a:r>
+              <a:rPr sz="1800">
+                <a:latin typeface="Courier"/>
+              </a:rPr>
+              <a:t>(dplyr) </a:t>
+            </a:r>
+            <a:r>
+              <a:rPr sz="1800" i="1">
+                <a:solidFill>
+                  <a:srgbClr val="60A0B0"/>
+                </a:solidFill>
+                <a:latin typeface="Courier"/>
+              </a:rPr>
+              <a:t># wrangling</a:t>
+            </a:r>
+            <a:br/>
+            <a:r>
+              <a:rPr sz="1800">
+                <a:latin typeface="Courier"/>
+              </a:rPr>
+              <a:t>txsamp &lt;-</a:t>
+            </a:r>
+            <a:r>
+              <a:rPr sz="1800">
+                <a:solidFill>
+                  <a:srgbClr val="4070A0"/>
+                </a:solidFill>
+                <a:latin typeface="Courier"/>
+              </a:rPr>
+              <a:t> </a:t>
+            </a:r>
+            <a:r>
+              <a:rPr sz="1800">
+                <a:latin typeface="Courier"/>
+              </a:rPr>
+              <a:t>txhousing </a:t>
+            </a:r>
+            <a:r>
+              <a:rPr sz="1800">
+                <a:solidFill>
+                  <a:srgbClr val="666666"/>
+                </a:solidFill>
+                <a:latin typeface="Courier"/>
+              </a:rPr>
+              <a:t>%&gt;%</a:t>
+            </a:r>
+            <a:r>
+              <a:rPr sz="1800">
+                <a:solidFill>
+                  <a:srgbClr val="4070A0"/>
+                </a:solidFill>
+                <a:latin typeface="Courier"/>
+              </a:rPr>
+              <a:t> </a:t>
+            </a:r>
+            <a:br/>
+            <a:r>
+              <a:rPr sz="1800">
+                <a:solidFill>
+                  <a:srgbClr val="4070A0"/>
+                </a:solidFill>
+                <a:latin typeface="Courier"/>
+              </a:rPr>
+              <a:t>  </a:t>
+            </a:r>
+            <a:r>
+              <a:rPr sz="1800" b="1">
+                <a:solidFill>
+                  <a:srgbClr val="007020"/>
+                </a:solidFill>
+                <a:latin typeface="Courier"/>
+              </a:rPr>
+              <a:t>filter</a:t>
+            </a:r>
+            <a:r>
+              <a:rPr sz="1800">
+                <a:latin typeface="Courier"/>
+              </a:rPr>
+              <a:t>(city </a:t>
+            </a:r>
+            <a:r>
+              <a:rPr sz="1800">
+                <a:solidFill>
+                  <a:srgbClr val="666666"/>
+                </a:solidFill>
+                <a:latin typeface="Courier"/>
+              </a:rPr>
+              <a:t>%in%</a:t>
+            </a:r>
+            <a:r>
+              <a:rPr sz="1800">
+                <a:solidFill>
+                  <a:srgbClr val="4070A0"/>
+                </a:solidFill>
+                <a:latin typeface="Courier"/>
+              </a:rPr>
+              <a:t> </a:t>
+            </a:r>
+            <a:r>
+              <a:rPr sz="1800" b="1">
+                <a:solidFill>
+                  <a:srgbClr val="007020"/>
+                </a:solidFill>
+                <a:latin typeface="Courier"/>
+              </a:rPr>
+              <a:t>c</a:t>
+            </a:r>
+            <a:r>
+              <a:rPr sz="1800">
+                <a:latin typeface="Courier"/>
+              </a:rPr>
+              <a:t>(</a:t>
+            </a:r>
+            <a:r>
+              <a:rPr sz="1800">
+                <a:solidFill>
+                  <a:srgbClr val="4070A0"/>
+                </a:solidFill>
+                <a:latin typeface="Courier"/>
+              </a:rPr>
+              <a:t>"Houston"</a:t>
+            </a:r>
+            <a:r>
+              <a:rPr sz="1800">
+                <a:latin typeface="Courier"/>
+              </a:rPr>
+              <a:t>, </a:t>
+            </a:r>
+            <a:r>
+              <a:rPr sz="1800">
+                <a:solidFill>
+                  <a:srgbClr val="4070A0"/>
+                </a:solidFill>
+                <a:latin typeface="Courier"/>
+              </a:rPr>
+              <a:t>"Fort Worth"</a:t>
+            </a:r>
+            <a:r>
+              <a:rPr sz="1800">
+                <a:latin typeface="Courier"/>
+              </a:rPr>
+              <a:t>, </a:t>
+            </a:r>
+            <a:r>
+              <a:rPr sz="1800">
+                <a:solidFill>
+                  <a:srgbClr val="4070A0"/>
+                </a:solidFill>
+                <a:latin typeface="Courier"/>
+              </a:rPr>
+              <a:t>"San Antonio"</a:t>
+            </a:r>
+            <a:r>
+              <a:rPr sz="1800">
+                <a:latin typeface="Courier"/>
+              </a:rPr>
+              <a:t>, </a:t>
+            </a:r>
+            <a:r>
+              <a:rPr sz="1800">
+                <a:solidFill>
+                  <a:srgbClr val="4070A0"/>
+                </a:solidFill>
+                <a:latin typeface="Courier"/>
+              </a:rPr>
+              <a:t>"Dallas"</a:t>
+            </a:r>
+            <a:r>
+              <a:rPr sz="1800">
+                <a:latin typeface="Courier"/>
+              </a:rPr>
+              <a:t>, </a:t>
+            </a:r>
+            <a:r>
+              <a:rPr sz="1800">
+                <a:solidFill>
+                  <a:srgbClr val="4070A0"/>
+                </a:solidFill>
+                <a:latin typeface="Courier"/>
+              </a:rPr>
+              <a:t>"Austin"</a:t>
+            </a:r>
+            <a:r>
+              <a:rPr sz="1800">
+                <a:latin typeface="Courier"/>
+              </a:rPr>
+              <a:t>))</a:t>
+            </a:r>
+          </a:p>
+        </p:txBody>
+      </p:sp>
+    </p:spTree>
+  </p:cSld>
+</p:sld>
+</file>
+
+<file path=ppt/slides/slide3.xml><?xml version="1.0" encoding="utf-8"?>
+<p:sld xmlns:a="http://schemas.openxmlformats.org/drawingml/2006/main" xmlns:r="http://schemas.openxmlformats.org/officeDocument/2006/relationships" xmlns:p="http://schemas.openxmlformats.org/presentationml/2006/main">
+  <p:cSld>
+    <p:spTree>
+      <p:nvGrpSpPr>
+        <p:cNvPr id="1" name=""/>
+        <p:cNvGrpSpPr/>
+        <p:nvPr/>
+      </p:nvGrpSpPr>
+      <p:grpSpPr>
+        <a:xfrm>
+          <a:off x="0" y="0"/>
+          <a:ext cx="0" cy="0"/>
+          <a:chOff x="0" y="0"/>
+          <a:chExt cx="0" cy="0"/>
+        </a:xfrm>
+      </p:grpSpPr>
+      <p:sp>
+        <p:nvSpPr>
+          <p:cNvPr id="2" name="Title 1"/>
+          <p:cNvSpPr>
+            <a:spLocks noGrp="1"/>
+          </p:cNvSpPr>
+          <p:nvPr>
+            <p:ph type="title"/>
+          </p:nvPr>
+        </p:nvSpPr>
+        <p:spPr/>
+        <p:txBody>
+          <a:bodyPr/>
+          <a:lstStyle/>
+          <a:p>
+            <a:pPr lvl="0" marL="0" indent="0">
+              <a:buNone/>
+            </a:pPr>
+            <a:r>
+              <a:rPr/>
+              <a:t>Austin</a:t>
+            </a:r>
+            <a:r>
+              <a:rPr/>
+              <a:t> </a:t>
+            </a:r>
+            <a:r>
+              <a:rPr/>
+              <a:t>is</a:t>
+            </a:r>
+            <a:r>
+              <a:rPr/>
+              <a:t> </a:t>
+            </a:r>
+            <a:r>
+              <a:rPr/>
+              <a:t>expensive</a:t>
+            </a:r>
+          </a:p>
+        </p:txBody>
+      </p:sp>
+      <p:sp>
+        <p:nvSpPr>
+          <p:cNvPr id="3" name="Content Placeholder 2"/>
+          <p:cNvSpPr>
+            <a:spLocks noGrp="1"/>
+          </p:cNvSpPr>
+          <p:nvPr>
+            <p:ph idx="1"/>
+          </p:nvPr>
+        </p:nvSpPr>
+        <p:spPr/>
+        <p:txBody>
+          <a:bodyPr/>
+          <a:lstStyle/>
+          <a:p>
+            <a:pPr lvl="0" marL="1270000" indent="0">
+              <a:buNone/>
+            </a:pPr>
+            <a:r>
+              <a:rPr sz="1800" b="1">
+                <a:solidFill>
+                  <a:srgbClr val="007020"/>
+                </a:solidFill>
+                <a:latin typeface="Courier"/>
+              </a:rPr>
+              <a:t>ggplot</a:t>
+            </a:r>
+            <a:r>
+              <a:rPr sz="1800">
+                <a:latin typeface="Courier"/>
+              </a:rPr>
+              <a:t>(</a:t>
+            </a:r>
+            <a:r>
+              <a:rPr sz="1800">
+                <a:solidFill>
+                  <a:srgbClr val="902000"/>
+                </a:solidFill>
+                <a:latin typeface="Courier"/>
+              </a:rPr>
+              <a:t>data =</a:t>
+            </a:r>
+            <a:r>
+              <a:rPr sz="1800">
+                <a:latin typeface="Courier"/>
+              </a:rPr>
+              <a:t> txsamp, </a:t>
+            </a:r>
+            <a:r>
+              <a:rPr sz="1800" b="1">
+                <a:solidFill>
+                  <a:srgbClr val="007020"/>
+                </a:solidFill>
+                <a:latin typeface="Courier"/>
+              </a:rPr>
+              <a:t>aes</a:t>
+            </a:r>
+            <a:r>
+              <a:rPr sz="1800">
+                <a:latin typeface="Courier"/>
+              </a:rPr>
+              <a:t>(</a:t>
+            </a:r>
+            <a:r>
+              <a:rPr sz="1800">
+                <a:solidFill>
+                  <a:srgbClr val="902000"/>
+                </a:solidFill>
+                <a:latin typeface="Courier"/>
+              </a:rPr>
+              <a:t>x =</a:t>
+            </a:r>
+            <a:r>
+              <a:rPr sz="1800">
+                <a:latin typeface="Courier"/>
+              </a:rPr>
+              <a:t> sales, </a:t>
+            </a:r>
+            <a:r>
+              <a:rPr sz="1800">
+                <a:solidFill>
+                  <a:srgbClr val="902000"/>
+                </a:solidFill>
+                <a:latin typeface="Courier"/>
+              </a:rPr>
+              <a:t>y =</a:t>
+            </a:r>
+            <a:r>
+              <a:rPr sz="1800">
+                <a:latin typeface="Courier"/>
+              </a:rPr>
+              <a:t> median)) </a:t>
+            </a:r>
+            <a:r>
+              <a:rPr sz="1800">
+                <a:solidFill>
+                  <a:srgbClr val="666666"/>
+                </a:solidFill>
+                <a:latin typeface="Courier"/>
+              </a:rPr>
+              <a:t>+</a:t>
+            </a:r>
+            <a:br/>
+            <a:r>
+              <a:rPr sz="1800">
+                <a:solidFill>
+                  <a:srgbClr val="4070A0"/>
+                </a:solidFill>
+                <a:latin typeface="Courier"/>
+              </a:rPr>
+              <a:t>   </a:t>
+            </a:r>
+            <a:r>
+              <a:rPr sz="1800" b="1">
+                <a:solidFill>
+                  <a:srgbClr val="007020"/>
+                </a:solidFill>
+                <a:latin typeface="Courier"/>
+              </a:rPr>
+              <a:t>geom_point</a:t>
+            </a:r>
+            <a:r>
+              <a:rPr sz="1800">
+                <a:latin typeface="Courier"/>
+              </a:rPr>
+              <a:t>(</a:t>
+            </a:r>
+            <a:r>
+              <a:rPr sz="1800" b="1">
+                <a:solidFill>
+                  <a:srgbClr val="007020"/>
+                </a:solidFill>
+                <a:latin typeface="Courier"/>
+              </a:rPr>
+              <a:t>aes</a:t>
+            </a:r>
+            <a:r>
+              <a:rPr sz="1800">
+                <a:latin typeface="Courier"/>
+              </a:rPr>
+              <a:t>(</a:t>
+            </a:r>
+            <a:r>
+              <a:rPr sz="1800">
+                <a:solidFill>
+                  <a:srgbClr val="902000"/>
+                </a:solidFill>
+                <a:latin typeface="Courier"/>
+              </a:rPr>
+              <a:t>colour =</a:t>
+            </a:r>
+            <a:r>
+              <a:rPr sz="1800">
+                <a:latin typeface="Courier"/>
+              </a:rPr>
+              <a:t> city)) </a:t>
+            </a:r>
+            <a:r>
+              <a:rPr sz="1800">
+                <a:solidFill>
+                  <a:srgbClr val="666666"/>
+                </a:solidFill>
+                <a:latin typeface="Courier"/>
+              </a:rPr>
+              <a:t>+</a:t>
+            </a:r>
+            <a:r>
+              <a:rPr sz="1800">
+                <a:solidFill>
+                  <a:srgbClr val="4070A0"/>
+                </a:solidFill>
+                <a:latin typeface="Courier"/>
+              </a:rPr>
+              <a:t> </a:t>
+            </a:r>
+            <a:br/>
+            <a:r>
+              <a:rPr sz="1800">
+                <a:solidFill>
+                  <a:srgbClr val="4070A0"/>
+                </a:solidFill>
+                <a:latin typeface="Courier"/>
+              </a:rPr>
+              <a:t>   </a:t>
+            </a:r>
+            <a:r>
+              <a:rPr sz="1800" b="1">
+                <a:solidFill>
+                  <a:srgbClr val="007020"/>
+                </a:solidFill>
+                <a:latin typeface="Courier"/>
+              </a:rPr>
+              <a:t>scale_colour_viridis_d</a:t>
+            </a:r>
+            <a:r>
+              <a:rPr sz="1800">
+                <a:latin typeface="Courier"/>
+              </a:rPr>
+              <a:t>(</a:t>
+            </a:r>
+            <a:r>
+              <a:rPr sz="1800">
+                <a:solidFill>
+                  <a:srgbClr val="4070A0"/>
+                </a:solidFill>
+                <a:latin typeface="Courier"/>
+              </a:rPr>
+              <a:t>"City\nCenter"</a:t>
+            </a:r>
+            <a:r>
+              <a:rPr sz="1800">
+                <a:latin typeface="Courier"/>
+              </a:rPr>
+              <a:t>, </a:t>
+            </a:r>
+            <a:r>
+              <a:rPr sz="1800">
+                <a:solidFill>
+                  <a:srgbClr val="902000"/>
+                </a:solidFill>
+                <a:latin typeface="Courier"/>
+              </a:rPr>
+              <a:t>option =</a:t>
+            </a:r>
+            <a:r>
+              <a:rPr sz="1800">
+                <a:latin typeface="Courier"/>
+              </a:rPr>
+              <a:t> params</a:t>
+            </a:r>
+            <a:r>
+              <a:rPr sz="1800">
+                <a:solidFill>
+                  <a:srgbClr val="666666"/>
+                </a:solidFill>
+                <a:latin typeface="Courier"/>
+              </a:rPr>
+              <a:t>$</a:t>
+            </a:r>
+            <a:r>
+              <a:rPr sz="1800">
+                <a:latin typeface="Courier"/>
+              </a:rPr>
+              <a:t>viridis_palette)</a:t>
+            </a:r>
+          </a:p>
+        </p:txBody>
+      </p:sp>
+    </p:spTree>
+  </p:cSld>
+</p:sld>
+</file>
+
+<file path=ppt/slides/slide4.xml><?xml version="1.0" encoding="utf-8"?>
+<p:sld xmlns:a="http://schemas.openxmlformats.org/drawingml/2006/main" xmlns:r="http://schemas.openxmlformats.org/officeDocument/2006/relationships" xmlns:p="http://schemas.openxmlformats.org/presentationml/2006/main">
+  <p:cSld>
+    <p:spTree>
+      <p:nvGrpSpPr>
+        <p:cNvPr id="1" name=""/>
+        <p:cNvGrpSpPr/>
+        <p:nvPr/>
+      </p:nvGrpSpPr>
+      <p:grpSpPr>
+        <a:xfrm>
+          <a:off x="0" y="0"/>
+          <a:ext cx="0" cy="0"/>
+          <a:chOff x="0" y="0"/>
+          <a:chExt cx="0" cy="0"/>
+        </a:xfrm>
+      </p:grpSpPr>
+      <p:pic>
+        <p:nvPicPr>
+          <p:cNvPr descr="/Users/alison/rprojs/rmd-render-factory/gallery/outputs/slides/powerpoint_presentation_files/figure-pptx/unnamed-chunk-2-1.png" id="0" name="Picture 1"/>
+          <p:cNvPicPr>
+            <a:picLocks noGrp="1" noChangeAspect="1"/>
+          </p:cNvPicPr>
+          <p:nvPr/>
+        </p:nvPicPr>
+        <p:blipFill>
+          <a:blip r:embed="rId2"/>
+          <a:stretch>
+            <a:fillRect/>
+          </a:stretch>
+        </p:blipFill>
+        <p:spPr bwMode="auto">
+          <a:xfrm>
+            <a:off x="1752600" y="1600200"/>
+            <a:ext cx="5651500" cy="4521200"/>
+          </a:xfrm>
+          <a:prstGeom prst="rect">
+            <a:avLst/>
+          </a:prstGeom>
+          <a:noFill/>
+          <a:ln w="9525">
+            <a:noFill/>
+            <a:headEnd/>
+            <a:tailEnd/>
+          </a:ln>
+        </p:spPr>
+      </p:pic>
+    </p:spTree>
+  </p:cSld>
+</p:sld>
+</file>
+
+<file path=ppt/slides/slide5.xml><?xml version="1.0" encoding="utf-8"?>
+<p:sld xmlns:a="http://schemas.openxmlformats.org/drawingml/2006/main" xmlns:r="http://schemas.openxmlformats.org/officeDocument/2006/relationships" xmlns:p="http://schemas.openxmlformats.org/presentationml/2006/main">
+  <p:cSld>
+    <p:spTree>
+      <p:nvGrpSpPr>
+        <p:cNvPr id="1" name=""/>
+        <p:cNvGrpSpPr/>
+        <p:nvPr/>
+      </p:nvGrpSpPr>
+      <p:grpSpPr>
+        <a:xfrm>
+          <a:off x="0" y="0"/>
+          <a:ext cx="0" cy="0"/>
+          <a:chOff x="0" y="0"/>
+          <a:chExt cx="0" cy="0"/>
+        </a:xfrm>
+      </p:grpSpPr>
+      <p:sp>
+        <p:nvSpPr>
+          <p:cNvPr id="2" name="Title 1"/>
+          <p:cNvSpPr>
+            <a:spLocks noGrp="1"/>
+          </p:cNvSpPr>
+          <p:nvPr>
+            <p:ph type="title"/>
+          </p:nvPr>
+        </p:nvSpPr>
+        <p:spPr/>
+        <p:txBody>
+          <a:bodyPr/>
+          <a:lstStyle/>
+          <a:p>
+            <a:pPr lvl="0" marL="0" indent="0">
+              <a:buNone/>
+            </a:pPr>
+            <a:r>
+              <a:rPr/>
+              <a:t>Austin</a:t>
+            </a:r>
+            <a:r>
+              <a:rPr/>
+              <a:t> </a:t>
+            </a:r>
+            <a:r>
+              <a:rPr/>
+              <a:t>prices</a:t>
+            </a:r>
+            <a:r>
+              <a:rPr/>
+              <a:t> </a:t>
+            </a:r>
+            <a:r>
+              <a:rPr/>
+              <a:t>on</a:t>
+            </a:r>
+            <a:r>
+              <a:rPr/>
+              <a:t> </a:t>
+            </a:r>
+            <a:r>
+              <a:rPr/>
+              <a:t>the</a:t>
+            </a:r>
+            <a:r>
+              <a:rPr/>
+              <a:t> </a:t>
+            </a:r>
+            <a:r>
+              <a:rPr/>
+              <a:t>rise</a:t>
+            </a:r>
+          </a:p>
+        </p:txBody>
+      </p:sp>
+      <p:sp>
+        <p:nvSpPr>
+          <p:cNvPr id="3" name="Content Placeholder 2"/>
+          <p:cNvSpPr>
+            <a:spLocks noGrp="1"/>
+          </p:cNvSpPr>
+          <p:nvPr>
+            <p:ph idx="1"/>
+          </p:nvPr>
+        </p:nvSpPr>
+        <p:spPr/>
+        <p:txBody>
+          <a:bodyPr/>
+          <a:lstStyle/>
+          <a:p>
+            <a:pPr lvl="0" marL="1270000" indent="0">
+              <a:buNone/>
+            </a:pPr>
+            <a:r>
+              <a:rPr sz="1800" b="1">
+                <a:solidFill>
+                  <a:srgbClr val="007020"/>
+                </a:solidFill>
+                <a:latin typeface="Courier"/>
+              </a:rPr>
+              <a:t>ggplot</a:t>
+            </a:r>
+            <a:r>
+              <a:rPr sz="1800">
+                <a:latin typeface="Courier"/>
+              </a:rPr>
+              <a:t>(</a:t>
+            </a:r>
+            <a:r>
+              <a:rPr sz="1800">
+                <a:solidFill>
+                  <a:srgbClr val="902000"/>
+                </a:solidFill>
+                <a:latin typeface="Courier"/>
+              </a:rPr>
+              <a:t>data =</a:t>
+            </a:r>
+            <a:r>
+              <a:rPr sz="1800">
+                <a:latin typeface="Courier"/>
+              </a:rPr>
+              <a:t> </a:t>
+            </a:r>
+            <a:r>
+              <a:rPr sz="1800" b="1">
+                <a:solidFill>
+                  <a:srgbClr val="007020"/>
+                </a:solidFill>
+                <a:latin typeface="Courier"/>
+              </a:rPr>
+              <a:t>filter</a:t>
+            </a:r>
+            <a:r>
+              <a:rPr sz="1800">
+                <a:latin typeface="Courier"/>
+              </a:rPr>
+              <a:t>(txsamp, city </a:t>
+            </a:r>
+            <a:r>
+              <a:rPr sz="1800">
+                <a:solidFill>
+                  <a:srgbClr val="666666"/>
+                </a:solidFill>
+                <a:latin typeface="Courier"/>
+              </a:rPr>
+              <a:t>==</a:t>
+            </a:r>
+            <a:r>
+              <a:rPr sz="1800">
+                <a:solidFill>
+                  <a:srgbClr val="4070A0"/>
+                </a:solidFill>
+                <a:latin typeface="Courier"/>
+              </a:rPr>
+              <a:t> "Austin"</a:t>
+            </a:r>
+            <a:r>
+              <a:rPr sz="1800">
+                <a:latin typeface="Courier"/>
+              </a:rPr>
+              <a:t>), </a:t>
+            </a:r>
+            <a:r>
+              <a:rPr sz="1800" b="1">
+                <a:solidFill>
+                  <a:srgbClr val="007020"/>
+                </a:solidFill>
+                <a:latin typeface="Courier"/>
+              </a:rPr>
+              <a:t>aes</a:t>
+            </a:r>
+            <a:r>
+              <a:rPr sz="1800">
+                <a:latin typeface="Courier"/>
+              </a:rPr>
+              <a:t>(</a:t>
+            </a:r>
+            <a:r>
+              <a:rPr sz="1800">
+                <a:solidFill>
+                  <a:srgbClr val="902000"/>
+                </a:solidFill>
+                <a:latin typeface="Courier"/>
+              </a:rPr>
+              <a:t>x =</a:t>
+            </a:r>
+            <a:r>
+              <a:rPr sz="1800">
+                <a:latin typeface="Courier"/>
+              </a:rPr>
+              <a:t> sales, </a:t>
+            </a:r>
+            <a:r>
+              <a:rPr sz="1800">
+                <a:solidFill>
+                  <a:srgbClr val="902000"/>
+                </a:solidFill>
+                <a:latin typeface="Courier"/>
+              </a:rPr>
+              <a:t>y =</a:t>
+            </a:r>
+            <a:r>
+              <a:rPr sz="1800">
+                <a:latin typeface="Courier"/>
+              </a:rPr>
+              <a:t> median)) </a:t>
+            </a:r>
+            <a:r>
+              <a:rPr sz="1800">
+                <a:solidFill>
+                  <a:srgbClr val="666666"/>
+                </a:solidFill>
+                <a:latin typeface="Courier"/>
+              </a:rPr>
+              <a:t>+</a:t>
+            </a:r>
+            <a:br/>
+            <a:r>
+              <a:rPr sz="1800">
+                <a:solidFill>
+                  <a:srgbClr val="4070A0"/>
+                </a:solidFill>
+                <a:latin typeface="Courier"/>
+              </a:rPr>
+              <a:t>   </a:t>
+            </a:r>
+            <a:r>
+              <a:rPr sz="1800" b="1">
+                <a:solidFill>
+                  <a:srgbClr val="007020"/>
+                </a:solidFill>
+                <a:latin typeface="Courier"/>
+              </a:rPr>
+              <a:t>geom_point</a:t>
+            </a:r>
+            <a:r>
+              <a:rPr sz="1800">
+                <a:latin typeface="Courier"/>
+              </a:rPr>
+              <a:t>(</a:t>
+            </a:r>
+            <a:r>
+              <a:rPr sz="1800" b="1">
+                <a:solidFill>
+                  <a:srgbClr val="007020"/>
+                </a:solidFill>
+                <a:latin typeface="Courier"/>
+              </a:rPr>
+              <a:t>aes</a:t>
+            </a:r>
+            <a:r>
+              <a:rPr sz="1800">
+                <a:latin typeface="Courier"/>
+              </a:rPr>
+              <a:t>(</a:t>
+            </a:r>
+            <a:r>
+              <a:rPr sz="1800">
+                <a:solidFill>
+                  <a:srgbClr val="902000"/>
+                </a:solidFill>
+                <a:latin typeface="Courier"/>
+              </a:rPr>
+              <a:t>colour =</a:t>
+            </a:r>
+            <a:r>
+              <a:rPr sz="1800">
+                <a:latin typeface="Courier"/>
+              </a:rPr>
+              <a:t> year)) </a:t>
+            </a:r>
+            <a:r>
+              <a:rPr sz="1800">
+                <a:solidFill>
+                  <a:srgbClr val="666666"/>
+                </a:solidFill>
+                <a:latin typeface="Courier"/>
+              </a:rPr>
+              <a:t>+</a:t>
+            </a:r>
+            <a:r>
+              <a:rPr sz="1800">
+                <a:solidFill>
+                  <a:srgbClr val="4070A0"/>
+                </a:solidFill>
+                <a:latin typeface="Courier"/>
+              </a:rPr>
+              <a:t> </a:t>
+            </a:r>
+            <a:br/>
+            <a:r>
+              <a:rPr sz="1800">
+                <a:solidFill>
+                  <a:srgbClr val="4070A0"/>
+                </a:solidFill>
+                <a:latin typeface="Courier"/>
+              </a:rPr>
+              <a:t>   </a:t>
+            </a:r>
+            <a:r>
+              <a:rPr sz="1800" b="1">
+                <a:solidFill>
+                  <a:srgbClr val="007020"/>
+                </a:solidFill>
+                <a:latin typeface="Courier"/>
+              </a:rPr>
+              <a:t>scale_colour_viridis_c</a:t>
+            </a:r>
+            <a:r>
+              <a:rPr sz="1800">
+                <a:latin typeface="Courier"/>
+              </a:rPr>
+              <a:t>(</a:t>
+            </a:r>
+            <a:r>
+              <a:rPr sz="1800">
+                <a:solidFill>
+                  <a:srgbClr val="4070A0"/>
+                </a:solidFill>
+                <a:latin typeface="Courier"/>
+              </a:rPr>
+              <a:t>"Austin by year"</a:t>
+            </a:r>
+            <a:r>
+              <a:rPr sz="1800">
+                <a:latin typeface="Courier"/>
+              </a:rPr>
+              <a:t>, </a:t>
+            </a:r>
+            <a:r>
+              <a:rPr sz="1800">
+                <a:solidFill>
+                  <a:srgbClr val="902000"/>
+                </a:solidFill>
+                <a:latin typeface="Courier"/>
+              </a:rPr>
+              <a:t>option =</a:t>
+            </a:r>
+            <a:r>
+              <a:rPr sz="1800">
+                <a:latin typeface="Courier"/>
+              </a:rPr>
+              <a:t> params</a:t>
+            </a:r>
+            <a:r>
+              <a:rPr sz="1800">
+                <a:solidFill>
+                  <a:srgbClr val="666666"/>
+                </a:solidFill>
+                <a:latin typeface="Courier"/>
+              </a:rPr>
+              <a:t>$</a:t>
+            </a:r>
+            <a:r>
+              <a:rPr sz="1800">
+                <a:latin typeface="Courier"/>
+              </a:rPr>
+              <a:t>viridis_palette, </a:t>
+            </a:r>
+            <a:r>
+              <a:rPr sz="1800">
+                <a:solidFill>
+                  <a:srgbClr val="902000"/>
+                </a:solidFill>
+                <a:latin typeface="Courier"/>
+              </a:rPr>
+              <a:t>direction =</a:t>
+            </a:r>
+            <a:r>
+              <a:rPr sz="1800">
+                <a:latin typeface="Courier"/>
+              </a:rPr>
+              <a:t> </a:t>
+            </a:r>
+            <a:r>
+              <a:rPr sz="1800">
+                <a:solidFill>
+                  <a:srgbClr val="40A070"/>
+                </a:solidFill>
+                <a:latin typeface="Courier"/>
+              </a:rPr>
+              <a:t>-1</a:t>
+            </a:r>
+            <a:r>
+              <a:rPr sz="1800">
+                <a:latin typeface="Courier"/>
+              </a:rPr>
+              <a:t>) </a:t>
+            </a:r>
+          </a:p>
+        </p:txBody>
+      </p:sp>
+    </p:spTree>
+  </p:cSld>
+</p:sld>
+</file>
+
 <file path=ppt/slides/slide6.xml><?xml version="1.0" encoding="utf-8"?>
 <p:sld xmlns:a="http://schemas.openxmlformats.org/drawingml/2006/main" xmlns:r="http://schemas.openxmlformats.org/officeDocument/2006/relationships" xmlns:p="http://schemas.openxmlformats.org/presentationml/2006/main">
   <p:cSld>
@@ -3781,66 +4519,9 @@
           <a:chExt cx="0" cy="0"/>
         </a:xfrm>
       </p:grpSpPr>
-      <p:sp>
-        <p:nvSpPr>
-          <p:cNvPr id="2" name="Title 1"/>
-          <p:cNvSpPr>
-            <a:spLocks noGrp="1"/>
-          </p:cNvSpPr>
-          <p:nvPr>
-            <p:ph type="title"/>
-          </p:nvPr>
-        </p:nvSpPr>
-        <p:spPr/>
-        <p:txBody>
-          <a:bodyPr/>
-          <a:lstStyle/>
-          <a:p>
-            <a:pPr lvl="0" marL="0" indent="0">
-              <a:buNone/>
-            </a:pPr>
-            <a:r>
-              <a:rPr/>
-              <a:t>Austin</a:t>
-            </a:r>
-            <a:r>
-              <a:rPr/>
-              <a:t> </a:t>
-            </a:r>
-            <a:r>
-              <a:rPr/>
-              <a:t>prices</a:t>
-            </a:r>
-            <a:r>
-              <a:rPr/>
-              <a:t> </a:t>
-            </a:r>
-            <a:r>
-              <a:rPr/>
-              <a:t>on</a:t>
-            </a:r>
-            <a:r>
-              <a:rPr/>
-              <a:t> </a:t>
-            </a:r>
-            <a:r>
-              <a:rPr/>
-              <a:t>the</a:t>
-            </a:r>
-            <a:r>
-              <a:rPr/>
-              <a:t> </a:t>
-            </a:r>
-            <a:r>
-              <a:rPr/>
-              <a:t>rise</a:t>
-            </a:r>
-          </a:p>
-        </p:txBody>
-      </p:sp>
       <p:pic>
         <p:nvPicPr>
-          <p:cNvPr descr="/Users/alison/rprojs/rmd-render-factory/gallery/outputs/slides/powerpoint_presentation_files/figure-pptx/unnamed-chunk-5-1.png" id="0" name="Picture 1"/>
+          <p:cNvPr descr="/Users/alison/rprojs/rmd-render-factory/gallery/outputs/slides/powerpoint_presentation_files/figure-pptx/unnamed-chunk-3-1.png" id="0" name="Picture 1"/>
           <p:cNvPicPr>
             <a:picLocks noGrp="1" noChangeAspect="1"/>
           </p:cNvPicPr>
@@ -3955,9 +4636,374 @@
           </a:p>
         </p:txBody>
       </p:sp>
+      <p:sp>
+        <p:nvSpPr>
+          <p:cNvPr id="3" name="Content Placeholder 2"/>
+          <p:cNvSpPr>
+            <a:spLocks noGrp="1"/>
+          </p:cNvSpPr>
+          <p:nvPr>
+            <p:ph idx="1"/>
+          </p:nvPr>
+        </p:nvSpPr>
+        <p:spPr/>
+        <p:txBody>
+          <a:bodyPr/>
+          <a:lstStyle/>
+          <a:p>
+            <a:pPr lvl="0" marL="1270000" indent="0">
+              <a:buNone/>
+            </a:pPr>
+            <a:r>
+              <a:rPr sz="1800" b="1">
+                <a:solidFill>
+                  <a:srgbClr val="007020"/>
+                </a:solidFill>
+                <a:latin typeface="Courier"/>
+              </a:rPr>
+              <a:t>library</a:t>
+            </a:r>
+            <a:r>
+              <a:rPr sz="1800">
+                <a:latin typeface="Courier"/>
+              </a:rPr>
+              <a:t>(scales) </a:t>
+            </a:r>
+            <a:r>
+              <a:rPr sz="1800" i="1">
+                <a:solidFill>
+                  <a:srgbClr val="60A0B0"/>
+                </a:solidFill>
+                <a:latin typeface="Courier"/>
+              </a:rPr>
+              <a:t># to make y-axis in non-scientific notation</a:t>
+            </a:r>
+            <a:br/>
+            <a:r>
+              <a:rPr sz="1800" b="1">
+                <a:solidFill>
+                  <a:srgbClr val="007020"/>
+                </a:solidFill>
+                <a:latin typeface="Courier"/>
+              </a:rPr>
+              <a:t>ggplot</a:t>
+            </a:r>
+            <a:r>
+              <a:rPr sz="1800">
+                <a:latin typeface="Courier"/>
+              </a:rPr>
+              <a:t>(txsamp, </a:t>
+            </a:r>
+            <a:r>
+              <a:rPr sz="1800" b="1">
+                <a:solidFill>
+                  <a:srgbClr val="007020"/>
+                </a:solidFill>
+                <a:latin typeface="Courier"/>
+              </a:rPr>
+              <a:t>aes</a:t>
+            </a:r>
+            <a:r>
+              <a:rPr sz="1800">
+                <a:latin typeface="Courier"/>
+              </a:rPr>
+              <a:t>(</a:t>
+            </a:r>
+            <a:r>
+              <a:rPr sz="1800">
+                <a:solidFill>
+                  <a:srgbClr val="902000"/>
+                </a:solidFill>
+                <a:latin typeface="Courier"/>
+              </a:rPr>
+              <a:t>x =</a:t>
+            </a:r>
+            <a:r>
+              <a:rPr sz="1800">
+                <a:latin typeface="Courier"/>
+              </a:rPr>
+              <a:t> median, </a:t>
+            </a:r>
+            <a:r>
+              <a:rPr sz="1800">
+                <a:solidFill>
+                  <a:srgbClr val="902000"/>
+                </a:solidFill>
+                <a:latin typeface="Courier"/>
+              </a:rPr>
+              <a:t>fill =</a:t>
+            </a:r>
+            <a:r>
+              <a:rPr sz="1800">
+                <a:latin typeface="Courier"/>
+              </a:rPr>
+              <a:t> city)) </a:t>
+            </a:r>
+            <a:r>
+              <a:rPr sz="1800">
+                <a:solidFill>
+                  <a:srgbClr val="666666"/>
+                </a:solidFill>
+                <a:latin typeface="Courier"/>
+              </a:rPr>
+              <a:t>+</a:t>
+            </a:r>
+            <a:br/>
+            <a:r>
+              <a:rPr sz="1800">
+                <a:solidFill>
+                  <a:srgbClr val="4070A0"/>
+                </a:solidFill>
+                <a:latin typeface="Courier"/>
+              </a:rPr>
+              <a:t>  </a:t>
+            </a:r>
+            <a:r>
+              <a:rPr sz="1800" b="1">
+                <a:solidFill>
+                  <a:srgbClr val="007020"/>
+                </a:solidFill>
+                <a:latin typeface="Courier"/>
+              </a:rPr>
+              <a:t>geom_histogram</a:t>
+            </a:r>
+            <a:r>
+              <a:rPr sz="1800">
+                <a:latin typeface="Courier"/>
+              </a:rPr>
+              <a:t>(</a:t>
+            </a:r>
+            <a:r>
+              <a:rPr sz="1800" b="1">
+                <a:solidFill>
+                  <a:srgbClr val="007020"/>
+                </a:solidFill>
+                <a:latin typeface="Courier"/>
+              </a:rPr>
+              <a:t>aes</a:t>
+            </a:r>
+            <a:r>
+              <a:rPr sz="1800">
+                <a:latin typeface="Courier"/>
+              </a:rPr>
+              <a:t>(</a:t>
+            </a:r>
+            <a:r>
+              <a:rPr sz="1800">
+                <a:solidFill>
+                  <a:srgbClr val="902000"/>
+                </a:solidFill>
+                <a:latin typeface="Courier"/>
+              </a:rPr>
+              <a:t>weight =</a:t>
+            </a:r>
+            <a:r>
+              <a:rPr sz="1800">
+                <a:latin typeface="Courier"/>
+              </a:rPr>
+              <a:t> sales), </a:t>
+            </a:r>
+            <a:r>
+              <a:rPr sz="1800">
+                <a:solidFill>
+                  <a:srgbClr val="902000"/>
+                </a:solidFill>
+                <a:latin typeface="Courier"/>
+              </a:rPr>
+              <a:t>position =</a:t>
+            </a:r>
+            <a:r>
+              <a:rPr sz="1800">
+                <a:latin typeface="Courier"/>
+              </a:rPr>
+              <a:t> </a:t>
+            </a:r>
+            <a:r>
+              <a:rPr sz="1800">
+                <a:solidFill>
+                  <a:srgbClr val="4070A0"/>
+                </a:solidFill>
+                <a:latin typeface="Courier"/>
+              </a:rPr>
+              <a:t>"dodge"</a:t>
+            </a:r>
+            <a:r>
+              <a:rPr sz="1800">
+                <a:latin typeface="Courier"/>
+              </a:rPr>
+              <a:t>, </a:t>
+            </a:r>
+            <a:r>
+              <a:rPr sz="1800">
+                <a:solidFill>
+                  <a:srgbClr val="902000"/>
+                </a:solidFill>
+                <a:latin typeface="Courier"/>
+              </a:rPr>
+              <a:t>binwidth =</a:t>
+            </a:r>
+            <a:r>
+              <a:rPr sz="1800">
+                <a:latin typeface="Courier"/>
+              </a:rPr>
+              <a:t> </a:t>
+            </a:r>
+            <a:r>
+              <a:rPr sz="1800">
+                <a:solidFill>
+                  <a:srgbClr val="40A070"/>
+                </a:solidFill>
+                <a:latin typeface="Courier"/>
+              </a:rPr>
+              <a:t>15000</a:t>
+            </a:r>
+            <a:r>
+              <a:rPr sz="1800">
+                <a:latin typeface="Courier"/>
+              </a:rPr>
+              <a:t>) </a:t>
+            </a:r>
+            <a:r>
+              <a:rPr sz="1800">
+                <a:solidFill>
+                  <a:srgbClr val="666666"/>
+                </a:solidFill>
+                <a:latin typeface="Courier"/>
+              </a:rPr>
+              <a:t>+</a:t>
+            </a:r>
+            <a:br/>
+            <a:r>
+              <a:rPr sz="1800">
+                <a:solidFill>
+                  <a:srgbClr val="4070A0"/>
+                </a:solidFill>
+                <a:latin typeface="Courier"/>
+              </a:rPr>
+              <a:t>  </a:t>
+            </a:r>
+            <a:r>
+              <a:rPr sz="1800" b="1">
+                <a:solidFill>
+                  <a:srgbClr val="007020"/>
+                </a:solidFill>
+                <a:latin typeface="Courier"/>
+              </a:rPr>
+              <a:t>scale_fill_viridis_d</a:t>
+            </a:r>
+            <a:r>
+              <a:rPr sz="1800">
+                <a:latin typeface="Courier"/>
+              </a:rPr>
+              <a:t>(</a:t>
+            </a:r>
+            <a:r>
+              <a:rPr sz="1800">
+                <a:solidFill>
+                  <a:srgbClr val="902000"/>
+                </a:solidFill>
+                <a:latin typeface="Courier"/>
+              </a:rPr>
+              <a:t>option =</a:t>
+            </a:r>
+            <a:r>
+              <a:rPr sz="1800">
+                <a:latin typeface="Courier"/>
+              </a:rPr>
+              <a:t> params</a:t>
+            </a:r>
+            <a:r>
+              <a:rPr sz="1800">
+                <a:solidFill>
+                  <a:srgbClr val="666666"/>
+                </a:solidFill>
+                <a:latin typeface="Courier"/>
+              </a:rPr>
+              <a:t>$</a:t>
+            </a:r>
+            <a:r>
+              <a:rPr sz="1800">
+                <a:latin typeface="Courier"/>
+              </a:rPr>
+              <a:t>viridis_palette)</a:t>
+            </a:r>
+            <a:r>
+              <a:rPr sz="1800">
+                <a:solidFill>
+                  <a:srgbClr val="666666"/>
+                </a:solidFill>
+                <a:latin typeface="Courier"/>
+              </a:rPr>
+              <a:t>+</a:t>
+            </a:r>
+            <a:br/>
+            <a:r>
+              <a:rPr sz="1800">
+                <a:solidFill>
+                  <a:srgbClr val="4070A0"/>
+                </a:solidFill>
+                <a:latin typeface="Courier"/>
+              </a:rPr>
+              <a:t>  </a:t>
+            </a:r>
+            <a:r>
+              <a:rPr sz="1800" b="1">
+                <a:solidFill>
+                  <a:srgbClr val="007020"/>
+                </a:solidFill>
+                <a:latin typeface="Courier"/>
+              </a:rPr>
+              <a:t>scale_y_continuous</a:t>
+            </a:r>
+            <a:r>
+              <a:rPr sz="1800">
+                <a:latin typeface="Courier"/>
+              </a:rPr>
+              <a:t>(</a:t>
+            </a:r>
+            <a:r>
+              <a:rPr sz="1800">
+                <a:solidFill>
+                  <a:srgbClr val="902000"/>
+                </a:solidFill>
+                <a:latin typeface="Courier"/>
+              </a:rPr>
+              <a:t>labels =</a:t>
+            </a:r>
+            <a:r>
+              <a:rPr sz="1800">
+                <a:latin typeface="Courier"/>
+              </a:rPr>
+              <a:t> comma)</a:t>
+            </a:r>
+          </a:p>
+        </p:txBody>
+      </p:sp>
+    </p:spTree>
+  </p:cSld>
+</p:sld>
+</file>
+
+<file path=ppt/slides/slide8.xml><?xml version="1.0" encoding="utf-8"?>
+<p:sld xmlns:a="http://schemas.openxmlformats.org/drawingml/2006/main" xmlns:r="http://schemas.openxmlformats.org/officeDocument/2006/relationships" xmlns:p="http://schemas.openxmlformats.org/presentationml/2006/main">
+  <p:cSld>
+    <p:spTree>
+      <p:nvGrpSpPr>
+        <p:cNvPr id="1" name=""/>
+        <p:cNvGrpSpPr/>
+        <p:nvPr/>
+      </p:nvGrpSpPr>
+      <p:grpSpPr>
+        <a:xfrm>
+          <a:off x="0" y="0"/>
+          <a:ext cx="0" cy="0"/>
+          <a:chOff x="0" y="0"/>
+          <a:chExt cx="0" cy="0"/>
+        </a:xfrm>
+      </p:grpSpPr>
       <p:pic>
         <p:nvPicPr>
-          <p:cNvPr descr="/Users/alison/rprojs/rmd-render-factory/gallery/outputs/slides/powerpoint_presentation_files/figure-pptx/unnamed-chunk-6-1.png" id="0" name="Picture 1"/>
+          <p:cNvPr descr="/Users/alison/rprojs/rmd-render-factory/gallery/outputs/slides/powerpoint_presentation_files/figure-pptx/unnamed-chunk-4-1.png" id="0" name="Picture 1"/>
           <p:cNvPicPr>
             <a:picLocks noGrp="1" noChangeAspect="1"/>
           </p:cNvPicPr>
@@ -3990,126 +5036,6 @@
 </p:sld>
 </file>
 
-<file path=ppt/slides/slide8.xml><?xml version="1.0" encoding="utf-8"?>
-<p:sld xmlns:a="http://schemas.openxmlformats.org/drawingml/2006/main" xmlns:r="http://schemas.openxmlformats.org/officeDocument/2006/relationships" xmlns:p="http://schemas.openxmlformats.org/presentationml/2006/main">
-  <p:cSld>
-    <p:spTree>
-      <p:nvGrpSpPr>
-        <p:cNvPr id="1" name=""/>
-        <p:cNvGrpSpPr/>
-        <p:nvPr/>
-      </p:nvGrpSpPr>
-      <p:grpSpPr>
-        <a:xfrm>
-          <a:off x="0" y="0"/>
-          <a:ext cx="0" cy="0"/>
-          <a:chOff x="0" y="0"/>
-          <a:chExt cx="0" cy="0"/>
-        </a:xfrm>
-      </p:grpSpPr>
-      <p:sp>
-        <p:nvSpPr>
-          <p:cNvPr id="2" name="Title 1"/>
-          <p:cNvSpPr>
-            <a:spLocks noGrp="1"/>
-          </p:cNvSpPr>
-          <p:nvPr>
-            <p:ph type="title"/>
-          </p:nvPr>
-        </p:nvSpPr>
-        <p:spPr/>
-        <p:txBody>
-          <a:bodyPr/>
-          <a:lstStyle/>
-          <a:p>
-            <a:pPr lvl="0" marL="0" indent="0">
-              <a:buNone/>
-            </a:pPr>
-            <a:r>
-              <a:rPr/>
-              <a:t>The</a:t>
-            </a:r>
-            <a:r>
-              <a:rPr/>
-              <a:t> </a:t>
-            </a:r>
-            <a:r>
-              <a:rPr/>
-              <a:t>current</a:t>
-            </a:r>
-            <a:r>
-              <a:rPr/>
-              <a:t> </a:t>
-            </a:r>
-            <a:r>
-              <a:rPr/>
-              <a:t>pace</a:t>
-            </a:r>
-            <a:r>
-              <a:rPr/>
-              <a:t> </a:t>
-            </a:r>
-            <a:r>
-              <a:rPr/>
-              <a:t>of</a:t>
-            </a:r>
-            <a:r>
-              <a:rPr/>
-              <a:t> </a:t>
-            </a:r>
-            <a:r>
-              <a:rPr/>
-              <a:t>sales</a:t>
-            </a:r>
-            <a:r>
-              <a:rPr/>
-              <a:t> </a:t>
-            </a:r>
-            <a:r>
-              <a:rPr/>
-              <a:t>is</a:t>
-            </a:r>
-            <a:r>
-              <a:rPr/>
-              <a:t> </a:t>
-            </a:r>
-            <a:r>
-              <a:rPr/>
-              <a:t>fast</a:t>
-            </a:r>
-          </a:p>
-        </p:txBody>
-      </p:sp>
-      <p:sp>
-        <p:nvSpPr>
-          <p:cNvPr id="3" name="Content Placeholder 2"/>
-          <p:cNvSpPr>
-            <a:spLocks noGrp="1"/>
-          </p:cNvSpPr>
-          <p:nvPr>
-            <p:ph idx="1"/>
-          </p:nvPr>
-        </p:nvSpPr>
-        <p:spPr/>
-        <p:txBody>
-          <a:bodyPr/>
-          <a:lstStyle/>
-          <a:p>
-            <a:pPr lvl="0" marL="0" indent="0">
-              <a:buNone/>
-            </a:pPr>
-            <a:r>
-              <a:rPr/>
-              <a:t>“Months inventory”: amount of time it would take to sell all current listings at current pace of sales.</a:t>
-            </a:r>
-          </a:p>
-        </p:txBody>
-      </p:sp>
-    </p:spTree>
-  </p:cSld>
-</p:sld>
-</file>
-
 <file path=ppt/slides/slide9.xml><?xml version="1.0" encoding="utf-8"?>
 <p:sld xmlns:a="http://schemas.openxmlformats.org/drawingml/2006/main" xmlns:r="http://schemas.openxmlformats.org/officeDocument/2006/relationships" xmlns:p="http://schemas.openxmlformats.org/presentationml/2006/main">
   <p:cSld>
@@ -4127,36 +5053,385 @@
           <a:chExt cx="0" cy="0"/>
         </a:xfrm>
       </p:grpSpPr>
-      <p:pic>
-        <p:nvPicPr>
-          <p:cNvPr descr="/Users/alison/rprojs/rmd-render-factory/gallery/outputs/slides/powerpoint_presentation_files/figure-pptx/unnamed-chunk-7-1.png" id="0" name="Picture 1"/>
-          <p:cNvPicPr>
-            <a:picLocks noGrp="1" noChangeAspect="1"/>
-          </p:cNvPicPr>
-          <p:nvPr/>
-        </p:nvPicPr>
-        <p:blipFill>
-          <a:blip r:embed="rId2"/>
-          <a:stretch>
-            <a:fillRect/>
-          </a:stretch>
-        </p:blipFill>
-        <p:spPr bwMode="auto">
-          <a:xfrm>
-            <a:off x="1752600" y="1600200"/>
-            <a:ext cx="5651500" cy="4521200"/>
-          </a:xfrm>
-          <a:prstGeom prst="rect">
-            <a:avLst/>
-          </a:prstGeom>
-          <a:noFill/>
-          <a:ln w="9525">
-            <a:noFill/>
-            <a:headEnd/>
-            <a:tailEnd/>
-          </a:ln>
-        </p:spPr>
-      </p:pic>
+      <p:sp>
+        <p:nvSpPr>
+          <p:cNvPr id="2" name="Title 1"/>
+          <p:cNvSpPr>
+            <a:spLocks noGrp="1"/>
+          </p:cNvSpPr>
+          <p:nvPr>
+            <p:ph type="title"/>
+          </p:nvPr>
+        </p:nvSpPr>
+        <p:spPr/>
+        <p:txBody>
+          <a:bodyPr/>
+          <a:lstStyle/>
+          <a:p>
+            <a:pPr lvl="0" marL="0" indent="0">
+              <a:buNone/>
+            </a:pPr>
+            <a:r>
+              <a:rPr/>
+              <a:t>The</a:t>
+            </a:r>
+            <a:r>
+              <a:rPr/>
+              <a:t> </a:t>
+            </a:r>
+            <a:r>
+              <a:rPr/>
+              <a:t>current</a:t>
+            </a:r>
+            <a:r>
+              <a:rPr/>
+              <a:t> </a:t>
+            </a:r>
+            <a:r>
+              <a:rPr/>
+              <a:t>pace</a:t>
+            </a:r>
+            <a:r>
+              <a:rPr/>
+              <a:t> </a:t>
+            </a:r>
+            <a:r>
+              <a:rPr/>
+              <a:t>of</a:t>
+            </a:r>
+            <a:r>
+              <a:rPr/>
+              <a:t> </a:t>
+            </a:r>
+            <a:r>
+              <a:rPr/>
+              <a:t>sales</a:t>
+            </a:r>
+            <a:r>
+              <a:rPr/>
+              <a:t> </a:t>
+            </a:r>
+            <a:r>
+              <a:rPr/>
+              <a:t>is</a:t>
+            </a:r>
+            <a:r>
+              <a:rPr/>
+              <a:t> </a:t>
+            </a:r>
+            <a:r>
+              <a:rPr/>
+              <a:t>fast</a:t>
+            </a:r>
+          </a:p>
+        </p:txBody>
+      </p:sp>
+      <p:sp>
+        <p:nvSpPr>
+          <p:cNvPr id="3" name="Content Placeholder 2"/>
+          <p:cNvSpPr>
+            <a:spLocks noGrp="1"/>
+          </p:cNvSpPr>
+          <p:nvPr>
+            <p:ph idx="1"/>
+          </p:nvPr>
+        </p:nvSpPr>
+        <p:spPr/>
+        <p:txBody>
+          <a:bodyPr/>
+          <a:lstStyle/>
+          <a:p>
+            <a:pPr lvl="0" marL="0" indent="0">
+              <a:buNone/>
+            </a:pPr>
+            <a:r>
+              <a:rPr/>
+              <a:t>“Months inventory”: amount of time it would take to sell all current listings at current pace of sales.</a:t>
+            </a:r>
+          </a:p>
+          <a:p>
+            <a:pPr lvl="0" marL="1270000" indent="0">
+              <a:buNone/>
+            </a:pPr>
+            <a:r>
+              <a:rPr sz="1800" b="1">
+                <a:solidFill>
+                  <a:srgbClr val="007020"/>
+                </a:solidFill>
+                <a:latin typeface="Courier"/>
+              </a:rPr>
+              <a:t>ggplot</a:t>
+            </a:r>
+            <a:r>
+              <a:rPr sz="1800">
+                <a:latin typeface="Courier"/>
+              </a:rPr>
+              <a:t>(</a:t>
+            </a:r>
+            <a:r>
+              <a:rPr sz="1800">
+                <a:solidFill>
+                  <a:srgbClr val="902000"/>
+                </a:solidFill>
+                <a:latin typeface="Courier"/>
+              </a:rPr>
+              <a:t>data =</a:t>
+            </a:r>
+            <a:r>
+              <a:rPr sz="1800">
+                <a:latin typeface="Courier"/>
+              </a:rPr>
+              <a:t> txsamp, </a:t>
+            </a:r>
+            <a:r>
+              <a:rPr sz="1800" b="1">
+                <a:solidFill>
+                  <a:srgbClr val="007020"/>
+                </a:solidFill>
+                <a:latin typeface="Courier"/>
+              </a:rPr>
+              <a:t>aes</a:t>
+            </a:r>
+            <a:r>
+              <a:rPr sz="1800">
+                <a:latin typeface="Courier"/>
+              </a:rPr>
+              <a:t>(</a:t>
+            </a:r>
+            <a:r>
+              <a:rPr sz="1800">
+                <a:solidFill>
+                  <a:srgbClr val="902000"/>
+                </a:solidFill>
+                <a:latin typeface="Courier"/>
+              </a:rPr>
+              <a:t>x =</a:t>
+            </a:r>
+            <a:r>
+              <a:rPr sz="1800">
+                <a:latin typeface="Courier"/>
+              </a:rPr>
+              <a:t> year, </a:t>
+            </a:r>
+            <a:r>
+              <a:rPr sz="1800">
+                <a:solidFill>
+                  <a:srgbClr val="902000"/>
+                </a:solidFill>
+                <a:latin typeface="Courier"/>
+              </a:rPr>
+              <a:t>y =</a:t>
+            </a:r>
+            <a:r>
+              <a:rPr sz="1800">
+                <a:latin typeface="Courier"/>
+              </a:rPr>
+              <a:t> inventory, </a:t>
+            </a:r>
+            <a:r>
+              <a:rPr sz="1800">
+                <a:solidFill>
+                  <a:srgbClr val="902000"/>
+                </a:solidFill>
+                <a:latin typeface="Courier"/>
+              </a:rPr>
+              <a:t>colour =</a:t>
+            </a:r>
+            <a:r>
+              <a:rPr sz="1800">
+                <a:latin typeface="Courier"/>
+              </a:rPr>
+              <a:t> city)) </a:t>
+            </a:r>
+            <a:r>
+              <a:rPr sz="1800">
+                <a:solidFill>
+                  <a:srgbClr val="666666"/>
+                </a:solidFill>
+                <a:latin typeface="Courier"/>
+              </a:rPr>
+              <a:t>+</a:t>
+            </a:r>
+            <a:br/>
+            <a:r>
+              <a:rPr sz="1800">
+                <a:solidFill>
+                  <a:srgbClr val="4070A0"/>
+                </a:solidFill>
+                <a:latin typeface="Courier"/>
+              </a:rPr>
+              <a:t>  </a:t>
+            </a:r>
+            <a:r>
+              <a:rPr sz="1800" b="1">
+                <a:solidFill>
+                  <a:srgbClr val="007020"/>
+                </a:solidFill>
+                <a:latin typeface="Courier"/>
+              </a:rPr>
+              <a:t>geom_point</a:t>
+            </a:r>
+            <a:r>
+              <a:rPr sz="1800">
+                <a:latin typeface="Courier"/>
+              </a:rPr>
+              <a:t>() </a:t>
+            </a:r>
+            <a:r>
+              <a:rPr sz="1800">
+                <a:solidFill>
+                  <a:srgbClr val="666666"/>
+                </a:solidFill>
+                <a:latin typeface="Courier"/>
+              </a:rPr>
+              <a:t>+</a:t>
+            </a:r>
+            <a:r>
+              <a:rPr sz="1800">
+                <a:solidFill>
+                  <a:srgbClr val="4070A0"/>
+                </a:solidFill>
+                <a:latin typeface="Courier"/>
+              </a:rPr>
+              <a:t> </a:t>
+            </a:r>
+            <a:br/>
+            <a:r>
+              <a:rPr sz="1800">
+                <a:solidFill>
+                  <a:srgbClr val="4070A0"/>
+                </a:solidFill>
+                <a:latin typeface="Courier"/>
+              </a:rPr>
+              <a:t>  </a:t>
+            </a:r>
+            <a:r>
+              <a:rPr sz="1800" b="1">
+                <a:solidFill>
+                  <a:srgbClr val="007020"/>
+                </a:solidFill>
+                <a:latin typeface="Courier"/>
+              </a:rPr>
+              <a:t>geom_smooth</a:t>
+            </a:r>
+            <a:r>
+              <a:rPr sz="1800">
+                <a:latin typeface="Courier"/>
+              </a:rPr>
+              <a:t>(</a:t>
+            </a:r>
+            <a:r>
+              <a:rPr sz="1800">
+                <a:solidFill>
+                  <a:srgbClr val="902000"/>
+                </a:solidFill>
+                <a:latin typeface="Courier"/>
+              </a:rPr>
+              <a:t>se =</a:t>
+            </a:r>
+            <a:r>
+              <a:rPr sz="1800">
+                <a:latin typeface="Courier"/>
+              </a:rPr>
+              <a:t> </a:t>
+            </a:r>
+            <a:r>
+              <a:rPr sz="1800">
+                <a:solidFill>
+                  <a:srgbClr val="007020"/>
+                </a:solidFill>
+                <a:latin typeface="Courier"/>
+              </a:rPr>
+              <a:t>FALSE</a:t>
+            </a:r>
+            <a:r>
+              <a:rPr sz="1800">
+                <a:latin typeface="Courier"/>
+              </a:rPr>
+              <a:t>) </a:t>
+            </a:r>
+            <a:r>
+              <a:rPr sz="1800">
+                <a:solidFill>
+                  <a:srgbClr val="666666"/>
+                </a:solidFill>
+                <a:latin typeface="Courier"/>
+              </a:rPr>
+              <a:t>+</a:t>
+            </a:r>
+            <a:br/>
+            <a:r>
+              <a:rPr sz="1800">
+                <a:solidFill>
+                  <a:srgbClr val="4070A0"/>
+                </a:solidFill>
+                <a:latin typeface="Courier"/>
+              </a:rPr>
+              <a:t>  </a:t>
+            </a:r>
+            <a:r>
+              <a:rPr sz="1800" b="1">
+                <a:solidFill>
+                  <a:srgbClr val="007020"/>
+                </a:solidFill>
+                <a:latin typeface="Courier"/>
+              </a:rPr>
+              <a:t>scale_colour_viridis_d</a:t>
+            </a:r>
+            <a:r>
+              <a:rPr sz="1800">
+                <a:latin typeface="Courier"/>
+              </a:rPr>
+              <a:t>(</a:t>
+            </a:r>
+            <a:r>
+              <a:rPr sz="1800">
+                <a:solidFill>
+                  <a:srgbClr val="4070A0"/>
+                </a:solidFill>
+                <a:latin typeface="Courier"/>
+              </a:rPr>
+              <a:t>"City\nCenter"</a:t>
+            </a:r>
+            <a:r>
+              <a:rPr sz="1800">
+                <a:latin typeface="Courier"/>
+              </a:rPr>
+              <a:t>, </a:t>
+            </a:r>
+            <a:r>
+              <a:rPr sz="1800">
+                <a:solidFill>
+                  <a:srgbClr val="902000"/>
+                </a:solidFill>
+                <a:latin typeface="Courier"/>
+              </a:rPr>
+              <a:t>option =</a:t>
+            </a:r>
+            <a:r>
+              <a:rPr sz="1800">
+                <a:latin typeface="Courier"/>
+              </a:rPr>
+              <a:t> params</a:t>
+            </a:r>
+            <a:r>
+              <a:rPr sz="1800">
+                <a:solidFill>
+                  <a:srgbClr val="666666"/>
+                </a:solidFill>
+                <a:latin typeface="Courier"/>
+              </a:rPr>
+              <a:t>$</a:t>
+            </a:r>
+            <a:r>
+              <a:rPr sz="1800">
+                <a:latin typeface="Courier"/>
+              </a:rPr>
+              <a:t>viridis_palette) </a:t>
+            </a:r>
+          </a:p>
+        </p:txBody>
+      </p:sp>
     </p:spTree>
   </p:cSld>
 </p:sld>

</xml_diff>

<commit_message>
update all output (added code_download)
</commit_message>
<xml_diff>
--- a/gallery/outputs/slides/powerpoint_presentation.pptx
+++ b/gallery/outputs/slides/powerpoint_presentation.pptx
@@ -3146,7 +3146,7 @@
             </a:pPr>
             <a:r>
               <a:rPr/>
-              <a:t>Visualizing</a:t>
+              <a:t>Texas</a:t>
             </a:r>
             <a:r>
               <a:rPr/>
@@ -3154,7 +3154,15 @@
             </a:r>
             <a:r>
               <a:rPr/>
-              <a:t>Texas:</a:t>
+              <a:t>Housing</a:t>
+            </a:r>
+            <a:r>
+              <a:rPr/>
+              <a:t> </a:t>
+            </a:r>
+            <a:r>
+              <a:rPr/>
+              <a:t>Prices:</a:t>
             </a:r>
             <a:r>
               <a:rPr/>
@@ -3205,31 +3213,6 @@
             <a:r>
               <a:rPr/>
               <a:t>Hill</a:t>
-            </a:r>
-          </a:p>
-        </p:txBody>
-      </p:sp>
-      <p:sp>
-        <p:nvSpPr>
-          <p:cNvPr id="4" name="Date Placeholder 3"/>
-          <p:cNvSpPr>
-            <a:spLocks noGrp="1"/>
-          </p:cNvSpPr>
-          <p:nvPr>
-            <p:ph type="dt" sz="half" idx="10"/>
-          </p:nvPr>
-        </p:nvSpPr>
-        <p:spPr/>
-        <p:txBody>
-          <a:bodyPr/>
-          <a:lstStyle/>
-          <a:p>
-            <a:pPr lvl="0" marL="0" indent="0">
-              <a:buNone/>
-            </a:pPr>
-            <a:r>
-              <a:rPr/>
-              <a:t>2019-03-15</a:t>
             </a:r>
           </a:p>
         </p:txBody>

</xml_diff>

<commit_message>
update output formats automagically
</commit_message>
<xml_diff>
--- a/gallery/outputs/slides/powerpoint_presentation.pptx
+++ b/gallery/outputs/slides/powerpoint_presentation.pptx
@@ -3388,47 +3388,6 @@
           <a:chExt cx="0" cy="0"/>
         </a:xfrm>
       </p:grpSpPr>
-      <p:sp>
-        <p:nvSpPr>
-          <p:cNvPr id="2" name="Title 1"/>
-          <p:cNvSpPr>
-            <a:spLocks noGrp="1"/>
-          </p:cNvSpPr>
-          <p:nvPr>
-            <p:ph type="title"/>
-          </p:nvPr>
-        </p:nvSpPr>
-        <p:spPr/>
-        <p:txBody>
-          <a:bodyPr/>
-          <a:lstStyle/>
-          <a:p>
-            <a:pPr lvl="0" marL="0" indent="0">
-              <a:buNone/>
-            </a:pPr>
-            <a:r>
-              <a:rPr/>
-              <a:t>Packages</a:t>
-            </a:r>
-            <a:r>
-              <a:rPr/>
-              <a:t> </a:t>
-            </a:r>
-            <a:r>
-              <a:rPr/>
-              <a:t>and</a:t>
-            </a:r>
-            <a:r>
-              <a:rPr/>
-              <a:t> </a:t>
-            </a:r>
-            <a:r>
-              <a:rPr/>
-              <a:t>data</a:t>
-            </a:r>
-          </a:p>
-        </p:txBody>
-      </p:sp>
       <p:sp>
         <p:nvSpPr>
           <p:cNvPr id="3" name="Content Placeholder 2"/>

</xml_diff>